<commit_message>
fixed mistake in lab 2
</commit_message>
<xml_diff>
--- a/labs/lab2/lab2.pptx
+++ b/labs/lab2/lab2.pptx
@@ -501,7 +501,7 @@
               <ma14:placeholderFlag xmlns:ma14="http://schemas.microsoft.com/office/mac/drawingml/2011/main" val="1"/>
             </a:ext>
             <a:ext uri="{909E8E84-426E-40dd-AFC4-6F175D3DCCD1}">
-              <a14:hiddenFill xmlns="" xmlns:a14="http://schemas.microsoft.com/office/drawing/2010/main">
+              <a14:hiddenFill xmlns:a14="http://schemas.microsoft.com/office/drawing/2010/main" xmlns="">
                 <a:solidFill>
                   <a:srgbClr val="FFFFFF"/>
                 </a:solidFill>
@@ -6620,14 +6620,14 @@
               <ma14:placeholderFlag xmlns:ma14="http://schemas.microsoft.com/office/mac/drawingml/2011/main" val="1"/>
             </a:ext>
             <a:ext uri="{909E8E84-426E-40dd-AFC4-6F175D3DCCD1}">
-              <a14:hiddenFill xmlns="" xmlns:a14="http://schemas.microsoft.com/office/drawing/2010/main">
+              <a14:hiddenFill xmlns:a14="http://schemas.microsoft.com/office/drawing/2010/main" xmlns="">
                 <a:solidFill>
                   <a:srgbClr val="FFFFFF"/>
                 </a:solidFill>
               </a14:hiddenFill>
             </a:ext>
             <a:ext uri="{91240B29-F687-4f45-9708-019B960494DF}">
-              <a14:hiddenLine xmlns="" xmlns:a14="http://schemas.microsoft.com/office/drawing/2010/main" w="9525">
+              <a14:hiddenLine xmlns:a14="http://schemas.microsoft.com/office/drawing/2010/main" xmlns="" w="9525">
                 <a:solidFill>
                   <a:srgbClr val="000000"/>
                 </a:solidFill>
@@ -6702,14 +6702,14 @@
               <ma14:placeholderFlag xmlns:ma14="http://schemas.microsoft.com/office/mac/drawingml/2011/main" val="1"/>
             </a:ext>
             <a:ext uri="{909E8E84-426E-40dd-AFC4-6F175D3DCCD1}">
-              <a14:hiddenFill xmlns="" xmlns:a14="http://schemas.microsoft.com/office/drawing/2010/main">
+              <a14:hiddenFill xmlns:a14="http://schemas.microsoft.com/office/drawing/2010/main" xmlns="">
                 <a:solidFill>
                   <a:srgbClr val="FFFFFF"/>
                 </a:solidFill>
               </a14:hiddenFill>
             </a:ext>
             <a:ext uri="{91240B29-F687-4f45-9708-019B960494DF}">
-              <a14:hiddenLine xmlns="" xmlns:a14="http://schemas.microsoft.com/office/drawing/2010/main" w="9525">
+              <a14:hiddenLine xmlns:a14="http://schemas.microsoft.com/office/drawing/2010/main" xmlns="" w="9525">
                 <a:solidFill>
                   <a:srgbClr val="000000"/>
                 </a:solidFill>
@@ -7549,14 +7549,14 @@
               <ma14:placeholderFlag xmlns:ma14="http://schemas.microsoft.com/office/mac/drawingml/2011/main" val="1"/>
             </a:ext>
             <a:ext uri="{909E8E84-426E-40dd-AFC4-6F175D3DCCD1}">
-              <a14:hiddenFill xmlns="" xmlns:a14="http://schemas.microsoft.com/office/drawing/2010/main">
+              <a14:hiddenFill xmlns:a14="http://schemas.microsoft.com/office/drawing/2010/main" xmlns="">
                 <a:solidFill>
                   <a:srgbClr val="FFFFFF"/>
                 </a:solidFill>
               </a14:hiddenFill>
             </a:ext>
             <a:ext uri="{91240B29-F687-4f45-9708-019B960494DF}">
-              <a14:hiddenLine xmlns="" xmlns:a14="http://schemas.microsoft.com/office/drawing/2010/main" w="9525">
+              <a14:hiddenLine xmlns:a14="http://schemas.microsoft.com/office/drawing/2010/main" xmlns="" w="9525">
                 <a:solidFill>
                   <a:srgbClr val="000000"/>
                 </a:solidFill>
@@ -7763,14 +7763,14 @@
               <ma14:placeholderFlag xmlns:ma14="http://schemas.microsoft.com/office/mac/drawingml/2011/main" val="1"/>
             </a:ext>
             <a:ext uri="{909E8E84-426E-40dd-AFC4-6F175D3DCCD1}">
-              <a14:hiddenFill xmlns="" xmlns:a14="http://schemas.microsoft.com/office/drawing/2010/main">
+              <a14:hiddenFill xmlns:a14="http://schemas.microsoft.com/office/drawing/2010/main" xmlns="">
                 <a:solidFill>
                   <a:srgbClr val="FFFFFF"/>
                 </a:solidFill>
               </a14:hiddenFill>
             </a:ext>
             <a:ext uri="{91240B29-F687-4f45-9708-019B960494DF}">
-              <a14:hiddenLine xmlns="" xmlns:a14="http://schemas.microsoft.com/office/drawing/2010/main" w="9525">
+              <a14:hiddenLine xmlns:a14="http://schemas.microsoft.com/office/drawing/2010/main" xmlns="" w="9525">
                 <a:solidFill>
                   <a:srgbClr val="000000"/>
                 </a:solidFill>
@@ -7977,14 +7977,14 @@
               <ma14:placeholderFlag xmlns:ma14="http://schemas.microsoft.com/office/mac/drawingml/2011/main" val="1"/>
             </a:ext>
             <a:ext uri="{909E8E84-426E-40dd-AFC4-6F175D3DCCD1}">
-              <a14:hiddenFill xmlns="" xmlns:a14="http://schemas.microsoft.com/office/drawing/2010/main">
+              <a14:hiddenFill xmlns:a14="http://schemas.microsoft.com/office/drawing/2010/main" xmlns="">
                 <a:solidFill>
                   <a:srgbClr val="FFFFFF"/>
                 </a:solidFill>
               </a14:hiddenFill>
             </a:ext>
             <a:ext uri="{91240B29-F687-4f45-9708-019B960494DF}">
-              <a14:hiddenLine xmlns="" xmlns:a14="http://schemas.microsoft.com/office/drawing/2010/main" w="9525">
+              <a14:hiddenLine xmlns:a14="http://schemas.microsoft.com/office/drawing/2010/main" xmlns="" w="9525">
                 <a:solidFill>
                   <a:srgbClr val="000000"/>
                 </a:solidFill>
@@ -12001,14 +12001,14 @@
               <ma14:placeholderFlag xmlns:ma14="http://schemas.microsoft.com/office/mac/drawingml/2011/main" val="1"/>
             </a:ext>
             <a:ext uri="{909E8E84-426E-40dd-AFC4-6F175D3DCCD1}">
-              <a14:hiddenFill xmlns="" xmlns:a14="http://schemas.microsoft.com/office/drawing/2010/main">
+              <a14:hiddenFill xmlns:a14="http://schemas.microsoft.com/office/drawing/2010/main" xmlns="">
                 <a:solidFill>
                   <a:srgbClr val="FFFFFF"/>
                 </a:solidFill>
               </a14:hiddenFill>
             </a:ext>
             <a:ext uri="{91240B29-F687-4f45-9708-019B960494DF}">
-              <a14:hiddenLine xmlns="" xmlns:a14="http://schemas.microsoft.com/office/drawing/2010/main" w="9525">
+              <a14:hiddenLine xmlns:a14="http://schemas.microsoft.com/office/drawing/2010/main" xmlns="" w="9525">
                 <a:solidFill>
                   <a:srgbClr val="000000"/>
                 </a:solidFill>
@@ -12630,32 +12630,9 @@
           <a:chExt cx="0" cy="0"/>
         </a:xfrm>
       </p:grpSpPr>
-      <p:sp>
-        <p:nvSpPr>
-          <p:cNvPr id="2" name="Title 1"/>
-          <p:cNvSpPr>
-            <a:spLocks noGrp="1"/>
-          </p:cNvSpPr>
-          <p:nvPr>
-            <p:ph type="title"/>
-          </p:nvPr>
-        </p:nvSpPr>
-        <p:spPr/>
-        <p:txBody>
-          <a:bodyPr/>
-          <a:lstStyle/>
-          <a:p>
-            <a:r>
-              <a:rPr lang="en-US" dirty="0" smtClean="0"/>
-              <a:t>ER Diagram </a:t>
-            </a:r>
-            <a:endParaRPr lang="en-US" dirty="0"/>
-          </a:p>
-        </p:txBody>
-      </p:sp>
       <p:pic>
         <p:nvPicPr>
-          <p:cNvPr id="4" name="Picture 3"/>
+          <p:cNvPr id="3" name="Picture 2"/>
           <p:cNvPicPr>
             <a:picLocks noChangeAspect="1"/>
           </p:cNvPicPr>
@@ -12675,14 +12652,37 @@
         </p:blipFill>
         <p:spPr>
           <a:xfrm>
-            <a:off x="0" y="3212976"/>
-            <a:ext cx="9144000" cy="3308754"/>
+            <a:off x="179512" y="3272748"/>
+            <a:ext cx="8833341" cy="3194608"/>
           </a:xfrm>
           <a:prstGeom prst="rect">
             <a:avLst/>
           </a:prstGeom>
         </p:spPr>
       </p:pic>
+      <p:sp>
+        <p:nvSpPr>
+          <p:cNvPr id="2" name="Title 1"/>
+          <p:cNvSpPr>
+            <a:spLocks noGrp="1"/>
+          </p:cNvSpPr>
+          <p:nvPr>
+            <p:ph type="title"/>
+          </p:nvPr>
+        </p:nvSpPr>
+        <p:spPr/>
+        <p:txBody>
+          <a:bodyPr/>
+          <a:lstStyle/>
+          <a:p>
+            <a:r>
+              <a:rPr lang="en-US" dirty="0" smtClean="0"/>
+              <a:t>ER Diagram </a:t>
+            </a:r>
+            <a:endParaRPr lang="en-US" dirty="0"/>
+          </a:p>
+        </p:txBody>
+      </p:sp>
       <p:sp>
         <p:nvSpPr>
           <p:cNvPr id="5" name="TextBox 4"/>
@@ -13757,14 +13757,14 @@
               <ma14:placeholderFlag xmlns:ma14="http://schemas.microsoft.com/office/mac/drawingml/2011/main" val="1"/>
             </a:ext>
             <a:ext uri="{909E8E84-426E-40dd-AFC4-6F175D3DCCD1}">
-              <a14:hiddenFill xmlns="" xmlns:a14="http://schemas.microsoft.com/office/drawing/2010/main">
+              <a14:hiddenFill xmlns:a14="http://schemas.microsoft.com/office/drawing/2010/main" xmlns="">
                 <a:solidFill>
                   <a:srgbClr val="FFFFFF"/>
                 </a:solidFill>
               </a14:hiddenFill>
             </a:ext>
             <a:ext uri="{91240B29-F687-4f45-9708-019B960494DF}">
-              <a14:hiddenLine xmlns="" xmlns:a14="http://schemas.microsoft.com/office/drawing/2010/main" w="9525">
+              <a14:hiddenLine xmlns:a14="http://schemas.microsoft.com/office/drawing/2010/main" xmlns="" w="9525">
                 <a:solidFill>
                   <a:srgbClr val="000000"/>
                 </a:solidFill>
@@ -14286,14 +14286,14 @@
               <ma14:placeholderFlag xmlns:ma14="http://schemas.microsoft.com/office/mac/drawingml/2011/main" val="1"/>
             </a:ext>
             <a:ext uri="{909E8E84-426E-40dd-AFC4-6F175D3DCCD1}">
-              <a14:hiddenFill xmlns="" xmlns:a14="http://schemas.microsoft.com/office/drawing/2010/main">
+              <a14:hiddenFill xmlns:a14="http://schemas.microsoft.com/office/drawing/2010/main" xmlns="">
                 <a:solidFill>
                   <a:srgbClr val="FFFFFF"/>
                 </a:solidFill>
               </a14:hiddenFill>
             </a:ext>
             <a:ext uri="{91240B29-F687-4f45-9708-019B960494DF}">
-              <a14:hiddenLine xmlns="" xmlns:a14="http://schemas.microsoft.com/office/drawing/2010/main" w="9525">
+              <a14:hiddenLine xmlns:a14="http://schemas.microsoft.com/office/drawing/2010/main" xmlns="" w="9525">
                 <a:solidFill>
                   <a:srgbClr val="000000"/>
                 </a:solidFill>
@@ -14773,14 +14773,14 @@
               <ma14:placeholderFlag xmlns:ma14="http://schemas.microsoft.com/office/mac/drawingml/2011/main" val="1"/>
             </a:ext>
             <a:ext uri="{909E8E84-426E-40dd-AFC4-6F175D3DCCD1}">
-              <a14:hiddenFill xmlns="" xmlns:a14="http://schemas.microsoft.com/office/drawing/2010/main">
+              <a14:hiddenFill xmlns:a14="http://schemas.microsoft.com/office/drawing/2010/main" xmlns="">
                 <a:solidFill>
                   <a:srgbClr val="FFFFFF"/>
                 </a:solidFill>
               </a14:hiddenFill>
             </a:ext>
             <a:ext uri="{91240B29-F687-4f45-9708-019B960494DF}">
-              <a14:hiddenLine xmlns="" xmlns:a14="http://schemas.microsoft.com/office/drawing/2010/main" w="9525">
+              <a14:hiddenLine xmlns:a14="http://schemas.microsoft.com/office/drawing/2010/main" xmlns="" w="9525">
                 <a:solidFill>
                   <a:srgbClr val="000000"/>
                 </a:solidFill>

</xml_diff>

<commit_message>
fixed slides after recommendation from professor
</commit_message>
<xml_diff>
--- a/labs/lab2/lab2.pptx
+++ b/labs/lab2/lab2.pptx
@@ -5,10 +5,10 @@
     <p:sldMasterId id="2147483648" r:id="rId1"/>
   </p:sldMasterIdLst>
   <p:notesMasterIdLst>
-    <p:notesMasterId r:id="rId23"/>
+    <p:notesMasterId r:id="rId19"/>
   </p:notesMasterIdLst>
   <p:handoutMasterIdLst>
-    <p:handoutMasterId r:id="rId24"/>
+    <p:handoutMasterId r:id="rId20"/>
   </p:handoutMasterIdLst>
   <p:sldIdLst>
     <p:sldId id="274" r:id="rId2"/>
@@ -21,17 +21,13 @@
     <p:sldId id="303" r:id="rId9"/>
     <p:sldId id="304" r:id="rId10"/>
     <p:sldId id="305" r:id="rId11"/>
-    <p:sldId id="306" r:id="rId12"/>
-    <p:sldId id="307" r:id="rId13"/>
-    <p:sldId id="308" r:id="rId14"/>
-    <p:sldId id="309" r:id="rId15"/>
-    <p:sldId id="310" r:id="rId16"/>
-    <p:sldId id="311" r:id="rId17"/>
-    <p:sldId id="312" r:id="rId18"/>
-    <p:sldId id="313" r:id="rId19"/>
-    <p:sldId id="314" r:id="rId20"/>
-    <p:sldId id="315" r:id="rId21"/>
-    <p:sldId id="316" r:id="rId22"/>
+    <p:sldId id="307" r:id="rId12"/>
+    <p:sldId id="308" r:id="rId13"/>
+    <p:sldId id="310" r:id="rId14"/>
+    <p:sldId id="311" r:id="rId15"/>
+    <p:sldId id="313" r:id="rId16"/>
+    <p:sldId id="314" r:id="rId17"/>
+    <p:sldId id="316" r:id="rId18"/>
   </p:sldIdLst>
   <p:sldSz cx="9144000" cy="6858000" type="screen4x3"/>
   <p:notesSz cx="6858000" cy="9144000"/>
@@ -501,7 +497,7 @@
               <ma14:placeholderFlag xmlns:ma14="http://schemas.microsoft.com/office/mac/drawingml/2011/main" val="1"/>
             </a:ext>
             <a:ext uri="{909E8E84-426E-40dd-AFC4-6F175D3DCCD1}">
-              <a14:hiddenFill xmlns:a14="http://schemas.microsoft.com/office/drawing/2010/main" xmlns="">
+              <a14:hiddenFill xmlns="" xmlns:a14="http://schemas.microsoft.com/office/drawing/2010/main">
                 <a:solidFill>
                   <a:srgbClr val="FFFFFF"/>
                 </a:solidFill>
@@ -6620,14 +6616,14 @@
               <ma14:placeholderFlag xmlns:ma14="http://schemas.microsoft.com/office/mac/drawingml/2011/main" val="1"/>
             </a:ext>
             <a:ext uri="{909E8E84-426E-40dd-AFC4-6F175D3DCCD1}">
-              <a14:hiddenFill xmlns:a14="http://schemas.microsoft.com/office/drawing/2010/main" xmlns="">
+              <a14:hiddenFill xmlns="" xmlns:a14="http://schemas.microsoft.com/office/drawing/2010/main">
                 <a:solidFill>
                   <a:srgbClr val="FFFFFF"/>
                 </a:solidFill>
               </a14:hiddenFill>
             </a:ext>
             <a:ext uri="{91240B29-F687-4f45-9708-019B960494DF}">
-              <a14:hiddenLine xmlns:a14="http://schemas.microsoft.com/office/drawing/2010/main" xmlns="" w="9525">
+              <a14:hiddenLine xmlns="" xmlns:a14="http://schemas.microsoft.com/office/drawing/2010/main" w="9525">
                 <a:solidFill>
                   <a:srgbClr val="000000"/>
                 </a:solidFill>
@@ -6702,14 +6698,14 @@
               <ma14:placeholderFlag xmlns:ma14="http://schemas.microsoft.com/office/mac/drawingml/2011/main" val="1"/>
             </a:ext>
             <a:ext uri="{909E8E84-426E-40dd-AFC4-6F175D3DCCD1}">
-              <a14:hiddenFill xmlns:a14="http://schemas.microsoft.com/office/drawing/2010/main" xmlns="">
+              <a14:hiddenFill xmlns="" xmlns:a14="http://schemas.microsoft.com/office/drawing/2010/main">
                 <a:solidFill>
                   <a:srgbClr val="FFFFFF"/>
                 </a:solidFill>
               </a14:hiddenFill>
             </a:ext>
             <a:ext uri="{91240B29-F687-4f45-9708-019B960494DF}">
-              <a14:hiddenLine xmlns:a14="http://schemas.microsoft.com/office/drawing/2010/main" xmlns="" w="9525">
+              <a14:hiddenLine xmlns="" xmlns:a14="http://schemas.microsoft.com/office/drawing/2010/main" w="9525">
                 <a:solidFill>
                   <a:srgbClr val="000000"/>
                 </a:solidFill>
@@ -7549,14 +7545,14 @@
               <ma14:placeholderFlag xmlns:ma14="http://schemas.microsoft.com/office/mac/drawingml/2011/main" val="1"/>
             </a:ext>
             <a:ext uri="{909E8E84-426E-40dd-AFC4-6F175D3DCCD1}">
-              <a14:hiddenFill xmlns:a14="http://schemas.microsoft.com/office/drawing/2010/main" xmlns="">
+              <a14:hiddenFill xmlns="" xmlns:a14="http://schemas.microsoft.com/office/drawing/2010/main">
                 <a:solidFill>
                   <a:srgbClr val="FFFFFF"/>
                 </a:solidFill>
               </a14:hiddenFill>
             </a:ext>
             <a:ext uri="{91240B29-F687-4f45-9708-019B960494DF}">
-              <a14:hiddenLine xmlns:a14="http://schemas.microsoft.com/office/drawing/2010/main" xmlns="" w="9525">
+              <a14:hiddenLine xmlns="" xmlns:a14="http://schemas.microsoft.com/office/drawing/2010/main" w="9525">
                 <a:solidFill>
                   <a:srgbClr val="000000"/>
                 </a:solidFill>
@@ -7763,14 +7759,14 @@
               <ma14:placeholderFlag xmlns:ma14="http://schemas.microsoft.com/office/mac/drawingml/2011/main" val="1"/>
             </a:ext>
             <a:ext uri="{909E8E84-426E-40dd-AFC4-6F175D3DCCD1}">
-              <a14:hiddenFill xmlns:a14="http://schemas.microsoft.com/office/drawing/2010/main" xmlns="">
+              <a14:hiddenFill xmlns="" xmlns:a14="http://schemas.microsoft.com/office/drawing/2010/main">
                 <a:solidFill>
                   <a:srgbClr val="FFFFFF"/>
                 </a:solidFill>
               </a14:hiddenFill>
             </a:ext>
             <a:ext uri="{91240B29-F687-4f45-9708-019B960494DF}">
-              <a14:hiddenLine xmlns:a14="http://schemas.microsoft.com/office/drawing/2010/main" xmlns="" w="9525">
+              <a14:hiddenLine xmlns="" xmlns:a14="http://schemas.microsoft.com/office/drawing/2010/main" w="9525">
                 <a:solidFill>
                   <a:srgbClr val="000000"/>
                 </a:solidFill>
@@ -7977,14 +7973,14 @@
               <ma14:placeholderFlag xmlns:ma14="http://schemas.microsoft.com/office/mac/drawingml/2011/main" val="1"/>
             </a:ext>
             <a:ext uri="{909E8E84-426E-40dd-AFC4-6F175D3DCCD1}">
-              <a14:hiddenFill xmlns:a14="http://schemas.microsoft.com/office/drawing/2010/main" xmlns="">
+              <a14:hiddenFill xmlns="" xmlns:a14="http://schemas.microsoft.com/office/drawing/2010/main">
                 <a:solidFill>
                   <a:srgbClr val="FFFFFF"/>
                 </a:solidFill>
               </a14:hiddenFill>
             </a:ext>
             <a:ext uri="{91240B29-F687-4f45-9708-019B960494DF}">
-              <a14:hiddenLine xmlns:a14="http://schemas.microsoft.com/office/drawing/2010/main" xmlns="" w="9525">
+              <a14:hiddenLine xmlns="" xmlns:a14="http://schemas.microsoft.com/office/drawing/2010/main" w="9525">
                 <a:solidFill>
                   <a:srgbClr val="000000"/>
                 </a:solidFill>
@@ -9206,7 +9202,7 @@
           <a:p>
             <a:r>
               <a:rPr lang="en-US" dirty="0" smtClean="0"/>
-              <a:t>The Code for Insertion</a:t>
+              <a:t>SQL SELECT STATEMENT</a:t>
             </a:r>
             <a:endParaRPr lang="en-US" dirty="0"/>
           </a:p>
@@ -9222,393 +9218,170 @@
             <p:ph idx="1"/>
           </p:nvPr>
         </p:nvSpPr>
-        <p:spPr>
-          <a:xfrm>
-            <a:off x="412750" y="1412776"/>
-            <a:ext cx="7772400" cy="4824536"/>
-          </a:xfrm>
-        </p:spPr>
+        <p:spPr/>
         <p:txBody>
           <a:bodyPr/>
           <a:lstStyle/>
           <a:p>
-            <a:pPr marL="0" lvl="0" indent="0" fontAlgn="auto">
-              <a:spcBef>
-                <a:spcPts val="0"/>
-              </a:spcBef>
-              <a:spcAft>
-                <a:spcPts val="0"/>
-              </a:spcAft>
+            <a:r>
+              <a:rPr lang="en-US" dirty="0" smtClean="0"/>
+              <a:t>Syntax</a:t>
+            </a:r>
+          </a:p>
+          <a:p>
+            <a:pPr marL="457200" lvl="1" indent="0">
               <a:buNone/>
             </a:pPr>
             <a:r>
-              <a:rPr lang="en-US" sz="1400" dirty="0">
+              <a:rPr lang="en-US" sz="1600" dirty="0">
                 <a:latin typeface="Consolas" charset="0"/>
                 <a:ea typeface="Consolas" charset="0"/>
                 <a:cs typeface="Consolas" charset="0"/>
               </a:rPr>
-              <a:t>-- Insert into Customer table </a:t>
-            </a:r>
-            <a:endParaRPr lang="en-US" sz="1400" dirty="0" smtClean="0">
+              <a:t>SELECT column1, column2, ... ,</a:t>
+            </a:r>
+            <a:r>
+              <a:rPr lang="en-US" sz="1600" dirty="0" err="1" smtClean="0">
+                <a:latin typeface="Consolas" charset="0"/>
+                <a:ea typeface="Consolas" charset="0"/>
+                <a:cs typeface="Consolas" charset="0"/>
+              </a:rPr>
+              <a:t>columnN</a:t>
+            </a:r>
+            <a:endParaRPr lang="en-US" sz="1600" dirty="0" smtClean="0">
               <a:latin typeface="Consolas" charset="0"/>
               <a:ea typeface="Consolas" charset="0"/>
               <a:cs typeface="Consolas" charset="0"/>
             </a:endParaRPr>
           </a:p>
           <a:p>
-            <a:pPr marL="0" lvl="0" indent="0" fontAlgn="auto">
-              <a:spcBef>
-                <a:spcPts val="0"/>
-              </a:spcBef>
-              <a:spcAft>
-                <a:spcPts val="0"/>
-              </a:spcAft>
+            <a:pPr marL="457200" lvl="1" indent="0">
               <a:buNone/>
             </a:pPr>
             <a:r>
-              <a:rPr lang="en-US" sz="1400" dirty="0" smtClean="0">
+              <a:rPr lang="en-US" sz="1600" dirty="0" smtClean="0">
                 <a:latin typeface="Consolas" charset="0"/>
                 <a:ea typeface="Consolas" charset="0"/>
                 <a:cs typeface="Consolas" charset="0"/>
               </a:rPr>
-              <a:t>INSERT </a:t>
-            </a:r>
-            <a:r>
-              <a:rPr lang="en-US" sz="1400" dirty="0">
+              <a:t>FROM </a:t>
+            </a:r>
+            <a:r>
+              <a:rPr lang="en-US" sz="1600" dirty="0" err="1">
                 <a:latin typeface="Consolas" charset="0"/>
                 <a:ea typeface="Consolas" charset="0"/>
                 <a:cs typeface="Consolas" charset="0"/>
               </a:rPr>
-              <a:t>INTO Customer(Cust_id, Name, Address, Amount) VALUES (1,'John','Ottawa',8.5</a:t>
-            </a:r>
-            <a:r>
-              <a:rPr lang="en-US" sz="1400" dirty="0" smtClean="0">
+              <a:t>table_name</a:t>
+            </a:r>
+            <a:r>
+              <a:rPr lang="en-US" sz="1600" dirty="0">
                 <a:latin typeface="Consolas" charset="0"/>
                 <a:ea typeface="Consolas" charset="0"/>
                 <a:cs typeface="Consolas" charset="0"/>
               </a:rPr>
-              <a:t>);</a:t>
-            </a:r>
-          </a:p>
-          <a:p>
-            <a:pPr marL="0" lvl="0" indent="0" fontAlgn="auto">
-              <a:spcBef>
-                <a:spcPts val="0"/>
-              </a:spcBef>
-              <a:spcAft>
-                <a:spcPts val="0"/>
-              </a:spcAft>
-              <a:buNone/>
-            </a:pPr>
-            <a:r>
-              <a:rPr lang="en-US" sz="1400" dirty="0" smtClean="0">
-                <a:latin typeface="Consolas" charset="0"/>
-                <a:ea typeface="Consolas" charset="0"/>
-                <a:cs typeface="Consolas" charset="0"/>
-              </a:rPr>
-              <a:t>INSERT </a:t>
-            </a:r>
-            <a:r>
-              <a:rPr lang="en-US" sz="1400" dirty="0">
-                <a:latin typeface="Consolas" charset="0"/>
-                <a:ea typeface="Consolas" charset="0"/>
-                <a:cs typeface="Consolas" charset="0"/>
-              </a:rPr>
-              <a:t>INTO Customer(Cust_id, Name, Address, Amount) VALUES (2, 'Amy', 'Orleans', 9.0); </a:t>
-            </a:r>
-            <a:endParaRPr lang="en-US" sz="1400" dirty="0" smtClean="0">
+              <a:t>; </a:t>
+            </a:r>
+            <a:endParaRPr lang="en-US" sz="1600" dirty="0" smtClean="0">
               <a:latin typeface="Consolas" charset="0"/>
               <a:ea typeface="Consolas" charset="0"/>
               <a:cs typeface="Consolas" charset="0"/>
             </a:endParaRPr>
           </a:p>
           <a:p>
-            <a:pPr marL="0" lvl="0" indent="0" fontAlgn="auto">
-              <a:spcBef>
-                <a:spcPts val="0"/>
-              </a:spcBef>
-              <a:spcAft>
-                <a:spcPts val="0"/>
-              </a:spcAft>
+            <a:pPr marL="457200" lvl="1" indent="0">
               <a:buNone/>
             </a:pPr>
             <a:r>
-              <a:rPr lang="en-US" sz="1400" dirty="0" smtClean="0">
+              <a:rPr lang="en-US" sz="1600" dirty="0" smtClean="0">
                 <a:latin typeface="Consolas" charset="0"/>
                 <a:ea typeface="Consolas" charset="0"/>
                 <a:cs typeface="Consolas" charset="0"/>
               </a:rPr>
-              <a:t>INSERT </a:t>
-            </a:r>
-            <a:r>
-              <a:rPr lang="en-US" sz="1400" dirty="0">
+              <a:t>WHERE </a:t>
+            </a:r>
+            <a:r>
+              <a:rPr lang="en-US" sz="1600" dirty="0">
                 <a:latin typeface="Consolas" charset="0"/>
                 <a:ea typeface="Consolas" charset="0"/>
                 <a:cs typeface="Consolas" charset="0"/>
               </a:rPr>
-              <a:t>INTO Customer(Cust_id, Name, Address, Amount) VALUES (3, 'Peter', 'Gatineau', 6.3); </a:t>
-            </a:r>
-            <a:endParaRPr lang="en-US" sz="1400" dirty="0" smtClean="0">
+              <a:t>condition</a:t>
+            </a:r>
+            <a:r>
+              <a:rPr lang="en-US" sz="1600" dirty="0" smtClean="0">
+                <a:latin typeface="Consolas" charset="0"/>
+                <a:ea typeface="Consolas" charset="0"/>
+                <a:cs typeface="Consolas" charset="0"/>
+              </a:rPr>
+              <a:t>;</a:t>
+            </a:r>
+          </a:p>
+          <a:p>
+            <a:pPr marL="457200" lvl="1" indent="0">
+              <a:buNone/>
+            </a:pPr>
+            <a:endParaRPr lang="en-US" sz="1600" dirty="0" smtClean="0">
               <a:latin typeface="Consolas" charset="0"/>
               <a:ea typeface="Consolas" charset="0"/>
               <a:cs typeface="Consolas" charset="0"/>
             </a:endParaRPr>
           </a:p>
           <a:p>
-            <a:pPr marL="0" lvl="0" indent="0" fontAlgn="auto">
-              <a:spcBef>
-                <a:spcPts val="0"/>
-              </a:spcBef>
-              <a:spcAft>
-                <a:spcPts val="0"/>
-              </a:spcAft>
+            <a:r>
+              <a:rPr lang="en-US" dirty="0" smtClean="0"/>
+              <a:t>Example</a:t>
+            </a:r>
+          </a:p>
+          <a:p>
+            <a:pPr marL="0" indent="0">
               <a:buNone/>
             </a:pPr>
-            <a:endParaRPr lang="en-US" sz="1400" dirty="0">
-              <a:latin typeface="Consolas" charset="0"/>
-              <a:ea typeface="Consolas" charset="0"/>
-              <a:cs typeface="Consolas" charset="0"/>
-            </a:endParaRPr>
-          </a:p>
-          <a:p>
-            <a:pPr marL="0" lvl="0" indent="0" fontAlgn="auto">
-              <a:spcBef>
-                <a:spcPts val="0"/>
-              </a:spcBef>
-              <a:spcAft>
-                <a:spcPts val="0"/>
-              </a:spcAft>
-              <a:buNone/>
-            </a:pPr>
-            <a:r>
-              <a:rPr lang="en-US" sz="1400" dirty="0" smtClean="0">
+            <a:r>
+              <a:rPr lang="en-US" dirty="0" smtClean="0"/>
+              <a:t>    </a:t>
+            </a:r>
+            <a:r>
+              <a:rPr lang="en-US" sz="1600" dirty="0" smtClean="0">
                 <a:latin typeface="Consolas" charset="0"/>
                 <a:ea typeface="Consolas" charset="0"/>
                 <a:cs typeface="Consolas" charset="0"/>
               </a:rPr>
-              <a:t>-- </a:t>
-            </a:r>
-            <a:r>
-              <a:rPr lang="en-US" sz="1400" dirty="0">
+              <a:t>SELECT Style </a:t>
+            </a:r>
+          </a:p>
+          <a:p>
+            <a:pPr marL="0" indent="0">
+              <a:buNone/>
+            </a:pPr>
+            <a:r>
+              <a:rPr lang="en-US" sz="1600" dirty="0" smtClean="0">
                 <a:latin typeface="Consolas" charset="0"/>
                 <a:ea typeface="Consolas" charset="0"/>
                 <a:cs typeface="Consolas" charset="0"/>
               </a:rPr>
-              <a:t>Insert into Artist table </a:t>
-            </a:r>
-            <a:endParaRPr lang="en-US" sz="1400" dirty="0" smtClean="0">
-              <a:latin typeface="Consolas" charset="0"/>
-              <a:ea typeface="Consolas" charset="0"/>
-              <a:cs typeface="Consolas" charset="0"/>
-            </a:endParaRPr>
-          </a:p>
-          <a:p>
-            <a:pPr marL="0" lvl="0" indent="0" fontAlgn="auto">
-              <a:spcBef>
-                <a:spcPts val="0"/>
-              </a:spcBef>
-              <a:spcAft>
-                <a:spcPts val="0"/>
-              </a:spcAft>
+              <a:t>   FROM Artist </a:t>
+            </a:r>
+          </a:p>
+          <a:p>
+            <a:pPr marL="0" indent="0">
               <a:buNone/>
             </a:pPr>
             <a:r>
-              <a:rPr lang="en-US" sz="1400" dirty="0" smtClean="0">
+              <a:rPr lang="en-US" sz="1600" dirty="0" smtClean="0">
                 <a:latin typeface="Consolas" charset="0"/>
                 <a:ea typeface="Consolas" charset="0"/>
                 <a:cs typeface="Consolas" charset="0"/>
               </a:rPr>
-              <a:t>INSERT </a:t>
-            </a:r>
-            <a:r>
-              <a:rPr lang="en-US" sz="1400" dirty="0">
+              <a:t>   WHERE AName='Smith</a:t>
+            </a:r>
+            <a:r>
+              <a:rPr lang="en-US" sz="1600" dirty="0">
                 <a:latin typeface="Consolas" charset="0"/>
                 <a:ea typeface="Consolas" charset="0"/>
                 <a:cs typeface="Consolas" charset="0"/>
               </a:rPr>
-              <a:t>INTO Artist(AName, Birthplace, Style, Age) VALUES ('Caravaggio', 'Milan', 'Baroque', '59</a:t>
-            </a:r>
-            <a:r>
-              <a:rPr lang="en-US" sz="1400" dirty="0" smtClean="0">
-                <a:latin typeface="Consolas" charset="0"/>
-                <a:ea typeface="Consolas" charset="0"/>
-                <a:cs typeface="Consolas" charset="0"/>
-              </a:rPr>
-              <a:t>');</a:t>
-            </a:r>
-          </a:p>
-          <a:p>
-            <a:pPr marL="0" lvl="0" indent="0" fontAlgn="auto">
-              <a:spcBef>
-                <a:spcPts val="0"/>
-              </a:spcBef>
-              <a:spcAft>
-                <a:spcPts val="0"/>
-              </a:spcAft>
-              <a:buNone/>
-            </a:pPr>
-            <a:r>
-              <a:rPr lang="en-US" sz="1400" dirty="0" smtClean="0">
-                <a:latin typeface="Consolas" charset="0"/>
-                <a:ea typeface="Consolas" charset="0"/>
-                <a:cs typeface="Consolas" charset="0"/>
-              </a:rPr>
-              <a:t>INSERT </a:t>
-            </a:r>
-            <a:r>
-              <a:rPr lang="en-US" sz="1400" dirty="0">
-                <a:latin typeface="Consolas" charset="0"/>
-                <a:ea typeface="Consolas" charset="0"/>
-                <a:cs typeface="Consolas" charset="0"/>
-              </a:rPr>
-              <a:t>INTO Artist(AName, Birthplace, Style, Age) VALUES ('Smith', 'Ottawa', 'Modern', '33</a:t>
-            </a:r>
-            <a:r>
-              <a:rPr lang="en-US" sz="1400" dirty="0" smtClean="0">
-                <a:latin typeface="Consolas" charset="0"/>
-                <a:ea typeface="Consolas" charset="0"/>
-                <a:cs typeface="Consolas" charset="0"/>
-              </a:rPr>
-              <a:t>');</a:t>
-            </a:r>
-          </a:p>
-          <a:p>
-            <a:pPr marL="0" lvl="0" indent="0" fontAlgn="auto">
-              <a:spcBef>
-                <a:spcPts val="0"/>
-              </a:spcBef>
-              <a:spcAft>
-                <a:spcPts val="0"/>
-              </a:spcAft>
-              <a:buNone/>
-            </a:pPr>
-            <a:r>
-              <a:rPr lang="en-US" sz="1400" dirty="0" smtClean="0">
-                <a:latin typeface="Consolas" charset="0"/>
-                <a:ea typeface="Consolas" charset="0"/>
-                <a:cs typeface="Consolas" charset="0"/>
-              </a:rPr>
-              <a:t>INSERT </a:t>
-            </a:r>
-            <a:r>
-              <a:rPr lang="en-US" sz="1400" dirty="0">
-                <a:latin typeface="Consolas" charset="0"/>
-                <a:ea typeface="Consolas" charset="0"/>
-                <a:cs typeface="Consolas" charset="0"/>
-              </a:rPr>
-              <a:t>INTO Artist(AName, Birthplace, Style, Age) VALUES ('Picasso', 'Malaga', 'Cubism', '40'); </a:t>
-            </a:r>
-            <a:endParaRPr lang="en-US" sz="1400" dirty="0" smtClean="0">
-              <a:latin typeface="Consolas" charset="0"/>
-              <a:ea typeface="Consolas" charset="0"/>
-              <a:cs typeface="Consolas" charset="0"/>
-            </a:endParaRPr>
-          </a:p>
-          <a:p>
-            <a:pPr marL="0" lvl="0" indent="0" fontAlgn="auto">
-              <a:spcBef>
-                <a:spcPts val="0"/>
-              </a:spcBef>
-              <a:spcAft>
-                <a:spcPts val="0"/>
-              </a:spcAft>
-              <a:buNone/>
-            </a:pPr>
-            <a:endParaRPr lang="en-US" sz="1400" dirty="0">
-              <a:latin typeface="Consolas" charset="0"/>
-              <a:ea typeface="Consolas" charset="0"/>
-              <a:cs typeface="Consolas" charset="0"/>
-            </a:endParaRPr>
-          </a:p>
-          <a:p>
-            <a:pPr marL="0" lvl="0" indent="0" fontAlgn="auto">
-              <a:spcBef>
-                <a:spcPts val="0"/>
-              </a:spcBef>
-              <a:spcAft>
-                <a:spcPts val="0"/>
-              </a:spcAft>
-              <a:buNone/>
-            </a:pPr>
-            <a:r>
-              <a:rPr lang="en-US" sz="1400" dirty="0" smtClean="0">
-                <a:latin typeface="Consolas" charset="0"/>
-                <a:ea typeface="Consolas" charset="0"/>
-                <a:cs typeface="Consolas" charset="0"/>
-              </a:rPr>
-              <a:t>-- </a:t>
-            </a:r>
-            <a:r>
-              <a:rPr lang="en-US" sz="1400" dirty="0">
-                <a:latin typeface="Consolas" charset="0"/>
-                <a:ea typeface="Consolas" charset="0"/>
-                <a:cs typeface="Consolas" charset="0"/>
-              </a:rPr>
-              <a:t>Insert into Artwork table </a:t>
-            </a:r>
-            <a:endParaRPr lang="en-US" sz="1400" dirty="0" smtClean="0">
-              <a:latin typeface="Consolas" charset="0"/>
-              <a:ea typeface="Consolas" charset="0"/>
-              <a:cs typeface="Consolas" charset="0"/>
-            </a:endParaRPr>
-          </a:p>
-          <a:p>
-            <a:pPr marL="0" lvl="0" indent="0" fontAlgn="auto">
-              <a:spcBef>
-                <a:spcPts val="0"/>
-              </a:spcBef>
-              <a:spcAft>
-                <a:spcPts val="0"/>
-              </a:spcAft>
-              <a:buNone/>
-            </a:pPr>
-            <a:r>
-              <a:rPr lang="en-US" sz="1400" dirty="0" smtClean="0">
-                <a:latin typeface="Consolas" charset="0"/>
-                <a:ea typeface="Consolas" charset="0"/>
-                <a:cs typeface="Consolas" charset="0"/>
-              </a:rPr>
-              <a:t>INSERT </a:t>
-            </a:r>
-            <a:r>
-              <a:rPr lang="en-US" sz="1400" dirty="0">
-                <a:latin typeface="Consolas" charset="0"/>
-                <a:ea typeface="Consolas" charset="0"/>
-                <a:cs typeface="Consolas" charset="0"/>
-              </a:rPr>
-              <a:t>INTO Artwork(Title, Year, Type, Price, AName) VALUES ('Blue', 2000, 'Modern', 10000.00, 'Smith'); </a:t>
-            </a:r>
-            <a:endParaRPr lang="en-US" sz="1400" dirty="0" smtClean="0">
-              <a:latin typeface="Consolas" charset="0"/>
-              <a:ea typeface="Consolas" charset="0"/>
-              <a:cs typeface="Consolas" charset="0"/>
-            </a:endParaRPr>
-          </a:p>
-          <a:p>
-            <a:pPr marL="0" lvl="0" indent="0" fontAlgn="auto">
-              <a:spcBef>
-                <a:spcPts val="0"/>
-              </a:spcBef>
-              <a:spcAft>
-                <a:spcPts val="0"/>
-              </a:spcAft>
-              <a:buNone/>
-            </a:pPr>
-            <a:r>
-              <a:rPr lang="en-US" sz="1400" dirty="0" smtClean="0">
-                <a:latin typeface="Consolas" charset="0"/>
-                <a:ea typeface="Consolas" charset="0"/>
-                <a:cs typeface="Consolas" charset="0"/>
-              </a:rPr>
-              <a:t>INSERT </a:t>
-            </a:r>
-            <a:r>
-              <a:rPr lang="en-US" sz="1400" dirty="0">
-                <a:latin typeface="Consolas" charset="0"/>
-                <a:ea typeface="Consolas" charset="0"/>
-                <a:cs typeface="Consolas" charset="0"/>
-              </a:rPr>
-              <a:t>INTO Artwork(Title, Year, Type, Price, AName) VALUES ('The Cardsharps', 1594, 'Baroque', 40000.00, 'Caravaggio');</a:t>
+              <a:t>';</a:t>
             </a:r>
           </a:p>
         </p:txBody>
@@ -9616,7 +9389,7 @@
     </p:spTree>
     <p:extLst>
       <p:ext uri="{BB962C8B-B14F-4D97-AF65-F5344CB8AC3E}">
-        <p14:creationId xmlns:p14="http://schemas.microsoft.com/office/powerpoint/2010/main" val="460898955"/>
+        <p14:creationId xmlns:p14="http://schemas.microsoft.com/office/powerpoint/2010/main" val="1832425084"/>
       </p:ext>
     </p:extLst>
   </p:cSld>
@@ -9667,7 +9440,7 @@
           <a:p>
             <a:r>
               <a:rPr lang="en-US" dirty="0" smtClean="0"/>
-              <a:t>SQL SELECT STATEMENT</a:t>
+              <a:t>Exercise: Create the following Queries</a:t>
             </a:r>
             <a:endParaRPr lang="en-US" dirty="0"/>
           </a:p>
@@ -9690,171 +9463,22 @@
           <a:p>
             <a:r>
               <a:rPr lang="en-US" dirty="0" smtClean="0"/>
-              <a:t>Syntax</a:t>
-            </a:r>
-          </a:p>
-          <a:p>
-            <a:pPr marL="457200" lvl="1" indent="0">
-              <a:buNone/>
-            </a:pPr>
-            <a:r>
-              <a:rPr lang="en-US" sz="1600" dirty="0">
-                <a:latin typeface="Consolas" charset="0"/>
-                <a:ea typeface="Consolas" charset="0"/>
-                <a:cs typeface="Consolas" charset="0"/>
-              </a:rPr>
-              <a:t>SELECT column1, column2, ... ,</a:t>
-            </a:r>
-            <a:r>
-              <a:rPr lang="en-US" sz="1600" dirty="0" err="1" smtClean="0">
-                <a:latin typeface="Consolas" charset="0"/>
-                <a:ea typeface="Consolas" charset="0"/>
-                <a:cs typeface="Consolas" charset="0"/>
-              </a:rPr>
-              <a:t>columnN</a:t>
-            </a:r>
-            <a:endParaRPr lang="en-US" sz="1600" dirty="0" smtClean="0">
-              <a:latin typeface="Consolas" charset="0"/>
-              <a:ea typeface="Consolas" charset="0"/>
-              <a:cs typeface="Consolas" charset="0"/>
-            </a:endParaRPr>
-          </a:p>
-          <a:p>
-            <a:pPr marL="457200" lvl="1" indent="0">
-              <a:buNone/>
-            </a:pPr>
-            <a:r>
-              <a:rPr lang="en-US" sz="1600" dirty="0" smtClean="0">
-                <a:latin typeface="Consolas" charset="0"/>
-                <a:ea typeface="Consolas" charset="0"/>
-                <a:cs typeface="Consolas" charset="0"/>
-              </a:rPr>
-              <a:t>FROM </a:t>
-            </a:r>
-            <a:r>
-              <a:rPr lang="en-US" sz="1600" dirty="0" err="1">
-                <a:latin typeface="Consolas" charset="0"/>
-                <a:ea typeface="Consolas" charset="0"/>
-                <a:cs typeface="Consolas" charset="0"/>
-              </a:rPr>
-              <a:t>table_name</a:t>
-            </a:r>
-            <a:r>
-              <a:rPr lang="en-US" sz="1600" dirty="0">
-                <a:latin typeface="Consolas" charset="0"/>
-                <a:ea typeface="Consolas" charset="0"/>
-                <a:cs typeface="Consolas" charset="0"/>
-              </a:rPr>
-              <a:t>; </a:t>
-            </a:r>
-            <a:endParaRPr lang="en-US" sz="1600" dirty="0" smtClean="0">
-              <a:latin typeface="Consolas" charset="0"/>
-              <a:ea typeface="Consolas" charset="0"/>
-              <a:cs typeface="Consolas" charset="0"/>
-            </a:endParaRPr>
-          </a:p>
-          <a:p>
-            <a:pPr marL="457200" lvl="1" indent="0">
-              <a:buNone/>
-            </a:pPr>
-            <a:r>
-              <a:rPr lang="en-US" sz="1600" dirty="0" smtClean="0">
-                <a:latin typeface="Consolas" charset="0"/>
-                <a:ea typeface="Consolas" charset="0"/>
-                <a:cs typeface="Consolas" charset="0"/>
-              </a:rPr>
-              <a:t>WHERE </a:t>
-            </a:r>
-            <a:r>
-              <a:rPr lang="en-US" sz="1600" dirty="0">
-                <a:latin typeface="Consolas" charset="0"/>
-                <a:ea typeface="Consolas" charset="0"/>
-                <a:cs typeface="Consolas" charset="0"/>
-              </a:rPr>
-              <a:t>condition</a:t>
-            </a:r>
-            <a:r>
-              <a:rPr lang="en-US" sz="1600" dirty="0" smtClean="0">
-                <a:latin typeface="Consolas" charset="0"/>
-                <a:ea typeface="Consolas" charset="0"/>
-                <a:cs typeface="Consolas" charset="0"/>
-              </a:rPr>
-              <a:t>;</a:t>
-            </a:r>
-          </a:p>
-          <a:p>
-            <a:pPr marL="457200" lvl="1" indent="0">
-              <a:buNone/>
-            </a:pPr>
-            <a:endParaRPr lang="en-US" sz="1600" dirty="0" smtClean="0">
-              <a:latin typeface="Consolas" charset="0"/>
-              <a:ea typeface="Consolas" charset="0"/>
-              <a:cs typeface="Consolas" charset="0"/>
-            </a:endParaRPr>
+              <a:t>List all artists that are born in Ottawa</a:t>
+            </a:r>
           </a:p>
           <a:p>
             <a:r>
               <a:rPr lang="en-US" dirty="0" smtClean="0"/>
-              <a:t>Example</a:t>
-            </a:r>
-          </a:p>
-          <a:p>
-            <a:pPr marL="0" indent="0">
-              <a:buNone/>
-            </a:pPr>
-            <a:r>
-              <a:rPr lang="en-US" dirty="0" smtClean="0"/>
-              <a:t>    </a:t>
-            </a:r>
-            <a:r>
-              <a:rPr lang="en-US" sz="1600" dirty="0" smtClean="0">
-                <a:latin typeface="Consolas" charset="0"/>
-                <a:ea typeface="Consolas" charset="0"/>
-                <a:cs typeface="Consolas" charset="0"/>
-              </a:rPr>
-              <a:t>SELECT Style </a:t>
-            </a:r>
-          </a:p>
-          <a:p>
-            <a:pPr marL="0" indent="0">
-              <a:buNone/>
-            </a:pPr>
-            <a:r>
-              <a:rPr lang="en-US" sz="1600" dirty="0" smtClean="0">
-                <a:latin typeface="Consolas" charset="0"/>
-                <a:ea typeface="Consolas" charset="0"/>
-                <a:cs typeface="Consolas" charset="0"/>
-              </a:rPr>
-              <a:t>   FROM Artist </a:t>
-            </a:r>
-          </a:p>
-          <a:p>
-            <a:pPr marL="0" indent="0">
-              <a:buNone/>
-            </a:pPr>
-            <a:r>
-              <a:rPr lang="en-US" sz="1600" dirty="0" smtClean="0">
-                <a:latin typeface="Consolas" charset="0"/>
-                <a:ea typeface="Consolas" charset="0"/>
-                <a:cs typeface="Consolas" charset="0"/>
-              </a:rPr>
-              <a:t>   WHERE AName='Smith</a:t>
-            </a:r>
-            <a:r>
-              <a:rPr lang="en-US" sz="1600" dirty="0">
-                <a:latin typeface="Consolas" charset="0"/>
-                <a:ea typeface="Consolas" charset="0"/>
-                <a:cs typeface="Consolas" charset="0"/>
-              </a:rPr>
-              <a:t>';</a:t>
-            </a:r>
+              <a:t>List the titles and prices of all artworks painted in 2000.</a:t>
+            </a:r>
+            <a:endParaRPr lang="en-US" dirty="0"/>
           </a:p>
         </p:txBody>
       </p:sp>
     </p:spTree>
     <p:extLst>
       <p:ext uri="{BB962C8B-B14F-4D97-AF65-F5344CB8AC3E}">
-        <p14:creationId xmlns:p14="http://schemas.microsoft.com/office/powerpoint/2010/main" val="1832425084"/>
+        <p14:creationId xmlns:p14="http://schemas.microsoft.com/office/powerpoint/2010/main" val="1622420095"/>
       </p:ext>
     </p:extLst>
   </p:cSld>
@@ -9905,7 +9529,7 @@
           <a:p>
             <a:r>
               <a:rPr lang="en-US" dirty="0" smtClean="0"/>
-              <a:t>Exercise: Create the following Queries</a:t>
+              <a:t>SQL UPDATE Statement</a:t>
             </a:r>
             <a:endParaRPr lang="en-US" dirty="0"/>
           </a:p>
@@ -9921,29 +9545,246 @@
             <p:ph idx="1"/>
           </p:nvPr>
         </p:nvSpPr>
-        <p:spPr/>
+        <p:spPr>
+          <a:xfrm>
+            <a:off x="395536" y="1700808"/>
+            <a:ext cx="7772400" cy="4320480"/>
+          </a:xfrm>
+        </p:spPr>
         <p:txBody>
           <a:bodyPr/>
           <a:lstStyle/>
           <a:p>
             <a:r>
-              <a:rPr lang="en-US" dirty="0" smtClean="0"/>
-              <a:t>List all artists that are born in Ottawa</a:t>
-            </a:r>
-          </a:p>
-          <a:p>
-            <a:r>
-              <a:rPr lang="en-US" dirty="0" smtClean="0"/>
-              <a:t>List the titles and prices of all artworks painted in 2000.</a:t>
-            </a:r>
-            <a:endParaRPr lang="en-US" dirty="0"/>
+              <a:rPr lang="en-US" dirty="0" smtClean="0">
+                <a:latin typeface="Times" charset="0"/>
+                <a:ea typeface="Times" charset="0"/>
+                <a:cs typeface="Times" charset="0"/>
+              </a:rPr>
+              <a:t>We can also modify certain data satisfying a condition from a table with UPDATE command. Condition is the same as WHERE clause of SELECT query. If you omit the WHERE clause, </a:t>
+            </a:r>
+            <a:r>
+              <a:rPr lang="en-US" b="1" u="sng" dirty="0" smtClean="0">
+                <a:latin typeface="Times" charset="0"/>
+                <a:ea typeface="Times" charset="0"/>
+                <a:cs typeface="Times" charset="0"/>
+              </a:rPr>
+              <a:t>all records will be updated permanently</a:t>
+            </a:r>
+            <a:r>
+              <a:rPr lang="en-US" dirty="0" smtClean="0">
+                <a:latin typeface="Times" charset="0"/>
+                <a:ea typeface="Times" charset="0"/>
+                <a:cs typeface="Times" charset="0"/>
+              </a:rPr>
+              <a:t>.</a:t>
+            </a:r>
+          </a:p>
+          <a:p>
+            <a:r>
+              <a:rPr lang="en-US" dirty="0" smtClean="0">
+                <a:latin typeface="Times" charset="0"/>
+                <a:ea typeface="Times" charset="0"/>
+                <a:cs typeface="Times" charset="0"/>
+              </a:rPr>
+              <a:t>Syntax</a:t>
+            </a:r>
+          </a:p>
+          <a:p>
+            <a:pPr marL="400050" lvl="1" indent="0">
+              <a:buNone/>
+            </a:pPr>
+            <a:r>
+              <a:rPr lang="en-US" sz="1600" dirty="0" smtClean="0">
+                <a:latin typeface="Consolas" charset="0"/>
+                <a:ea typeface="Consolas" charset="0"/>
+                <a:cs typeface="Consolas" charset="0"/>
+              </a:rPr>
+              <a:t>UPDATE </a:t>
+            </a:r>
+            <a:r>
+              <a:rPr lang="en-US" sz="1600" dirty="0" err="1">
+                <a:latin typeface="Consolas" charset="0"/>
+                <a:ea typeface="Consolas" charset="0"/>
+                <a:cs typeface="Consolas" charset="0"/>
+              </a:rPr>
+              <a:t>table_name</a:t>
+            </a:r>
+            <a:r>
+              <a:rPr lang="en-US" sz="1600" dirty="0">
+                <a:latin typeface="Consolas" charset="0"/>
+                <a:ea typeface="Consolas" charset="0"/>
+                <a:cs typeface="Consolas" charset="0"/>
+              </a:rPr>
+              <a:t> </a:t>
+            </a:r>
+            <a:endParaRPr lang="en-US" sz="1600" dirty="0" smtClean="0">
+              <a:latin typeface="Consolas" charset="0"/>
+              <a:ea typeface="Consolas" charset="0"/>
+              <a:cs typeface="Consolas" charset="0"/>
+            </a:endParaRPr>
+          </a:p>
+          <a:p>
+            <a:pPr marL="400050" lvl="1" indent="0">
+              <a:buNone/>
+            </a:pPr>
+            <a:r>
+              <a:rPr lang="en-US" sz="1600" dirty="0" smtClean="0">
+                <a:latin typeface="Consolas" charset="0"/>
+                <a:ea typeface="Consolas" charset="0"/>
+                <a:cs typeface="Consolas" charset="0"/>
+              </a:rPr>
+              <a:t>SET </a:t>
+            </a:r>
+            <a:r>
+              <a:rPr lang="en-US" sz="1600" dirty="0">
+                <a:latin typeface="Consolas" charset="0"/>
+                <a:ea typeface="Consolas" charset="0"/>
+                <a:cs typeface="Consolas" charset="0"/>
+              </a:rPr>
+              <a:t>column1 = value1, column2 = value2, ... , </a:t>
+            </a:r>
+            <a:r>
+              <a:rPr lang="en-US" sz="1600" dirty="0" err="1">
+                <a:latin typeface="Consolas" charset="0"/>
+                <a:ea typeface="Consolas" charset="0"/>
+                <a:cs typeface="Consolas" charset="0"/>
+              </a:rPr>
+              <a:t>columnN</a:t>
+            </a:r>
+            <a:r>
+              <a:rPr lang="en-US" sz="1600" dirty="0">
+                <a:latin typeface="Consolas" charset="0"/>
+                <a:ea typeface="Consolas" charset="0"/>
+                <a:cs typeface="Consolas" charset="0"/>
+              </a:rPr>
+              <a:t> = </a:t>
+            </a:r>
+            <a:r>
+              <a:rPr lang="en-US" sz="1600" dirty="0" err="1">
+                <a:latin typeface="Consolas" charset="0"/>
+                <a:ea typeface="Consolas" charset="0"/>
+                <a:cs typeface="Consolas" charset="0"/>
+              </a:rPr>
+              <a:t>valueN</a:t>
+            </a:r>
+            <a:r>
+              <a:rPr lang="en-US" sz="1600" dirty="0">
+                <a:latin typeface="Consolas" charset="0"/>
+                <a:ea typeface="Consolas" charset="0"/>
+                <a:cs typeface="Consolas" charset="0"/>
+              </a:rPr>
+              <a:t> </a:t>
+            </a:r>
+            <a:endParaRPr lang="en-US" sz="1600" dirty="0" smtClean="0">
+              <a:latin typeface="Consolas" charset="0"/>
+              <a:ea typeface="Consolas" charset="0"/>
+              <a:cs typeface="Consolas" charset="0"/>
+            </a:endParaRPr>
+          </a:p>
+          <a:p>
+            <a:pPr marL="400050" lvl="1" indent="0">
+              <a:buNone/>
+            </a:pPr>
+            <a:r>
+              <a:rPr lang="en-US" sz="1600" dirty="0" smtClean="0">
+                <a:latin typeface="Consolas" charset="0"/>
+                <a:ea typeface="Consolas" charset="0"/>
+                <a:cs typeface="Consolas" charset="0"/>
+              </a:rPr>
+              <a:t>WHERE </a:t>
+            </a:r>
+            <a:r>
+              <a:rPr lang="en-US" sz="1600" dirty="0">
+                <a:latin typeface="Consolas" charset="0"/>
+                <a:ea typeface="Consolas" charset="0"/>
+                <a:cs typeface="Consolas" charset="0"/>
+              </a:rPr>
+              <a:t>condition</a:t>
+            </a:r>
+            <a:r>
+              <a:rPr lang="en-US" sz="1600" dirty="0" smtClean="0">
+                <a:latin typeface="Consolas" charset="0"/>
+                <a:ea typeface="Consolas" charset="0"/>
+                <a:cs typeface="Consolas" charset="0"/>
+              </a:rPr>
+              <a:t>;</a:t>
+            </a:r>
+          </a:p>
+          <a:p>
+            <a:pPr marL="285750"/>
+            <a:r>
+              <a:rPr lang="en-US" dirty="0" smtClean="0">
+                <a:latin typeface="Times" charset="0"/>
+                <a:ea typeface="Times" charset="0"/>
+                <a:cs typeface="Times" charset="0"/>
+              </a:rPr>
+              <a:t>Example</a:t>
+            </a:r>
+          </a:p>
+          <a:p>
+            <a:pPr marL="400050" lvl="1" indent="0">
+              <a:buNone/>
+            </a:pPr>
+            <a:r>
+              <a:rPr lang="en-US" sz="1600" dirty="0" smtClean="0">
+                <a:latin typeface="Consolas" charset="0"/>
+                <a:ea typeface="Consolas" charset="0"/>
+                <a:cs typeface="Consolas" charset="0"/>
+              </a:rPr>
+              <a:t>UPDATE Customer</a:t>
+            </a:r>
+          </a:p>
+          <a:p>
+            <a:pPr marL="400050" lvl="1" indent="0">
+              <a:buNone/>
+            </a:pPr>
+            <a:r>
+              <a:rPr lang="en-US" sz="1600" dirty="0" smtClean="0">
+                <a:latin typeface="Consolas" charset="0"/>
+                <a:ea typeface="Consolas" charset="0"/>
+                <a:cs typeface="Consolas" charset="0"/>
+              </a:rPr>
+              <a:t>SET Name ='Bruce</a:t>
+            </a:r>
+            <a:r>
+              <a:rPr lang="en-US" sz="1600" dirty="0">
+                <a:latin typeface="Consolas" charset="0"/>
+                <a:ea typeface="Consolas" charset="0"/>
+                <a:cs typeface="Consolas" charset="0"/>
+              </a:rPr>
+              <a:t>'</a:t>
+            </a:r>
+            <a:endParaRPr lang="en-US" sz="1600" dirty="0" smtClean="0">
+              <a:latin typeface="Consolas" charset="0"/>
+              <a:ea typeface="Consolas" charset="0"/>
+              <a:cs typeface="Consolas" charset="0"/>
+            </a:endParaRPr>
+          </a:p>
+          <a:p>
+            <a:pPr marL="400050" lvl="1" indent="0">
+              <a:buNone/>
+            </a:pPr>
+            <a:r>
+              <a:rPr lang="en-US" sz="1600" dirty="0" smtClean="0">
+                <a:latin typeface="Consolas" charset="0"/>
+                <a:ea typeface="Consolas" charset="0"/>
+                <a:cs typeface="Consolas" charset="0"/>
+              </a:rPr>
+              <a:t>WHERE Cust_id = 1;</a:t>
+            </a:r>
+            <a:endParaRPr lang="en-US" sz="1600" dirty="0">
+              <a:latin typeface="Consolas" charset="0"/>
+              <a:ea typeface="Consolas" charset="0"/>
+              <a:cs typeface="Consolas" charset="0"/>
+            </a:endParaRPr>
           </a:p>
         </p:txBody>
       </p:sp>
     </p:spTree>
     <p:extLst>
       <p:ext uri="{BB962C8B-B14F-4D97-AF65-F5344CB8AC3E}">
-        <p14:creationId xmlns:p14="http://schemas.microsoft.com/office/powerpoint/2010/main" val="1622420095"/>
+        <p14:creationId xmlns:p14="http://schemas.microsoft.com/office/powerpoint/2010/main" val="730531947"/>
       </p:ext>
     </p:extLst>
   </p:cSld>
@@ -9994,12 +9835,9 @@
           <a:p>
             <a:r>
               <a:rPr lang="en-US" dirty="0" smtClean="0"/>
-              <a:t>Answer: </a:t>
-            </a:r>
-            <a:r>
-              <a:rPr lang="en-US" dirty="0"/>
-              <a:t>Create the following Queries</a:t>
-            </a:r>
+              <a:t>Exercise: Update the Following Data</a:t>
+            </a:r>
+            <a:endParaRPr lang="en-US" dirty="0"/>
           </a:p>
         </p:txBody>
       </p:sp>
@@ -10013,187 +9851,46 @@
             <p:ph idx="1"/>
           </p:nvPr>
         </p:nvSpPr>
-        <p:spPr/>
+        <p:spPr>
+          <a:xfrm>
+            <a:off x="414982" y="1700808"/>
+            <a:ext cx="7772400" cy="3753544"/>
+          </a:xfrm>
+        </p:spPr>
         <p:txBody>
           <a:bodyPr/>
           <a:lstStyle/>
           <a:p>
             <a:r>
-              <a:rPr lang="en-US" dirty="0"/>
-              <a:t>List all artists that are born in </a:t>
-            </a:r>
-            <a:r>
-              <a:rPr lang="en-US" dirty="0" smtClean="0"/>
-              <a:t>Ottawa</a:t>
-            </a:r>
-          </a:p>
-          <a:p>
-            <a:pPr marL="400050" lvl="1" indent="0">
-              <a:buNone/>
-            </a:pPr>
-            <a:r>
-              <a:rPr lang="en-US" sz="1600" dirty="0">
-                <a:latin typeface="Consolas" charset="0"/>
-                <a:ea typeface="Consolas" charset="0"/>
-                <a:cs typeface="Consolas" charset="0"/>
-              </a:rPr>
-              <a:t>SELECT * </a:t>
-            </a:r>
-            <a:endParaRPr lang="en-US" sz="1600" dirty="0" smtClean="0">
-              <a:latin typeface="Consolas" charset="0"/>
-              <a:ea typeface="Consolas" charset="0"/>
-              <a:cs typeface="Consolas" charset="0"/>
+              <a:rPr lang="en-US" dirty="0" smtClean="0">
+                <a:latin typeface="Times" charset="0"/>
+                <a:ea typeface="Times" charset="0"/>
+                <a:cs typeface="Times" charset="0"/>
+              </a:rPr>
+              <a:t>Update Customer Name John to Bruce.</a:t>
+            </a:r>
+          </a:p>
+          <a:p>
+            <a:r>
+              <a:rPr lang="en-US" dirty="0" smtClean="0">
+                <a:latin typeface="Times" charset="0"/>
+                <a:ea typeface="Times" charset="0"/>
+                <a:cs typeface="Times" charset="0"/>
+              </a:rPr>
+              <a:t>Update the Amount value for all the Customers in the Database to be 9.8 and the address to be Gatineau.</a:t>
+            </a:r>
+            <a:endParaRPr lang="en-US" dirty="0">
+              <a:latin typeface="Times" charset="0"/>
+              <a:ea typeface="Times" charset="0"/>
+              <a:cs typeface="Times" charset="0"/>
             </a:endParaRPr>
-          </a:p>
-          <a:p>
-            <a:pPr marL="400050" lvl="1" indent="0">
-              <a:buNone/>
-            </a:pPr>
-            <a:r>
-              <a:rPr lang="en-US" sz="1600" dirty="0" smtClean="0">
-                <a:latin typeface="Consolas" charset="0"/>
-                <a:ea typeface="Consolas" charset="0"/>
-                <a:cs typeface="Consolas" charset="0"/>
-              </a:rPr>
-              <a:t>FROM </a:t>
-            </a:r>
-            <a:r>
-              <a:rPr lang="en-US" sz="1600" dirty="0">
-                <a:latin typeface="Consolas" charset="0"/>
-                <a:ea typeface="Consolas" charset="0"/>
-                <a:cs typeface="Consolas" charset="0"/>
-              </a:rPr>
-              <a:t>Artist </a:t>
-            </a:r>
-            <a:endParaRPr lang="en-US" sz="1600" dirty="0" smtClean="0">
-              <a:latin typeface="Consolas" charset="0"/>
-              <a:ea typeface="Consolas" charset="0"/>
-              <a:cs typeface="Consolas" charset="0"/>
-            </a:endParaRPr>
-          </a:p>
-          <a:p>
-            <a:pPr marL="400050" lvl="1" indent="0">
-              <a:buNone/>
-            </a:pPr>
-            <a:r>
-              <a:rPr lang="en-US" sz="1600" dirty="0" smtClean="0">
-                <a:latin typeface="Consolas" charset="0"/>
-                <a:ea typeface="Consolas" charset="0"/>
-                <a:cs typeface="Consolas" charset="0"/>
-              </a:rPr>
-              <a:t>WHERE </a:t>
-            </a:r>
-            <a:r>
-              <a:rPr lang="en-US" sz="1600" dirty="0">
-                <a:latin typeface="Consolas" charset="0"/>
-                <a:ea typeface="Consolas" charset="0"/>
-                <a:cs typeface="Consolas" charset="0"/>
-              </a:rPr>
-              <a:t>Birthplace='Ottawa</a:t>
-            </a:r>
-            <a:r>
-              <a:rPr lang="en-US" sz="1600" dirty="0" smtClean="0">
-                <a:latin typeface="Consolas" charset="0"/>
-                <a:ea typeface="Consolas" charset="0"/>
-                <a:cs typeface="Consolas" charset="0"/>
-              </a:rPr>
-              <a:t>';</a:t>
-            </a:r>
-          </a:p>
-          <a:p>
-            <a:pPr marL="400050" lvl="1" indent="0">
-              <a:buNone/>
-            </a:pPr>
-            <a:endParaRPr lang="en-US" sz="1600" dirty="0">
-              <a:latin typeface="Consolas" charset="0"/>
-              <a:ea typeface="Consolas" charset="0"/>
-              <a:cs typeface="Consolas" charset="0"/>
-            </a:endParaRPr>
-          </a:p>
-          <a:p>
-            <a:r>
-              <a:rPr lang="en-US" dirty="0"/>
-              <a:t>List the titles and prices of all artworks painted in 2000</a:t>
-            </a:r>
-            <a:r>
-              <a:rPr lang="en-US" dirty="0" smtClean="0"/>
-              <a:t>.</a:t>
-            </a:r>
-          </a:p>
-          <a:p>
-            <a:pPr marL="400050" lvl="1" indent="0">
-              <a:buNone/>
-            </a:pPr>
-            <a:r>
-              <a:rPr lang="en-US" sz="1600" dirty="0">
-                <a:latin typeface="Consolas" charset="0"/>
-                <a:ea typeface="Consolas" charset="0"/>
-                <a:cs typeface="Consolas" charset="0"/>
-              </a:rPr>
-              <a:t>SELECT Title, Price </a:t>
-            </a:r>
-            <a:endParaRPr lang="en-US" sz="1600" dirty="0" smtClean="0">
-              <a:latin typeface="Consolas" charset="0"/>
-              <a:ea typeface="Consolas" charset="0"/>
-              <a:cs typeface="Consolas" charset="0"/>
-            </a:endParaRPr>
-          </a:p>
-          <a:p>
-            <a:pPr marL="400050" lvl="1" indent="0">
-              <a:buNone/>
-            </a:pPr>
-            <a:r>
-              <a:rPr lang="en-US" sz="1600" dirty="0" smtClean="0">
-                <a:latin typeface="Consolas" charset="0"/>
-                <a:ea typeface="Consolas" charset="0"/>
-                <a:cs typeface="Consolas" charset="0"/>
-              </a:rPr>
-              <a:t>FROM </a:t>
-            </a:r>
-            <a:r>
-              <a:rPr lang="en-US" sz="1600" dirty="0">
-                <a:latin typeface="Consolas" charset="0"/>
-                <a:ea typeface="Consolas" charset="0"/>
-                <a:cs typeface="Consolas" charset="0"/>
-              </a:rPr>
-              <a:t>Artwork </a:t>
-            </a:r>
-            <a:endParaRPr lang="en-US" sz="1600" dirty="0" smtClean="0">
-              <a:latin typeface="Consolas" charset="0"/>
-              <a:ea typeface="Consolas" charset="0"/>
-              <a:cs typeface="Consolas" charset="0"/>
-            </a:endParaRPr>
-          </a:p>
-          <a:p>
-            <a:pPr marL="400050" lvl="1" indent="0">
-              <a:buNone/>
-            </a:pPr>
-            <a:r>
-              <a:rPr lang="en-US" sz="1600" dirty="0" smtClean="0">
-                <a:latin typeface="Consolas" charset="0"/>
-                <a:ea typeface="Consolas" charset="0"/>
-                <a:cs typeface="Consolas" charset="0"/>
-              </a:rPr>
-              <a:t>WHERE </a:t>
-            </a:r>
-            <a:r>
-              <a:rPr lang="en-US" sz="1600" dirty="0">
-                <a:latin typeface="Consolas" charset="0"/>
-                <a:ea typeface="Consolas" charset="0"/>
-                <a:cs typeface="Consolas" charset="0"/>
-              </a:rPr>
-              <a:t>Year=2000;</a:t>
-            </a:r>
-          </a:p>
-          <a:p>
-            <a:endParaRPr lang="en-US" dirty="0"/>
           </a:p>
         </p:txBody>
       </p:sp>
     </p:spTree>
     <p:extLst>
       <p:ext uri="{BB962C8B-B14F-4D97-AF65-F5344CB8AC3E}">
-        <p14:creationId xmlns:p14="http://schemas.microsoft.com/office/powerpoint/2010/main" val="931247984"/>
+        <p14:creationId xmlns:p14="http://schemas.microsoft.com/office/powerpoint/2010/main" val="71527928"/>
       </p:ext>
     </p:extLst>
   </p:cSld>
@@ -10244,7 +9941,7 @@
           <a:p>
             <a:r>
               <a:rPr lang="en-US" dirty="0" smtClean="0"/>
-              <a:t>SQL UPDATE Statement</a:t>
+              <a:t>SQL DELETE STATEMENT</a:t>
             </a:r>
             <a:endParaRPr lang="en-US" dirty="0"/>
           </a:p>
@@ -10260,12 +9957,7 @@
             <p:ph idx="1"/>
           </p:nvPr>
         </p:nvSpPr>
-        <p:spPr>
-          <a:xfrm>
-            <a:off x="395536" y="1700808"/>
-            <a:ext cx="7772400" cy="4320480"/>
-          </a:xfrm>
-        </p:spPr>
+        <p:spPr/>
         <p:txBody>
           <a:bodyPr/>
           <a:lstStyle/>
@@ -10276,7 +9968,7 @@
                 <a:ea typeface="Times" charset="0"/>
                 <a:cs typeface="Times" charset="0"/>
               </a:rPr>
-              <a:t>We can also modify certain data satisfying a condition from a table with UPDATE command. Condition is the same as WHERE clause of SELECT query. If you omit the WHERE clause, </a:t>
+              <a:t>We can delete certain rows satisfying a condition from a table with DELETE command. Condition is the same as WHERE clause of SELECT query. If you omit the WHERE clause, </a:t>
             </a:r>
             <a:r>
               <a:rPr lang="en-US" b="1" u="sng" dirty="0" smtClean="0">
@@ -10284,7 +9976,7 @@
                 <a:ea typeface="Times" charset="0"/>
                 <a:cs typeface="Times" charset="0"/>
               </a:rPr>
-              <a:t>all records will be updated permanently</a:t>
+              <a:t>all records will be deleted permanently</a:t>
             </a:r>
             <a:r>
               <a:rPr lang="en-US" dirty="0" smtClean="0">
@@ -10310,12 +10002,12 @@
               <a:buNone/>
             </a:pPr>
             <a:r>
-              <a:rPr lang="en-US" sz="1600" dirty="0" smtClean="0">
+              <a:rPr lang="en-US" sz="1600" dirty="0">
                 <a:latin typeface="Consolas" charset="0"/>
                 <a:ea typeface="Consolas" charset="0"/>
                 <a:cs typeface="Consolas" charset="0"/>
               </a:rPr>
-              <a:t>UPDATE </a:t>
+              <a:t>DELETE FROM </a:t>
             </a:r>
             <a:r>
               <a:rPr lang="en-US" sz="1600" dirty="0" err="1">
@@ -10349,7 +10041,7 @@
                 <a:ea typeface="Consolas" charset="0"/>
                 <a:cs typeface="Consolas" charset="0"/>
               </a:rPr>
-              <a:t>SET </a:t>
+              <a:t>WHERE </a:t>
             </a:r>
             <a:r>
               <a:rPr lang="en-US" sz="1600" dirty="0">
@@ -10357,84 +10049,38 @@
                 <a:ea typeface="Consolas" charset="0"/>
                 <a:cs typeface="Consolas" charset="0"/>
               </a:rPr>
-              <a:t>column1 = value1, column2 = value2, ... , </a:t>
-            </a:r>
-            <a:r>
-              <a:rPr lang="en-US" sz="1600" dirty="0" err="1">
-                <a:latin typeface="Consolas" charset="0"/>
-                <a:ea typeface="Consolas" charset="0"/>
-                <a:cs typeface="Consolas" charset="0"/>
-              </a:rPr>
-              <a:t>columnN</a:t>
-            </a:r>
-            <a:r>
-              <a:rPr lang="en-US" sz="1600" dirty="0">
-                <a:latin typeface="Consolas" charset="0"/>
-                <a:ea typeface="Consolas" charset="0"/>
-                <a:cs typeface="Consolas" charset="0"/>
-              </a:rPr>
-              <a:t> = </a:t>
-            </a:r>
-            <a:r>
-              <a:rPr lang="en-US" sz="1600" dirty="0" err="1">
-                <a:latin typeface="Consolas" charset="0"/>
-                <a:ea typeface="Consolas" charset="0"/>
-                <a:cs typeface="Consolas" charset="0"/>
-              </a:rPr>
-              <a:t>valueN</a:t>
-            </a:r>
-            <a:r>
-              <a:rPr lang="en-US" sz="1600" dirty="0">
-                <a:latin typeface="Consolas" charset="0"/>
-                <a:ea typeface="Consolas" charset="0"/>
-                <a:cs typeface="Consolas" charset="0"/>
-              </a:rPr>
-              <a:t> </a:t>
-            </a:r>
-            <a:endParaRPr lang="en-US" sz="1600" dirty="0" smtClean="0">
-              <a:latin typeface="Consolas" charset="0"/>
-              <a:ea typeface="Consolas" charset="0"/>
-              <a:cs typeface="Consolas" charset="0"/>
-            </a:endParaRPr>
-          </a:p>
-          <a:p>
-            <a:pPr marL="400050" lvl="1" indent="0">
-              <a:buNone/>
-            </a:pPr>
+              <a:t>condition</a:t>
+            </a:r>
             <a:r>
               <a:rPr lang="en-US" sz="1600" dirty="0" smtClean="0">
                 <a:latin typeface="Consolas" charset="0"/>
                 <a:ea typeface="Consolas" charset="0"/>
                 <a:cs typeface="Consolas" charset="0"/>
               </a:rPr>
-              <a:t>WHERE </a:t>
-            </a:r>
-            <a:r>
-              <a:rPr lang="en-US" sz="1600" dirty="0">
-                <a:latin typeface="Consolas" charset="0"/>
-                <a:ea typeface="Consolas" charset="0"/>
-                <a:cs typeface="Consolas" charset="0"/>
-              </a:rPr>
-              <a:t>condition</a:t>
-            </a:r>
+              <a:t>;</a:t>
+            </a:r>
+          </a:p>
+          <a:p>
+            <a:r>
+              <a:rPr lang="en-US" dirty="0" smtClean="0">
+                <a:latin typeface="Times" charset="0"/>
+                <a:ea typeface="Times" charset="0"/>
+                <a:cs typeface="Times" charset="0"/>
+              </a:rPr>
+              <a:t>Example</a:t>
+            </a:r>
+          </a:p>
+          <a:p>
+            <a:pPr marL="400050" lvl="1" indent="0">
+              <a:buNone/>
+            </a:pPr>
             <a:r>
               <a:rPr lang="en-US" sz="1600" dirty="0" smtClean="0">
                 <a:latin typeface="Consolas" charset="0"/>
                 <a:ea typeface="Consolas" charset="0"/>
                 <a:cs typeface="Consolas" charset="0"/>
               </a:rPr>
-              <a:t>;</a:t>
-            </a:r>
-          </a:p>
-          <a:p>
-            <a:pPr marL="285750"/>
-            <a:r>
-              <a:rPr lang="en-US" dirty="0" smtClean="0">
-                <a:latin typeface="Times" charset="0"/>
-                <a:ea typeface="Times" charset="0"/>
-                <a:cs typeface="Times" charset="0"/>
-              </a:rPr>
-              <a:t>Example</a:t>
+              <a:t>DELETE FROM Customer</a:t>
             </a:r>
           </a:p>
           <a:p>
@@ -10447,51 +10093,15 @@
                 <a:ea typeface="Consolas" charset="0"/>
                 <a:cs typeface="Consolas" charset="0"/>
               </a:rPr>
-              <a:t>UPDATE Customer</a:t>
-            </a:r>
-          </a:p>
-          <a:p>
-            <a:pPr marL="400050" lvl="1" indent="0">
-              <a:buNone/>
-            </a:pPr>
-            <a:r>
-              <a:rPr lang="en-US" sz="1600" dirty="0" smtClean="0">
-                <a:latin typeface="Consolas" charset="0"/>
-                <a:ea typeface="Consolas" charset="0"/>
-                <a:cs typeface="Consolas" charset="0"/>
-              </a:rPr>
-              <a:t>SET Name ='Bruce</a:t>
-            </a:r>
-            <a:r>
-              <a:rPr lang="en-US" sz="1600" dirty="0">
-                <a:latin typeface="Consolas" charset="0"/>
-                <a:ea typeface="Consolas" charset="0"/>
-                <a:cs typeface="Consolas" charset="0"/>
-              </a:rPr>
-              <a:t>'</a:t>
-            </a:r>
-            <a:endParaRPr lang="en-US" sz="1600" dirty="0" smtClean="0">
-              <a:latin typeface="Consolas" charset="0"/>
-              <a:ea typeface="Consolas" charset="0"/>
-              <a:cs typeface="Consolas" charset="0"/>
-            </a:endParaRPr>
-          </a:p>
-          <a:p>
-            <a:pPr marL="400050" lvl="1" indent="0">
-              <a:buNone/>
-            </a:pPr>
-            <a:r>
-              <a:rPr lang="en-US" sz="1600" dirty="0" smtClean="0">
-                <a:latin typeface="Consolas" charset="0"/>
-                <a:ea typeface="Consolas" charset="0"/>
-                <a:cs typeface="Consolas" charset="0"/>
-              </a:rPr>
-              <a:t>WHERE Cust_id = 1;</a:t>
-            </a:r>
-            <a:endParaRPr lang="en-US" sz="1600" dirty="0">
-              <a:latin typeface="Consolas" charset="0"/>
-              <a:ea typeface="Consolas" charset="0"/>
-              <a:cs typeface="Consolas" charset="0"/>
+              <a:t>WHERE Cust_id=1;</a:t>
+            </a:r>
+          </a:p>
+          <a:p>
+            <a:pPr marL="285750"/>
+            <a:endParaRPr lang="en-US" sz="200" dirty="0">
+              <a:latin typeface="Times" charset="0"/>
+              <a:ea typeface="Times" charset="0"/>
+              <a:cs typeface="Times" charset="0"/>
             </a:endParaRPr>
           </a:p>
         </p:txBody>
@@ -10499,7 +10109,7 @@
     </p:spTree>
     <p:extLst>
       <p:ext uri="{BB962C8B-B14F-4D97-AF65-F5344CB8AC3E}">
-        <p14:creationId xmlns:p14="http://schemas.microsoft.com/office/powerpoint/2010/main" val="730531947"/>
+        <p14:creationId xmlns:p14="http://schemas.microsoft.com/office/powerpoint/2010/main" val="1627336362"/>
       </p:ext>
     </p:extLst>
   </p:cSld>
@@ -10550,7 +10160,7 @@
           <a:p>
             <a:r>
               <a:rPr lang="en-US" dirty="0" smtClean="0"/>
-              <a:t>Exercise: Update the Following Data</a:t>
+              <a:t>Exercise: Delete the Following Rows</a:t>
             </a:r>
             <a:endParaRPr lang="en-US" dirty="0"/>
           </a:p>
@@ -10566,12 +10176,7 @@
             <p:ph idx="1"/>
           </p:nvPr>
         </p:nvSpPr>
-        <p:spPr>
-          <a:xfrm>
-            <a:off x="414982" y="1700808"/>
-            <a:ext cx="7772400" cy="3753544"/>
-          </a:xfrm>
-        </p:spPr>
+        <p:spPr/>
         <p:txBody>
           <a:bodyPr/>
           <a:lstStyle/>
@@ -10582,7 +10187,7 @@
                 <a:ea typeface="Times" charset="0"/>
                 <a:cs typeface="Times" charset="0"/>
               </a:rPr>
-              <a:t>Update Customer Name John to Bruce.</a:t>
+              <a:t>Remove Customer Amy from our Database.</a:t>
             </a:r>
           </a:p>
           <a:p>
@@ -10592,7 +10197,17 @@
                 <a:ea typeface="Times" charset="0"/>
                 <a:cs typeface="Times" charset="0"/>
               </a:rPr>
-              <a:t>Update the Amount value for all the Customers in the Database to be 9.8 and the address to be Gatineau.</a:t>
+              <a:t>Remove all the remaining Customers from the database.</a:t>
+            </a:r>
+          </a:p>
+          <a:p>
+            <a:r>
+              <a:rPr lang="en-US" dirty="0" smtClean="0">
+                <a:latin typeface="Times" charset="0"/>
+                <a:ea typeface="Times" charset="0"/>
+                <a:cs typeface="Times" charset="0"/>
+              </a:rPr>
+              <a:t>Suppose the artist ‘Smith’ moved to another gallery, and we have to remove him from our database. (Note that Artwork table has a foreign key to Artist table)</a:t>
             </a:r>
             <a:endParaRPr lang="en-US" dirty="0">
               <a:latin typeface="Times" charset="0"/>
@@ -10605,7 +10220,7 @@
     </p:spTree>
     <p:extLst>
       <p:ext uri="{BB962C8B-B14F-4D97-AF65-F5344CB8AC3E}">
-        <p14:creationId xmlns:p14="http://schemas.microsoft.com/office/powerpoint/2010/main" val="71527928"/>
+        <p14:creationId xmlns:p14="http://schemas.microsoft.com/office/powerpoint/2010/main" val="131247991"/>
       </p:ext>
     </p:extLst>
   </p:cSld>
@@ -10656,12 +10271,9 @@
           <a:p>
             <a:r>
               <a:rPr lang="en-US" dirty="0" smtClean="0"/>
-              <a:t>Answer: </a:t>
-            </a:r>
-            <a:r>
-              <a:rPr lang="en-US" dirty="0"/>
-              <a:t>Create the following Queries</a:t>
-            </a:r>
+              <a:t>For Detailed Information</a:t>
+            </a:r>
+            <a:endParaRPr lang="en-US" dirty="0"/>
           </a:p>
         </p:txBody>
       </p:sp>
@@ -10681,494 +10293,63 @@
           <a:lstStyle/>
           <a:p>
             <a:r>
-              <a:rPr lang="en-US" dirty="0">
+              <a:rPr lang="en-US" dirty="0" smtClean="0">
                 <a:latin typeface="Times" charset="0"/>
                 <a:ea typeface="Times" charset="0"/>
                 <a:cs typeface="Times" charset="0"/>
               </a:rPr>
-              <a:t>Update Customer Name John to Bruce</a:t>
-            </a:r>
-            <a:r>
-              <a:rPr lang="en-US" dirty="0"/>
-              <a:t>.</a:t>
-            </a:r>
-          </a:p>
-          <a:p>
-            <a:pPr marL="400050" lvl="1" indent="0">
-              <a:buNone/>
-            </a:pPr>
-            <a:r>
-              <a:rPr lang="en-US" sz="1600" dirty="0">
-                <a:latin typeface="Consolas" charset="0"/>
-                <a:ea typeface="Consolas" charset="0"/>
-                <a:cs typeface="Consolas" charset="0"/>
-              </a:rPr>
-              <a:t>UPDATE Customer </a:t>
-            </a:r>
-            <a:endParaRPr lang="en-US" sz="1600" dirty="0" smtClean="0">
-              <a:latin typeface="Consolas" charset="0"/>
-              <a:ea typeface="Consolas" charset="0"/>
-              <a:cs typeface="Consolas" charset="0"/>
-            </a:endParaRPr>
-          </a:p>
-          <a:p>
-            <a:pPr marL="400050" lvl="1" indent="0">
-              <a:buNone/>
-            </a:pPr>
-            <a:r>
-              <a:rPr lang="en-US" sz="1600" dirty="0" smtClean="0">
-                <a:latin typeface="Consolas" charset="0"/>
-                <a:ea typeface="Consolas" charset="0"/>
-                <a:cs typeface="Consolas" charset="0"/>
-              </a:rPr>
-              <a:t>SET </a:t>
-            </a:r>
-            <a:r>
-              <a:rPr lang="en-US" sz="1600" dirty="0">
-                <a:latin typeface="Consolas" charset="0"/>
-                <a:ea typeface="Consolas" charset="0"/>
-                <a:cs typeface="Consolas" charset="0"/>
-              </a:rPr>
-              <a:t>Name='Bruce' </a:t>
-            </a:r>
-            <a:endParaRPr lang="en-US" sz="1600" dirty="0" smtClean="0">
-              <a:latin typeface="Consolas" charset="0"/>
-              <a:ea typeface="Consolas" charset="0"/>
-              <a:cs typeface="Consolas" charset="0"/>
-            </a:endParaRPr>
-          </a:p>
-          <a:p>
-            <a:pPr marL="400050" lvl="1" indent="0">
-              <a:buNone/>
-            </a:pPr>
-            <a:r>
-              <a:rPr lang="en-US" sz="1600" dirty="0" smtClean="0">
-                <a:latin typeface="Consolas" charset="0"/>
-                <a:ea typeface="Consolas" charset="0"/>
-                <a:cs typeface="Consolas" charset="0"/>
-              </a:rPr>
-              <a:t>WHERE </a:t>
-            </a:r>
-            <a:r>
-              <a:rPr lang="en-US" sz="1600" dirty="0">
-                <a:latin typeface="Consolas" charset="0"/>
-                <a:ea typeface="Consolas" charset="0"/>
-                <a:cs typeface="Consolas" charset="0"/>
-              </a:rPr>
-              <a:t>Name='John</a:t>
-            </a:r>
-            <a:r>
-              <a:rPr lang="en-US" sz="1600" dirty="0" smtClean="0">
-                <a:latin typeface="Consolas" charset="0"/>
-                <a:ea typeface="Consolas" charset="0"/>
-                <a:cs typeface="Consolas" charset="0"/>
-              </a:rPr>
-              <a:t>';</a:t>
-            </a:r>
-          </a:p>
-          <a:p>
-            <a:pPr marL="400050" lvl="1" indent="0">
-              <a:buNone/>
-            </a:pPr>
-            <a:endParaRPr lang="en-US" sz="1600" dirty="0">
-              <a:latin typeface="Consolas" charset="0"/>
-              <a:ea typeface="Consolas" charset="0"/>
-              <a:cs typeface="Consolas" charset="0"/>
-            </a:endParaRPr>
-          </a:p>
-          <a:p>
+              <a:t>About SQL Syntax</a:t>
+            </a:r>
+          </a:p>
+          <a:p>
+            <a:pPr lvl="1"/>
             <a:r>
               <a:rPr lang="en-US" dirty="0">
                 <a:latin typeface="Times" charset="0"/>
                 <a:ea typeface="Times" charset="0"/>
                 <a:cs typeface="Times" charset="0"/>
               </a:rPr>
-              <a:t>Update the Amount value for all the Customers in the Database to be 9.8 and the address to be Gatineau</a:t>
-            </a:r>
-            <a:r>
-              <a:rPr lang="en-US" dirty="0" smtClean="0">
+              <a:t>http://</a:t>
+            </a:r>
+            <a:r>
+              <a:rPr lang="en-US" dirty="0" err="1">
                 <a:latin typeface="Times" charset="0"/>
                 <a:ea typeface="Times" charset="0"/>
                 <a:cs typeface="Times" charset="0"/>
               </a:rPr>
-              <a:t>.</a:t>
-            </a:r>
-          </a:p>
-          <a:p>
-            <a:pPr marL="400050" lvl="1" indent="0">
-              <a:buNone/>
-            </a:pPr>
-            <a:r>
-              <a:rPr lang="en-US" sz="1600" dirty="0">
-                <a:latin typeface="Consolas" charset="0"/>
-                <a:ea typeface="Consolas" charset="0"/>
-                <a:cs typeface="Consolas" charset="0"/>
-              </a:rPr>
-              <a:t>UPDATE Customer </a:t>
-            </a:r>
-          </a:p>
-          <a:p>
-            <a:pPr marL="400050" lvl="1" indent="0">
-              <a:buNone/>
-            </a:pPr>
-            <a:r>
-              <a:rPr lang="en-US" sz="1600" dirty="0" smtClean="0">
-                <a:latin typeface="Consolas" charset="0"/>
-                <a:ea typeface="Consolas" charset="0"/>
-                <a:cs typeface="Consolas" charset="0"/>
-              </a:rPr>
-              <a:t>SET </a:t>
-            </a:r>
-            <a:r>
-              <a:rPr lang="en-US" sz="1600" dirty="0">
-                <a:latin typeface="Consolas" charset="0"/>
-                <a:ea typeface="Consolas" charset="0"/>
-                <a:cs typeface="Consolas" charset="0"/>
-              </a:rPr>
-              <a:t>Amount=9.8, Address='Gatineau';</a:t>
-            </a:r>
-            <a:endParaRPr lang="en-US" dirty="0">
-              <a:latin typeface="Consolas" charset="0"/>
-              <a:ea typeface="Consolas" charset="0"/>
-              <a:cs typeface="Consolas" charset="0"/>
-            </a:endParaRPr>
+              <a:t>www.faqs.org</a:t>
+            </a:r>
+            <a:r>
+              <a:rPr lang="en-US" dirty="0">
+                <a:latin typeface="Times" charset="0"/>
+                <a:ea typeface="Times" charset="0"/>
+                <a:cs typeface="Times" charset="0"/>
+              </a:rPr>
+              <a:t>/docs/</a:t>
+            </a:r>
+            <a:r>
+              <a:rPr lang="en-US" dirty="0" err="1">
+                <a:latin typeface="Times" charset="0"/>
+                <a:ea typeface="Times" charset="0"/>
+                <a:cs typeface="Times" charset="0"/>
+              </a:rPr>
+              <a:t>ppbook</a:t>
+            </a:r>
+            <a:r>
+              <a:rPr lang="en-US" dirty="0">
+                <a:latin typeface="Times" charset="0"/>
+                <a:ea typeface="Times" charset="0"/>
+                <a:cs typeface="Times" charset="0"/>
+              </a:rPr>
+              <a:t>/c22759.htm</a:t>
+            </a:r>
           </a:p>
         </p:txBody>
       </p:sp>
     </p:spTree>
     <p:extLst>
       <p:ext uri="{BB962C8B-B14F-4D97-AF65-F5344CB8AC3E}">
-        <p14:creationId xmlns:p14="http://schemas.microsoft.com/office/powerpoint/2010/main" val="1616167294"/>
-      </p:ext>
-    </p:extLst>
-  </p:cSld>
-  <p:clrMapOvr>
-    <a:masterClrMapping/>
-  </p:clrMapOvr>
-  <p:timing>
-    <p:tnLst>
-      <p:par>
-        <p:cTn id="1" dur="indefinite" restart="never" nodeType="tmRoot"/>
-      </p:par>
-    </p:tnLst>
-  </p:timing>
-</p:sld>
-</file>
-
-<file path=ppt/slides/slide18.xml><?xml version="1.0" encoding="utf-8"?>
-<p:sld xmlns:a="http://schemas.openxmlformats.org/drawingml/2006/main" xmlns:r="http://schemas.openxmlformats.org/officeDocument/2006/relationships" xmlns:p="http://schemas.openxmlformats.org/presentationml/2006/main">
-  <p:cSld>
-    <p:spTree>
-      <p:nvGrpSpPr>
-        <p:cNvPr id="1" name=""/>
-        <p:cNvGrpSpPr/>
-        <p:nvPr/>
-      </p:nvGrpSpPr>
-      <p:grpSpPr>
-        <a:xfrm>
-          <a:off x="0" y="0"/>
-          <a:ext cx="0" cy="0"/>
-          <a:chOff x="0" y="0"/>
-          <a:chExt cx="0" cy="0"/>
-        </a:xfrm>
-      </p:grpSpPr>
-      <p:sp>
-        <p:nvSpPr>
-          <p:cNvPr id="2" name="Title 1"/>
-          <p:cNvSpPr>
-            <a:spLocks noGrp="1"/>
-          </p:cNvSpPr>
-          <p:nvPr>
-            <p:ph type="title"/>
-          </p:nvPr>
-        </p:nvSpPr>
-        <p:spPr/>
-        <p:txBody>
-          <a:bodyPr/>
-          <a:lstStyle/>
-          <a:p>
-            <a:r>
-              <a:rPr lang="en-US" dirty="0" smtClean="0"/>
-              <a:t>SQL DELETE STATEMENT</a:t>
-            </a:r>
-            <a:endParaRPr lang="en-US" dirty="0"/>
-          </a:p>
-        </p:txBody>
-      </p:sp>
-      <p:sp>
-        <p:nvSpPr>
-          <p:cNvPr id="3" name="Content Placeholder 2"/>
-          <p:cNvSpPr>
-            <a:spLocks noGrp="1"/>
-          </p:cNvSpPr>
-          <p:nvPr>
-            <p:ph idx="1"/>
-          </p:nvPr>
-        </p:nvSpPr>
-        <p:spPr/>
-        <p:txBody>
-          <a:bodyPr/>
-          <a:lstStyle/>
-          <a:p>
-            <a:r>
-              <a:rPr lang="en-US" dirty="0" smtClean="0">
-                <a:latin typeface="Times" charset="0"/>
-                <a:ea typeface="Times" charset="0"/>
-                <a:cs typeface="Times" charset="0"/>
-              </a:rPr>
-              <a:t>We can delete certain rows satisfying a condition from a table with DELETE command. Condition is the same as WHERE clause of SELECT query. If you omit the WHERE clause, </a:t>
-            </a:r>
-            <a:r>
-              <a:rPr lang="en-US" b="1" u="sng" dirty="0" smtClean="0">
-                <a:latin typeface="Times" charset="0"/>
-                <a:ea typeface="Times" charset="0"/>
-                <a:cs typeface="Times" charset="0"/>
-              </a:rPr>
-              <a:t>all records will be deleted permanently</a:t>
-            </a:r>
-            <a:r>
-              <a:rPr lang="en-US" dirty="0" smtClean="0">
-                <a:latin typeface="Times" charset="0"/>
-                <a:ea typeface="Times" charset="0"/>
-                <a:cs typeface="Times" charset="0"/>
-              </a:rPr>
-              <a:t>.</a:t>
-            </a:r>
-          </a:p>
-          <a:p>
-            <a:r>
-              <a:rPr lang="en-US" dirty="0" smtClean="0">
-                <a:latin typeface="Times" charset="0"/>
-                <a:ea typeface="Times" charset="0"/>
-                <a:cs typeface="Times" charset="0"/>
-              </a:rPr>
-              <a:t>Syntax</a:t>
-            </a:r>
-          </a:p>
-          <a:p>
-            <a:pPr marL="400050" lvl="1" indent="0">
-              <a:buNone/>
-            </a:pPr>
-            <a:r>
-              <a:rPr lang="en-US" sz="1600" dirty="0">
-                <a:latin typeface="Consolas" charset="0"/>
-                <a:ea typeface="Consolas" charset="0"/>
-                <a:cs typeface="Consolas" charset="0"/>
-              </a:rPr>
-              <a:t>DELETE FROM </a:t>
-            </a:r>
-            <a:r>
-              <a:rPr lang="en-US" sz="1600" dirty="0" err="1">
-                <a:latin typeface="Consolas" charset="0"/>
-                <a:ea typeface="Consolas" charset="0"/>
-                <a:cs typeface="Consolas" charset="0"/>
-              </a:rPr>
-              <a:t>table_name</a:t>
-            </a:r>
-            <a:r>
-              <a:rPr lang="en-US" sz="1600" dirty="0">
-                <a:latin typeface="Consolas" charset="0"/>
-                <a:ea typeface="Consolas" charset="0"/>
-                <a:cs typeface="Consolas" charset="0"/>
-              </a:rPr>
-              <a:t> </a:t>
-            </a:r>
-            <a:endParaRPr lang="en-US" sz="1600" dirty="0" smtClean="0">
-              <a:latin typeface="Consolas" charset="0"/>
-              <a:ea typeface="Consolas" charset="0"/>
-              <a:cs typeface="Consolas" charset="0"/>
-            </a:endParaRPr>
-          </a:p>
-          <a:p>
-            <a:pPr marL="400050" lvl="1" indent="0">
-              <a:buNone/>
-            </a:pPr>
-            <a:r>
-              <a:rPr lang="en-US" sz="1600" dirty="0" smtClean="0">
-                <a:latin typeface="Consolas" charset="0"/>
-                <a:ea typeface="Consolas" charset="0"/>
-                <a:cs typeface="Consolas" charset="0"/>
-              </a:rPr>
-              <a:t>WHERE </a:t>
-            </a:r>
-            <a:r>
-              <a:rPr lang="en-US" sz="1600" dirty="0">
-                <a:latin typeface="Consolas" charset="0"/>
-                <a:ea typeface="Consolas" charset="0"/>
-                <a:cs typeface="Consolas" charset="0"/>
-              </a:rPr>
-              <a:t>condition</a:t>
-            </a:r>
-            <a:r>
-              <a:rPr lang="en-US" sz="1600" dirty="0" smtClean="0">
-                <a:latin typeface="Consolas" charset="0"/>
-                <a:ea typeface="Consolas" charset="0"/>
-                <a:cs typeface="Consolas" charset="0"/>
-              </a:rPr>
-              <a:t>;</a:t>
-            </a:r>
-          </a:p>
-          <a:p>
-            <a:r>
-              <a:rPr lang="en-US" dirty="0" smtClean="0">
-                <a:latin typeface="Times" charset="0"/>
-                <a:ea typeface="Times" charset="0"/>
-                <a:cs typeface="Times" charset="0"/>
-              </a:rPr>
-              <a:t>Example</a:t>
-            </a:r>
-          </a:p>
-          <a:p>
-            <a:pPr marL="400050" lvl="1" indent="0">
-              <a:buNone/>
-            </a:pPr>
-            <a:r>
-              <a:rPr lang="en-US" sz="1600" dirty="0" smtClean="0">
-                <a:latin typeface="Consolas" charset="0"/>
-                <a:ea typeface="Consolas" charset="0"/>
-                <a:cs typeface="Consolas" charset="0"/>
-              </a:rPr>
-              <a:t>DELETE FROM Customer</a:t>
-            </a:r>
-          </a:p>
-          <a:p>
-            <a:pPr marL="400050" lvl="1" indent="0">
-              <a:buNone/>
-            </a:pPr>
-            <a:r>
-              <a:rPr lang="en-US" sz="1600" dirty="0" smtClean="0">
-                <a:latin typeface="Consolas" charset="0"/>
-                <a:ea typeface="Consolas" charset="0"/>
-                <a:cs typeface="Consolas" charset="0"/>
-              </a:rPr>
-              <a:t>WHERE Cust_id=1;</a:t>
-            </a:r>
-          </a:p>
-          <a:p>
-            <a:pPr marL="285750"/>
-            <a:endParaRPr lang="en-US" sz="200" dirty="0">
-              <a:latin typeface="Times" charset="0"/>
-              <a:ea typeface="Times" charset="0"/>
-              <a:cs typeface="Times" charset="0"/>
-            </a:endParaRPr>
-          </a:p>
-        </p:txBody>
-      </p:sp>
-    </p:spTree>
-    <p:extLst>
-      <p:ext uri="{BB962C8B-B14F-4D97-AF65-F5344CB8AC3E}">
-        <p14:creationId xmlns:p14="http://schemas.microsoft.com/office/powerpoint/2010/main" val="1627336362"/>
-      </p:ext>
-    </p:extLst>
-  </p:cSld>
-  <p:clrMapOvr>
-    <a:masterClrMapping/>
-  </p:clrMapOvr>
-  <p:timing>
-    <p:tnLst>
-      <p:par>
-        <p:cTn id="1" dur="indefinite" restart="never" nodeType="tmRoot"/>
-      </p:par>
-    </p:tnLst>
-  </p:timing>
-</p:sld>
-</file>
-
-<file path=ppt/slides/slide19.xml><?xml version="1.0" encoding="utf-8"?>
-<p:sld xmlns:a="http://schemas.openxmlformats.org/drawingml/2006/main" xmlns:r="http://schemas.openxmlformats.org/officeDocument/2006/relationships" xmlns:p="http://schemas.openxmlformats.org/presentationml/2006/main">
-  <p:cSld>
-    <p:spTree>
-      <p:nvGrpSpPr>
-        <p:cNvPr id="1" name=""/>
-        <p:cNvGrpSpPr/>
-        <p:nvPr/>
-      </p:nvGrpSpPr>
-      <p:grpSpPr>
-        <a:xfrm>
-          <a:off x="0" y="0"/>
-          <a:ext cx="0" cy="0"/>
-          <a:chOff x="0" y="0"/>
-          <a:chExt cx="0" cy="0"/>
-        </a:xfrm>
-      </p:grpSpPr>
-      <p:sp>
-        <p:nvSpPr>
-          <p:cNvPr id="2" name="Title 1"/>
-          <p:cNvSpPr>
-            <a:spLocks noGrp="1"/>
-          </p:cNvSpPr>
-          <p:nvPr>
-            <p:ph type="title"/>
-          </p:nvPr>
-        </p:nvSpPr>
-        <p:spPr/>
-        <p:txBody>
-          <a:bodyPr/>
-          <a:lstStyle/>
-          <a:p>
-            <a:r>
-              <a:rPr lang="en-US" dirty="0" smtClean="0"/>
-              <a:t>Exercise: Delete the Following Rows</a:t>
-            </a:r>
-            <a:endParaRPr lang="en-US" dirty="0"/>
-          </a:p>
-        </p:txBody>
-      </p:sp>
-      <p:sp>
-        <p:nvSpPr>
-          <p:cNvPr id="3" name="Content Placeholder 2"/>
-          <p:cNvSpPr>
-            <a:spLocks noGrp="1"/>
-          </p:cNvSpPr>
-          <p:nvPr>
-            <p:ph idx="1"/>
-          </p:nvPr>
-        </p:nvSpPr>
-        <p:spPr/>
-        <p:txBody>
-          <a:bodyPr/>
-          <a:lstStyle/>
-          <a:p>
-            <a:r>
-              <a:rPr lang="en-US" dirty="0" smtClean="0">
-                <a:latin typeface="Times" charset="0"/>
-                <a:ea typeface="Times" charset="0"/>
-                <a:cs typeface="Times" charset="0"/>
-              </a:rPr>
-              <a:t>Remove Customer Amy from our Database.</a:t>
-            </a:r>
-          </a:p>
-          <a:p>
-            <a:r>
-              <a:rPr lang="en-US" dirty="0" smtClean="0">
-                <a:latin typeface="Times" charset="0"/>
-                <a:ea typeface="Times" charset="0"/>
-                <a:cs typeface="Times" charset="0"/>
-              </a:rPr>
-              <a:t>Remove all the remaining Customers from the database.</a:t>
-            </a:r>
-          </a:p>
-          <a:p>
-            <a:r>
-              <a:rPr lang="en-US" dirty="0" smtClean="0">
-                <a:latin typeface="Times" charset="0"/>
-                <a:ea typeface="Times" charset="0"/>
-                <a:cs typeface="Times" charset="0"/>
-              </a:rPr>
-              <a:t>Suppose the artist ‘Smith’ moved to another gallery, and we have to remove him from our database. (Note that Artwork table has a foreign key to Artist table)</a:t>
-            </a:r>
-            <a:endParaRPr lang="en-US" dirty="0">
-              <a:latin typeface="Times" charset="0"/>
-              <a:ea typeface="Times" charset="0"/>
-              <a:cs typeface="Times" charset="0"/>
-            </a:endParaRPr>
-          </a:p>
-        </p:txBody>
-      </p:sp>
-    </p:spTree>
-    <p:extLst>
-      <p:ext uri="{BB962C8B-B14F-4D97-AF65-F5344CB8AC3E}">
-        <p14:creationId xmlns:p14="http://schemas.microsoft.com/office/powerpoint/2010/main" val="131247991"/>
+        <p14:creationId xmlns:p14="http://schemas.microsoft.com/office/powerpoint/2010/main" val="1570907476"/>
       </p:ext>
     </p:extLst>
   </p:cSld>
@@ -11264,66 +10445,21 @@
                 <a:ea typeface="Times" charset="0"/>
                 <a:cs typeface="Times" charset="0"/>
               </a:rPr>
-              <a:t>If we don’t finish the lab during the lab time, you need to complete it on your own time – labs might build on each other.</a:t>
-            </a:r>
-          </a:p>
-          <a:p>
+              <a:t>If we don’t finish the lab during the lab time, you need to complete it on your own time – labs might build on each other</a:t>
+            </a:r>
             <a:r>
               <a:rPr lang="en-US" dirty="0" smtClean="0">
                 <a:latin typeface="Times" charset="0"/>
                 <a:ea typeface="Times" charset="0"/>
                 <a:cs typeface="Times" charset="0"/>
               </a:rPr>
-              <a:t>Updated slides are not posted on </a:t>
-            </a:r>
-            <a:r>
-              <a:rPr lang="en-US" dirty="0" err="1" smtClean="0">
-                <a:latin typeface="Times" charset="0"/>
-                <a:ea typeface="Times" charset="0"/>
-                <a:cs typeface="Times" charset="0"/>
-              </a:rPr>
-              <a:t>Brightspace</a:t>
-            </a:r>
-            <a:r>
-              <a:rPr lang="en-US" dirty="0" smtClean="0">
-                <a:latin typeface="Times" charset="0"/>
-                <a:ea typeface="Times" charset="0"/>
-                <a:cs typeface="Times" charset="0"/>
-              </a:rPr>
-              <a:t>. You can access them through my </a:t>
-            </a:r>
-            <a:r>
-              <a:rPr lang="en-US" dirty="0" err="1" smtClean="0">
-                <a:latin typeface="Times" charset="0"/>
-                <a:ea typeface="Times" charset="0"/>
-                <a:cs typeface="Times" charset="0"/>
-              </a:rPr>
-              <a:t>github</a:t>
-            </a:r>
-            <a:r>
-              <a:rPr lang="en-US" dirty="0">
-                <a:latin typeface="Times" charset="0"/>
-                <a:ea typeface="Times" charset="0"/>
-                <a:cs typeface="Times" charset="0"/>
-              </a:rPr>
-              <a:t> account: https://</a:t>
-            </a:r>
-            <a:r>
-              <a:rPr lang="en-US" dirty="0" err="1">
-                <a:latin typeface="Times" charset="0"/>
-                <a:ea typeface="Times" charset="0"/>
-                <a:cs typeface="Times" charset="0"/>
-              </a:rPr>
-              <a:t>github.com</a:t>
-            </a:r>
-            <a:r>
-              <a:rPr lang="en-US" dirty="0">
-                <a:latin typeface="Times" charset="0"/>
-                <a:ea typeface="Times" charset="0"/>
-                <a:cs typeface="Times" charset="0"/>
-              </a:rPr>
-              <a:t>/rkhal101/CSI2132-Databases-I</a:t>
-            </a:r>
+              <a:t>.</a:t>
+            </a:r>
+            <a:endParaRPr lang="en-US" dirty="0" smtClean="0">
+              <a:latin typeface="Times" charset="0"/>
+              <a:ea typeface="Times" charset="0"/>
+              <a:cs typeface="Times" charset="0"/>
+            </a:endParaRPr>
           </a:p>
         </p:txBody>
       </p:sp>
@@ -11331,457 +10467,6 @@
     <p:extLst>
       <p:ext uri="{BB962C8B-B14F-4D97-AF65-F5344CB8AC3E}">
         <p14:creationId xmlns:p14="http://schemas.microsoft.com/office/powerpoint/2010/main" val="619330206"/>
-      </p:ext>
-    </p:extLst>
-  </p:cSld>
-  <p:clrMapOvr>
-    <a:masterClrMapping/>
-  </p:clrMapOvr>
-  <p:timing>
-    <p:tnLst>
-      <p:par>
-        <p:cTn id="1" dur="indefinite" restart="never" nodeType="tmRoot"/>
-      </p:par>
-    </p:tnLst>
-  </p:timing>
-</p:sld>
-</file>
-
-<file path=ppt/slides/slide20.xml><?xml version="1.0" encoding="utf-8"?>
-<p:sld xmlns:a="http://schemas.openxmlformats.org/drawingml/2006/main" xmlns:r="http://schemas.openxmlformats.org/officeDocument/2006/relationships" xmlns:p="http://schemas.openxmlformats.org/presentationml/2006/main">
-  <p:cSld>
-    <p:spTree>
-      <p:nvGrpSpPr>
-        <p:cNvPr id="1" name=""/>
-        <p:cNvGrpSpPr/>
-        <p:nvPr/>
-      </p:nvGrpSpPr>
-      <p:grpSpPr>
-        <a:xfrm>
-          <a:off x="0" y="0"/>
-          <a:ext cx="0" cy="0"/>
-          <a:chOff x="0" y="0"/>
-          <a:chExt cx="0" cy="0"/>
-        </a:xfrm>
-      </p:grpSpPr>
-      <p:sp>
-        <p:nvSpPr>
-          <p:cNvPr id="2" name="Title 1"/>
-          <p:cNvSpPr>
-            <a:spLocks noGrp="1"/>
-          </p:cNvSpPr>
-          <p:nvPr>
-            <p:ph type="title"/>
-          </p:nvPr>
-        </p:nvSpPr>
-        <p:spPr/>
-        <p:txBody>
-          <a:bodyPr/>
-          <a:lstStyle/>
-          <a:p>
-            <a:r>
-              <a:rPr lang="en-US" dirty="0" smtClean="0"/>
-              <a:t>Answer: Delete the Following Rows</a:t>
-            </a:r>
-            <a:endParaRPr lang="en-US" dirty="0"/>
-          </a:p>
-        </p:txBody>
-      </p:sp>
-      <p:sp>
-        <p:nvSpPr>
-          <p:cNvPr id="3" name="Content Placeholder 2"/>
-          <p:cNvSpPr>
-            <a:spLocks noGrp="1"/>
-          </p:cNvSpPr>
-          <p:nvPr>
-            <p:ph idx="1"/>
-          </p:nvPr>
-        </p:nvSpPr>
-        <p:spPr>
-          <a:xfrm>
-            <a:off x="412750" y="1445204"/>
-            <a:ext cx="7772400" cy="4576083"/>
-          </a:xfrm>
-        </p:spPr>
-        <p:txBody>
-          <a:bodyPr/>
-          <a:lstStyle/>
-          <a:p>
-            <a:r>
-              <a:rPr lang="en-US" dirty="0" smtClean="0">
-                <a:latin typeface="Times" charset="0"/>
-                <a:ea typeface="Times" charset="0"/>
-                <a:cs typeface="Times" charset="0"/>
-              </a:rPr>
-              <a:t>Remove Customer Amy from our Database.</a:t>
-            </a:r>
-          </a:p>
-          <a:p>
-            <a:pPr marL="400050" lvl="1" indent="0">
-              <a:buNone/>
-            </a:pPr>
-            <a:r>
-              <a:rPr lang="en-US" sz="1600" dirty="0">
-                <a:latin typeface="Consolas" charset="0"/>
-                <a:ea typeface="Consolas" charset="0"/>
-                <a:cs typeface="Consolas" charset="0"/>
-              </a:rPr>
-              <a:t>DELETE FROM Customer </a:t>
-            </a:r>
-            <a:endParaRPr lang="en-US" sz="1600" dirty="0" smtClean="0">
-              <a:latin typeface="Consolas" charset="0"/>
-              <a:ea typeface="Consolas" charset="0"/>
-              <a:cs typeface="Consolas" charset="0"/>
-            </a:endParaRPr>
-          </a:p>
-          <a:p>
-            <a:pPr marL="400050" lvl="1" indent="0">
-              <a:buNone/>
-            </a:pPr>
-            <a:r>
-              <a:rPr lang="en-US" sz="1600" dirty="0" smtClean="0">
-                <a:latin typeface="Consolas" charset="0"/>
-                <a:ea typeface="Consolas" charset="0"/>
-                <a:cs typeface="Consolas" charset="0"/>
-              </a:rPr>
-              <a:t>WHERE </a:t>
-            </a:r>
-            <a:r>
-              <a:rPr lang="en-US" sz="1600" dirty="0">
-                <a:latin typeface="Consolas" charset="0"/>
-                <a:ea typeface="Consolas" charset="0"/>
-                <a:cs typeface="Consolas" charset="0"/>
-              </a:rPr>
-              <a:t>Name</a:t>
-            </a:r>
-            <a:r>
-              <a:rPr lang="en-US" sz="1600" dirty="0" smtClean="0">
-                <a:latin typeface="Consolas" charset="0"/>
-                <a:ea typeface="Consolas" charset="0"/>
-                <a:cs typeface="Consolas" charset="0"/>
-              </a:rPr>
-              <a:t>=</a:t>
-            </a:r>
-            <a:r>
-              <a:rPr lang="tr-TR" sz="1600" dirty="0" smtClean="0">
-                <a:latin typeface="Consolas" charset="0"/>
-                <a:ea typeface="Consolas" charset="0"/>
-                <a:cs typeface="Consolas" charset="0"/>
-              </a:rPr>
-              <a:t>'</a:t>
-            </a:r>
-            <a:r>
-              <a:rPr lang="tr-TR" sz="1600" dirty="0" err="1" smtClean="0">
-                <a:latin typeface="Consolas" charset="0"/>
-                <a:ea typeface="Consolas" charset="0"/>
-                <a:cs typeface="Consolas" charset="0"/>
-              </a:rPr>
-              <a:t>Amy</a:t>
-            </a:r>
-            <a:r>
-              <a:rPr lang="tr-TR" sz="1600" dirty="0" smtClean="0">
-                <a:latin typeface="Consolas" charset="0"/>
-                <a:ea typeface="Consolas" charset="0"/>
-                <a:cs typeface="Consolas" charset="0"/>
-              </a:rPr>
-              <a:t>';</a:t>
-            </a:r>
-            <a:endParaRPr lang="en-US" sz="1600" dirty="0" smtClean="0">
-              <a:latin typeface="Consolas" charset="0"/>
-              <a:ea typeface="Consolas" charset="0"/>
-              <a:cs typeface="Consolas" charset="0"/>
-            </a:endParaRPr>
-          </a:p>
-          <a:p>
-            <a:pPr marL="400050" lvl="1" indent="0">
-              <a:buNone/>
-            </a:pPr>
-            <a:endParaRPr lang="en-US" sz="1600" dirty="0" smtClean="0">
-              <a:latin typeface="Consolas" charset="0"/>
-              <a:ea typeface="Consolas" charset="0"/>
-              <a:cs typeface="Consolas" charset="0"/>
-            </a:endParaRPr>
-          </a:p>
-          <a:p>
-            <a:r>
-              <a:rPr lang="en-US" dirty="0" smtClean="0">
-                <a:latin typeface="Times" charset="0"/>
-                <a:ea typeface="Times" charset="0"/>
-                <a:cs typeface="Times" charset="0"/>
-              </a:rPr>
-              <a:t>Remove all the remaining Customers from the database.</a:t>
-            </a:r>
-          </a:p>
-          <a:p>
-            <a:pPr marL="400050" lvl="1" indent="0">
-              <a:buNone/>
-            </a:pPr>
-            <a:r>
-              <a:rPr lang="en-US" sz="1600" dirty="0">
-                <a:latin typeface="Consolas" charset="0"/>
-                <a:ea typeface="Consolas" charset="0"/>
-                <a:cs typeface="Consolas" charset="0"/>
-              </a:rPr>
-              <a:t>DELETE FROM Customer</a:t>
-            </a:r>
-            <a:r>
-              <a:rPr lang="en-US" sz="1600" dirty="0" smtClean="0">
-                <a:latin typeface="Consolas" charset="0"/>
-                <a:ea typeface="Consolas" charset="0"/>
-                <a:cs typeface="Consolas" charset="0"/>
-              </a:rPr>
-              <a:t>;</a:t>
-            </a:r>
-          </a:p>
-          <a:p>
-            <a:pPr marL="400050" lvl="1" indent="0">
-              <a:buNone/>
-            </a:pPr>
-            <a:endParaRPr lang="en-US" sz="1600" dirty="0" smtClean="0">
-              <a:latin typeface="Consolas" charset="0"/>
-              <a:ea typeface="Consolas" charset="0"/>
-              <a:cs typeface="Consolas" charset="0"/>
-            </a:endParaRPr>
-          </a:p>
-          <a:p>
-            <a:r>
-              <a:rPr lang="en-US" dirty="0" smtClean="0">
-                <a:latin typeface="Times" charset="0"/>
-                <a:ea typeface="Times" charset="0"/>
-                <a:cs typeface="Times" charset="0"/>
-              </a:rPr>
-              <a:t>Suppose the artist ‘Smith’ moved to another gallery, and we have to remove him from our database. (Note that Artwork table has a foreign key to Artist table)</a:t>
-            </a:r>
-          </a:p>
-          <a:p>
-            <a:pPr marL="400050" lvl="1" indent="0">
-              <a:buNone/>
-            </a:pPr>
-            <a:r>
-              <a:rPr lang="en-US" sz="1600" dirty="0">
-                <a:latin typeface="Consolas" charset="0"/>
-                <a:ea typeface="Consolas" charset="0"/>
-                <a:cs typeface="Consolas" charset="0"/>
-              </a:rPr>
-              <a:t>--First delete entry from Artwork table </a:t>
-            </a:r>
-            <a:endParaRPr lang="en-US" sz="1600" dirty="0" smtClean="0">
-              <a:latin typeface="Consolas" charset="0"/>
-              <a:ea typeface="Consolas" charset="0"/>
-              <a:cs typeface="Consolas" charset="0"/>
-            </a:endParaRPr>
-          </a:p>
-          <a:p>
-            <a:pPr marL="400050" lvl="1" indent="0">
-              <a:buNone/>
-            </a:pPr>
-            <a:r>
-              <a:rPr lang="en-US" sz="1600" dirty="0" smtClean="0">
-                <a:latin typeface="Consolas" charset="0"/>
-                <a:ea typeface="Consolas" charset="0"/>
-                <a:cs typeface="Consolas" charset="0"/>
-              </a:rPr>
-              <a:t>DELETE </a:t>
-            </a:r>
-            <a:r>
-              <a:rPr lang="en-US" sz="1600" dirty="0">
-                <a:latin typeface="Consolas" charset="0"/>
-                <a:ea typeface="Consolas" charset="0"/>
-                <a:cs typeface="Consolas" charset="0"/>
-              </a:rPr>
-              <a:t>FROM Artwork WHERE AName='Smith</a:t>
-            </a:r>
-            <a:r>
-              <a:rPr lang="en-US" sz="1600" dirty="0" smtClean="0">
-                <a:latin typeface="Consolas" charset="0"/>
-                <a:ea typeface="Consolas" charset="0"/>
-                <a:cs typeface="Consolas" charset="0"/>
-              </a:rPr>
-              <a:t>';</a:t>
-            </a:r>
-          </a:p>
-          <a:p>
-            <a:pPr marL="400050" lvl="1" indent="0">
-              <a:buNone/>
-            </a:pPr>
-            <a:r>
-              <a:rPr lang="en-US" sz="1600" dirty="0" smtClean="0">
-                <a:latin typeface="Consolas" charset="0"/>
-                <a:ea typeface="Consolas" charset="0"/>
-                <a:cs typeface="Consolas" charset="0"/>
-              </a:rPr>
-              <a:t>-- Second </a:t>
-            </a:r>
-            <a:r>
-              <a:rPr lang="en-US" sz="1600" dirty="0">
-                <a:latin typeface="Consolas" charset="0"/>
-                <a:ea typeface="Consolas" charset="0"/>
-                <a:cs typeface="Consolas" charset="0"/>
-              </a:rPr>
-              <a:t>delete entry from Artist table </a:t>
-            </a:r>
-            <a:endParaRPr lang="en-US" sz="1600" dirty="0" smtClean="0">
-              <a:latin typeface="Consolas" charset="0"/>
-              <a:ea typeface="Consolas" charset="0"/>
-              <a:cs typeface="Consolas" charset="0"/>
-            </a:endParaRPr>
-          </a:p>
-          <a:p>
-            <a:pPr marL="400050" lvl="1" indent="0">
-              <a:buNone/>
-            </a:pPr>
-            <a:r>
-              <a:rPr lang="en-US" sz="1600" dirty="0" smtClean="0">
-                <a:latin typeface="Consolas" charset="0"/>
-                <a:ea typeface="Consolas" charset="0"/>
-                <a:cs typeface="Consolas" charset="0"/>
-              </a:rPr>
-              <a:t>DELETE </a:t>
-            </a:r>
-            <a:r>
-              <a:rPr lang="en-US" sz="1600" dirty="0">
-                <a:latin typeface="Consolas" charset="0"/>
-                <a:ea typeface="Consolas" charset="0"/>
-                <a:cs typeface="Consolas" charset="0"/>
-              </a:rPr>
-              <a:t>FROM Artist WHERE AName='Smith';</a:t>
-            </a:r>
-          </a:p>
-        </p:txBody>
-      </p:sp>
-    </p:spTree>
-    <p:extLst>
-      <p:ext uri="{BB962C8B-B14F-4D97-AF65-F5344CB8AC3E}">
-        <p14:creationId xmlns:p14="http://schemas.microsoft.com/office/powerpoint/2010/main" val="1655572393"/>
-      </p:ext>
-    </p:extLst>
-  </p:cSld>
-  <p:clrMapOvr>
-    <a:masterClrMapping/>
-  </p:clrMapOvr>
-  <p:timing>
-    <p:tnLst>
-      <p:par>
-        <p:cTn id="1" dur="indefinite" restart="never" nodeType="tmRoot"/>
-      </p:par>
-    </p:tnLst>
-  </p:timing>
-</p:sld>
-</file>
-
-<file path=ppt/slides/slide21.xml><?xml version="1.0" encoding="utf-8"?>
-<p:sld xmlns:a="http://schemas.openxmlformats.org/drawingml/2006/main" xmlns:r="http://schemas.openxmlformats.org/officeDocument/2006/relationships" xmlns:p="http://schemas.openxmlformats.org/presentationml/2006/main">
-  <p:cSld>
-    <p:spTree>
-      <p:nvGrpSpPr>
-        <p:cNvPr id="1" name=""/>
-        <p:cNvGrpSpPr/>
-        <p:nvPr/>
-      </p:nvGrpSpPr>
-      <p:grpSpPr>
-        <a:xfrm>
-          <a:off x="0" y="0"/>
-          <a:ext cx="0" cy="0"/>
-          <a:chOff x="0" y="0"/>
-          <a:chExt cx="0" cy="0"/>
-        </a:xfrm>
-      </p:grpSpPr>
-      <p:sp>
-        <p:nvSpPr>
-          <p:cNvPr id="2" name="Title 1"/>
-          <p:cNvSpPr>
-            <a:spLocks noGrp="1"/>
-          </p:cNvSpPr>
-          <p:nvPr>
-            <p:ph type="title"/>
-          </p:nvPr>
-        </p:nvSpPr>
-        <p:spPr/>
-        <p:txBody>
-          <a:bodyPr/>
-          <a:lstStyle/>
-          <a:p>
-            <a:r>
-              <a:rPr lang="en-US" dirty="0" smtClean="0"/>
-              <a:t>For Detailed Information</a:t>
-            </a:r>
-            <a:endParaRPr lang="en-US" dirty="0"/>
-          </a:p>
-        </p:txBody>
-      </p:sp>
-      <p:sp>
-        <p:nvSpPr>
-          <p:cNvPr id="3" name="Content Placeholder 2"/>
-          <p:cNvSpPr>
-            <a:spLocks noGrp="1"/>
-          </p:cNvSpPr>
-          <p:nvPr>
-            <p:ph idx="1"/>
-          </p:nvPr>
-        </p:nvSpPr>
-        <p:spPr/>
-        <p:txBody>
-          <a:bodyPr/>
-          <a:lstStyle/>
-          <a:p>
-            <a:r>
-              <a:rPr lang="en-US" dirty="0" smtClean="0">
-                <a:latin typeface="Times" charset="0"/>
-                <a:ea typeface="Times" charset="0"/>
-                <a:cs typeface="Times" charset="0"/>
-              </a:rPr>
-              <a:t>About SQL Syntax</a:t>
-            </a:r>
-          </a:p>
-          <a:p>
-            <a:pPr lvl="1"/>
-            <a:r>
-              <a:rPr lang="en-US" dirty="0">
-                <a:latin typeface="Times" charset="0"/>
-                <a:ea typeface="Times" charset="0"/>
-                <a:cs typeface="Times" charset="0"/>
-              </a:rPr>
-              <a:t>http://</a:t>
-            </a:r>
-            <a:r>
-              <a:rPr lang="en-US" dirty="0" err="1">
-                <a:latin typeface="Times" charset="0"/>
-                <a:ea typeface="Times" charset="0"/>
-                <a:cs typeface="Times" charset="0"/>
-              </a:rPr>
-              <a:t>www.faqs.org</a:t>
-            </a:r>
-            <a:r>
-              <a:rPr lang="en-US" dirty="0">
-                <a:latin typeface="Times" charset="0"/>
-                <a:ea typeface="Times" charset="0"/>
-                <a:cs typeface="Times" charset="0"/>
-              </a:rPr>
-              <a:t>/docs/</a:t>
-            </a:r>
-            <a:r>
-              <a:rPr lang="en-US" dirty="0" err="1">
-                <a:latin typeface="Times" charset="0"/>
-                <a:ea typeface="Times" charset="0"/>
-                <a:cs typeface="Times" charset="0"/>
-              </a:rPr>
-              <a:t>ppbook</a:t>
-            </a:r>
-            <a:r>
-              <a:rPr lang="en-US" dirty="0">
-                <a:latin typeface="Times" charset="0"/>
-                <a:ea typeface="Times" charset="0"/>
-                <a:cs typeface="Times" charset="0"/>
-              </a:rPr>
-              <a:t>/c22759.htm</a:t>
-            </a:r>
-          </a:p>
-        </p:txBody>
-      </p:sp>
-    </p:spTree>
-    <p:extLst>
-      <p:ext uri="{BB962C8B-B14F-4D97-AF65-F5344CB8AC3E}">
-        <p14:creationId xmlns:p14="http://schemas.microsoft.com/office/powerpoint/2010/main" val="1570907476"/>
       </p:ext>
     </p:extLst>
   </p:cSld>
@@ -12001,14 +10686,14 @@
               <ma14:placeholderFlag xmlns:ma14="http://schemas.microsoft.com/office/mac/drawingml/2011/main" val="1"/>
             </a:ext>
             <a:ext uri="{909E8E84-426E-40dd-AFC4-6F175D3DCCD1}">
-              <a14:hiddenFill xmlns:a14="http://schemas.microsoft.com/office/drawing/2010/main" xmlns="">
+              <a14:hiddenFill xmlns="" xmlns:a14="http://schemas.microsoft.com/office/drawing/2010/main">
                 <a:solidFill>
                   <a:srgbClr val="FFFFFF"/>
                 </a:solidFill>
               </a14:hiddenFill>
             </a:ext>
             <a:ext uri="{91240B29-F687-4f45-9708-019B960494DF}">
-              <a14:hiddenLine xmlns:a14="http://schemas.microsoft.com/office/drawing/2010/main" xmlns="" w="9525">
+              <a14:hiddenLine xmlns="" xmlns:a14="http://schemas.microsoft.com/office/drawing/2010/main" w="9525">
                 <a:solidFill>
                   <a:srgbClr val="000000"/>
                 </a:solidFill>
@@ -13757,14 +12442,14 @@
               <ma14:placeholderFlag xmlns:ma14="http://schemas.microsoft.com/office/mac/drawingml/2011/main" val="1"/>
             </a:ext>
             <a:ext uri="{909E8E84-426E-40dd-AFC4-6F175D3DCCD1}">
-              <a14:hiddenFill xmlns:a14="http://schemas.microsoft.com/office/drawing/2010/main" xmlns="">
+              <a14:hiddenFill xmlns="" xmlns:a14="http://schemas.microsoft.com/office/drawing/2010/main">
                 <a:solidFill>
                   <a:srgbClr val="FFFFFF"/>
                 </a:solidFill>
               </a14:hiddenFill>
             </a:ext>
             <a:ext uri="{91240B29-F687-4f45-9708-019B960494DF}">
-              <a14:hiddenLine xmlns:a14="http://schemas.microsoft.com/office/drawing/2010/main" xmlns="" w="9525">
+              <a14:hiddenLine xmlns="" xmlns:a14="http://schemas.microsoft.com/office/drawing/2010/main" w="9525">
                 <a:solidFill>
                   <a:srgbClr val="000000"/>
                 </a:solidFill>
@@ -14286,14 +12971,14 @@
               <ma14:placeholderFlag xmlns:ma14="http://schemas.microsoft.com/office/mac/drawingml/2011/main" val="1"/>
             </a:ext>
             <a:ext uri="{909E8E84-426E-40dd-AFC4-6F175D3DCCD1}">
-              <a14:hiddenFill xmlns:a14="http://schemas.microsoft.com/office/drawing/2010/main" xmlns="">
+              <a14:hiddenFill xmlns="" xmlns:a14="http://schemas.microsoft.com/office/drawing/2010/main">
                 <a:solidFill>
                   <a:srgbClr val="FFFFFF"/>
                 </a:solidFill>
               </a14:hiddenFill>
             </a:ext>
             <a:ext uri="{91240B29-F687-4f45-9708-019B960494DF}">
-              <a14:hiddenLine xmlns:a14="http://schemas.microsoft.com/office/drawing/2010/main" xmlns="" w="9525">
+              <a14:hiddenLine xmlns="" xmlns:a14="http://schemas.microsoft.com/office/drawing/2010/main" w="9525">
                 <a:solidFill>
                   <a:srgbClr val="000000"/>
                 </a:solidFill>
@@ -14773,14 +13458,14 @@
               <ma14:placeholderFlag xmlns:ma14="http://schemas.microsoft.com/office/mac/drawingml/2011/main" val="1"/>
             </a:ext>
             <a:ext uri="{909E8E84-426E-40dd-AFC4-6F175D3DCCD1}">
-              <a14:hiddenFill xmlns:a14="http://schemas.microsoft.com/office/drawing/2010/main" xmlns="">
+              <a14:hiddenFill xmlns="" xmlns:a14="http://schemas.microsoft.com/office/drawing/2010/main">
                 <a:solidFill>
                   <a:srgbClr val="FFFFFF"/>
                 </a:solidFill>
               </a14:hiddenFill>
             </a:ext>
             <a:ext uri="{91240B29-F687-4f45-9708-019B960494DF}">
-              <a14:hiddenLine xmlns:a14="http://schemas.microsoft.com/office/drawing/2010/main" xmlns="" w="9525">
+              <a14:hiddenLine xmlns="" xmlns:a14="http://schemas.microsoft.com/office/drawing/2010/main" w="9525">
                 <a:solidFill>
                   <a:srgbClr val="000000"/>
                 </a:solidFill>

</xml_diff>

<commit_message>
changed age component in tables
</commit_message>
<xml_diff>
--- a/labs/lab2/lab2.pptx
+++ b/labs/lab2/lab2.pptx
@@ -257,7 +257,7 @@
           <a:p>
             <a:fld id="{F591BB15-DE40-F842-8059-510BF077C15F}" type="datetimeFigureOut">
               <a:rPr lang="en-US" smtClean="0"/>
-              <a:t>1/21/18</a:t>
+              <a:t>1/26/18</a:t>
             </a:fld>
             <a:endParaRPr lang="en-US"/>
           </a:p>
@@ -8951,35 +8951,37 @@
                 <a:ea typeface="Times" charset="0"/>
                 <a:cs typeface="Times" charset="0"/>
               </a:rPr>
-              <a:t>’, ‘59’)</a:t>
-            </a:r>
-          </a:p>
-          <a:p>
-            <a:pPr lvl="1"/>
-            <a:r>
-              <a:rPr lang="tr-TR" dirty="0">
+              <a:t>’, </a:t>
+            </a:r>
+            <a:r>
+              <a:rPr lang="tr-TR" dirty="0" smtClean="0">
                 <a:latin typeface="Times" charset="0"/>
                 <a:ea typeface="Times" charset="0"/>
                 <a:cs typeface="Times" charset="0"/>
               </a:rPr>
-              <a:t>(‘Smith’, ‘</a:t>
-            </a:r>
-            <a:r>
-              <a:rPr lang="tr-TR" dirty="0" err="1">
+              <a:t>‘</a:t>
+            </a:r>
+            <a:r>
+              <a:rPr lang="tr-TR" dirty="0" smtClean="0">
                 <a:latin typeface="Times" charset="0"/>
                 <a:ea typeface="Times" charset="0"/>
                 <a:cs typeface="Times" charset="0"/>
               </a:rPr>
-              <a:t>Ottawa</a:t>
-            </a:r>
-            <a:r>
-              <a:rPr lang="tr-TR" dirty="0">
+              <a:t>1571-09-28</a:t>
+            </a:r>
+            <a:r>
+              <a:rPr lang="tr-TR" dirty="0" smtClean="0">
                 <a:latin typeface="Times" charset="0"/>
                 <a:ea typeface="Times" charset="0"/>
                 <a:cs typeface="Times" charset="0"/>
               </a:rPr>
-              <a:t>’, ‘Modern’, ‘33’)</a:t>
-            </a:r>
+              <a:t>’)</a:t>
+            </a:r>
+            <a:endParaRPr lang="tr-TR" dirty="0">
+              <a:latin typeface="Times" charset="0"/>
+              <a:ea typeface="Times" charset="0"/>
+              <a:cs typeface="Times" charset="0"/>
+            </a:endParaRPr>
           </a:p>
           <a:p>
             <a:pPr lvl="1"/>
@@ -8989,7 +8991,7 @@
                 <a:ea typeface="Times" charset="0"/>
                 <a:cs typeface="Times" charset="0"/>
               </a:rPr>
-              <a:t>(‘Picasso’, ‘Malaga’, ‘</a:t>
+              <a:t>(‘Smith’, ‘</a:t>
             </a:r>
             <a:r>
               <a:rPr lang="tr-TR" dirty="0" err="1">
@@ -8997,7 +8999,7 @@
                 <a:ea typeface="Times" charset="0"/>
                 <a:cs typeface="Times" charset="0"/>
               </a:rPr>
-              <a:t>Cubism</a:t>
+              <a:t>Ottawa</a:t>
             </a:r>
             <a:r>
               <a:rPr lang="tr-TR" dirty="0">
@@ -9005,7 +9007,7 @@
                 <a:ea typeface="Times" charset="0"/>
                 <a:cs typeface="Times" charset="0"/>
               </a:rPr>
-              <a:t>’, ‘40</a:t>
+              <a:t>’, ‘Modern’, </a:t>
             </a:r>
             <a:r>
               <a:rPr lang="tr-TR" dirty="0" smtClean="0">
@@ -9013,8 +9015,85 @@
                 <a:ea typeface="Times" charset="0"/>
                 <a:cs typeface="Times" charset="0"/>
               </a:rPr>
+              <a:t>‘</a:t>
+            </a:r>
+            <a:r>
+              <a:rPr lang="tr-TR" dirty="0" smtClean="0">
+                <a:latin typeface="Times" charset="0"/>
+                <a:ea typeface="Times" charset="0"/>
+                <a:cs typeface="Times" charset="0"/>
+              </a:rPr>
+              <a:t>1977-12-12</a:t>
+            </a:r>
+            <a:r>
+              <a:rPr lang="tr-TR" dirty="0" smtClean="0">
+                <a:latin typeface="Times" charset="0"/>
+                <a:ea typeface="Times" charset="0"/>
+                <a:cs typeface="Times" charset="0"/>
+              </a:rPr>
               <a:t>’)</a:t>
             </a:r>
+            <a:endParaRPr lang="tr-TR" dirty="0">
+              <a:latin typeface="Times" charset="0"/>
+              <a:ea typeface="Times" charset="0"/>
+              <a:cs typeface="Times" charset="0"/>
+            </a:endParaRPr>
+          </a:p>
+          <a:p>
+            <a:pPr lvl="1"/>
+            <a:r>
+              <a:rPr lang="tr-TR" dirty="0">
+                <a:latin typeface="Times" charset="0"/>
+                <a:ea typeface="Times" charset="0"/>
+                <a:cs typeface="Times" charset="0"/>
+              </a:rPr>
+              <a:t>(‘Picasso’, ‘Malaga’, ‘</a:t>
+            </a:r>
+            <a:r>
+              <a:rPr lang="tr-TR" dirty="0" err="1">
+                <a:latin typeface="Times" charset="0"/>
+                <a:ea typeface="Times" charset="0"/>
+                <a:cs typeface="Times" charset="0"/>
+              </a:rPr>
+              <a:t>Cubism</a:t>
+            </a:r>
+            <a:r>
+              <a:rPr lang="tr-TR" dirty="0">
+                <a:latin typeface="Times" charset="0"/>
+                <a:ea typeface="Times" charset="0"/>
+                <a:cs typeface="Times" charset="0"/>
+              </a:rPr>
+              <a:t>’, </a:t>
+            </a:r>
+            <a:r>
+              <a:rPr lang="tr-TR" dirty="0" smtClean="0">
+                <a:latin typeface="Times" charset="0"/>
+                <a:ea typeface="Times" charset="0"/>
+                <a:cs typeface="Times" charset="0"/>
+              </a:rPr>
+              <a:t>‘</a:t>
+            </a:r>
+            <a:r>
+              <a:rPr lang="tr-TR" dirty="0" smtClean="0">
+                <a:latin typeface="Times" charset="0"/>
+                <a:ea typeface="Times" charset="0"/>
+                <a:cs typeface="Times" charset="0"/>
+              </a:rPr>
+              <a:t>1881-10-25</a:t>
+            </a:r>
+            <a:r>
+              <a:rPr lang="tr-TR" dirty="0" smtClean="0">
+                <a:latin typeface="Times" charset="0"/>
+                <a:ea typeface="Times" charset="0"/>
+                <a:cs typeface="Times" charset="0"/>
+              </a:rPr>
+              <a:t>’)</a:t>
+            </a:r>
+            <a:endParaRPr lang="tr-TR" dirty="0" smtClean="0">
+              <a:latin typeface="Times" charset="0"/>
+              <a:ea typeface="Times" charset="0"/>
+              <a:cs typeface="Times" charset="0"/>
+            </a:endParaRPr>
           </a:p>
           <a:p>
             <a:r>
@@ -10445,21 +10524,8 @@
                 <a:ea typeface="Times" charset="0"/>
                 <a:cs typeface="Times" charset="0"/>
               </a:rPr>
-              <a:t>If we don’t finish the lab during the lab time, you need to complete it on your own time – labs might build on each other</a:t>
-            </a:r>
-            <a:r>
-              <a:rPr lang="en-US" dirty="0" smtClean="0">
-                <a:latin typeface="Times" charset="0"/>
-                <a:ea typeface="Times" charset="0"/>
-                <a:cs typeface="Times" charset="0"/>
-              </a:rPr>
-              <a:t>.</a:t>
-            </a:r>
-            <a:endParaRPr lang="en-US" dirty="0" smtClean="0">
-              <a:latin typeface="Times" charset="0"/>
-              <a:ea typeface="Times" charset="0"/>
-              <a:cs typeface="Times" charset="0"/>
-            </a:endParaRPr>
+              <a:t>If we don’t finish the lab during the lab time, you need to complete it on your own time – labs might build on each other.</a:t>
+            </a:r>
           </a:p>
         </p:txBody>
       </p:sp>
@@ -11446,8 +11512,8 @@
         </p:nvSpPr>
         <p:spPr>
           <a:xfrm>
-            <a:off x="5362893" y="1526504"/>
-            <a:ext cx="3240360" cy="1323439"/>
+            <a:off x="5309944" y="1412776"/>
+            <a:ext cx="3240360" cy="1631216"/>
           </a:xfrm>
           <a:prstGeom prst="rect">
             <a:avLst/>
@@ -11481,8 +11547,35 @@
                 <a:ea typeface="Consolas" charset="0"/>
                 <a:cs typeface="Consolas" charset="0"/>
               </a:rPr>
-              <a:t>VARCHAR(n)</a:t>
-            </a:r>
+              <a:t>VARCHAR(n</a:t>
+            </a:r>
+            <a:r>
+              <a:rPr lang="en-US" sz="2000" dirty="0" smtClean="0">
+                <a:latin typeface="Consolas" charset="0"/>
+                <a:ea typeface="Consolas" charset="0"/>
+                <a:cs typeface="Consolas" charset="0"/>
+              </a:rPr>
+              <a:t>)</a:t>
+            </a:r>
+          </a:p>
+          <a:p>
+            <a:pPr marL="342900" indent="-342900">
+              <a:buFont typeface="Arial" charset="0"/>
+              <a:buChar char="•"/>
+            </a:pPr>
+            <a:r>
+              <a:rPr lang="en-US" sz="2000" dirty="0" smtClean="0">
+                <a:latin typeface="Consolas" charset="0"/>
+                <a:ea typeface="Consolas" charset="0"/>
+                <a:cs typeface="Consolas" charset="0"/>
+              </a:rPr>
+              <a:t>DATE</a:t>
+            </a:r>
+            <a:endParaRPr lang="en-US" sz="2000" dirty="0" smtClean="0">
+              <a:latin typeface="Consolas" charset="0"/>
+              <a:ea typeface="Consolas" charset="0"/>
+              <a:cs typeface="Consolas" charset="0"/>
+            </a:endParaRPr>
           </a:p>
           <a:p>
             <a:pPr marL="342900" indent="-342900">
@@ -12126,36 +12219,6 @@
           <a:chExt cx="0" cy="0"/>
         </a:xfrm>
       </p:grpSpPr>
-      <p:pic>
-        <p:nvPicPr>
-          <p:cNvPr id="11" name="Picture 10"/>
-          <p:cNvPicPr>
-            <a:picLocks noChangeAspect="1"/>
-          </p:cNvPicPr>
-          <p:nvPr/>
-        </p:nvPicPr>
-        <p:blipFill>
-          <a:blip r:embed="rId2">
-            <a:extLst>
-              <a:ext uri="{28A0092B-C50C-407E-A947-70E740481C1C}">
-                <a14:useLocalDpi xmlns:a14="http://schemas.microsoft.com/office/drawing/2010/main" val="0"/>
-              </a:ext>
-            </a:extLst>
-          </a:blip>
-          <a:stretch>
-            <a:fillRect/>
-          </a:stretch>
-        </p:blipFill>
-        <p:spPr>
-          <a:xfrm>
-            <a:off x="847618" y="1052736"/>
-            <a:ext cx="7416824" cy="4872741"/>
-          </a:xfrm>
-          <a:prstGeom prst="rect">
-            <a:avLst/>
-          </a:prstGeom>
-        </p:spPr>
-      </p:pic>
       <p:sp>
         <p:nvSpPr>
           <p:cNvPr id="13" name="Title 1"/>
@@ -12184,6 +12247,974 @@
           </a:p>
         </p:txBody>
       </p:sp>
+      <p:graphicFrame>
+        <p:nvGraphicFramePr>
+          <p:cNvPr id="3" name="Table 2"/>
+          <p:cNvGraphicFramePr>
+            <a:graphicFrameLocks noGrp="1"/>
+          </p:cNvGraphicFramePr>
+          <p:nvPr>
+            <p:extLst>
+              <p:ext uri="{D42A27DB-BD31-4B8C-83A1-F6EECF244321}">
+                <p14:modId xmlns:p14="http://schemas.microsoft.com/office/powerpoint/2010/main" val="1239900902"/>
+              </p:ext>
+            </p:extLst>
+          </p:nvPr>
+        </p:nvGraphicFramePr>
+        <p:xfrm>
+          <a:off x="419708" y="1268760"/>
+          <a:ext cx="3576228" cy="1887985"/>
+        </p:xfrm>
+        <a:graphic>
+          <a:graphicData uri="http://schemas.openxmlformats.org/drawingml/2006/table">
+            <a:tbl>
+              <a:tblPr firstRow="1" bandRow="1">
+                <a:tableStyleId>{5940675A-B579-460E-94D1-54222C63F5DA}</a:tableStyleId>
+              </a:tblPr>
+              <a:tblGrid>
+                <a:gridCol w="1192076"/>
+                <a:gridCol w="1192076"/>
+                <a:gridCol w="1192076"/>
+              </a:tblGrid>
+              <a:tr h="377597">
+                <a:tc gridSpan="3">
+                  <a:txBody>
+                    <a:bodyPr/>
+                    <a:lstStyle/>
+                    <a:p>
+                      <a:pPr algn="ctr"/>
+                      <a:r>
+                        <a:rPr lang="en-US" b="1" dirty="0" smtClean="0"/>
+                        <a:t>Artist</a:t>
+                      </a:r>
+                      <a:endParaRPr lang="en-US" b="1" dirty="0"/>
+                    </a:p>
+                  </a:txBody>
+                  <a:tcPr/>
+                </a:tc>
+                <a:tc hMerge="1">
+                  <a:txBody>
+                    <a:bodyPr/>
+                    <a:lstStyle/>
+                    <a:p>
+                      <a:endParaRPr lang="en-US" dirty="0"/>
+                    </a:p>
+                  </a:txBody>
+                  <a:tcPr/>
+                </a:tc>
+                <a:tc hMerge="1">
+                  <a:txBody>
+                    <a:bodyPr/>
+                    <a:lstStyle/>
+                    <a:p>
+                      <a:endParaRPr lang="en-US" dirty="0"/>
+                    </a:p>
+                  </a:txBody>
+                  <a:tcPr/>
+                </a:tc>
+              </a:tr>
+              <a:tr h="377597">
+                <a:tc>
+                  <a:txBody>
+                    <a:bodyPr/>
+                    <a:lstStyle/>
+                    <a:p>
+                      <a:r>
+                        <a:rPr lang="en-US" sz="1400" dirty="0" err="1" smtClean="0"/>
+                        <a:t>AName</a:t>
+                      </a:r>
+                      <a:endParaRPr lang="en-US" sz="1400" dirty="0"/>
+                    </a:p>
+                  </a:txBody>
+                  <a:tcPr/>
+                </a:tc>
+                <a:tc>
+                  <a:txBody>
+                    <a:bodyPr/>
+                    <a:lstStyle/>
+                    <a:p>
+                      <a:r>
+                        <a:rPr lang="en-US" sz="1400" dirty="0" smtClean="0"/>
+                        <a:t>varchar(20)</a:t>
+                      </a:r>
+                      <a:endParaRPr lang="en-US" sz="1400" dirty="0"/>
+                    </a:p>
+                  </a:txBody>
+                  <a:tcPr/>
+                </a:tc>
+                <a:tc>
+                  <a:txBody>
+                    <a:bodyPr/>
+                    <a:lstStyle/>
+                    <a:p>
+                      <a:r>
+                        <a:rPr lang="en-US" sz="1400" dirty="0" smtClean="0"/>
+                        <a:t>primary key</a:t>
+                      </a:r>
+                      <a:endParaRPr lang="en-US" sz="1400" dirty="0"/>
+                    </a:p>
+                  </a:txBody>
+                  <a:tcPr/>
+                </a:tc>
+              </a:tr>
+              <a:tr h="377597">
+                <a:tc>
+                  <a:txBody>
+                    <a:bodyPr/>
+                    <a:lstStyle/>
+                    <a:p>
+                      <a:r>
+                        <a:rPr lang="en-US" sz="1400" dirty="0" smtClean="0"/>
+                        <a:t>Birthplace</a:t>
+                      </a:r>
+                      <a:endParaRPr lang="en-US" sz="1400" dirty="0"/>
+                    </a:p>
+                  </a:txBody>
+                  <a:tcPr/>
+                </a:tc>
+                <a:tc>
+                  <a:txBody>
+                    <a:bodyPr/>
+                    <a:lstStyle/>
+                    <a:p>
+                      <a:r>
+                        <a:rPr lang="en-US" sz="1400" dirty="0" smtClean="0"/>
+                        <a:t>varchar(20)</a:t>
+                      </a:r>
+                      <a:endParaRPr lang="en-US" sz="1400" dirty="0"/>
+                    </a:p>
+                  </a:txBody>
+                  <a:tcPr/>
+                </a:tc>
+                <a:tc>
+                  <a:txBody>
+                    <a:bodyPr/>
+                    <a:lstStyle/>
+                    <a:p>
+                      <a:endParaRPr lang="en-US" sz="1400"/>
+                    </a:p>
+                  </a:txBody>
+                  <a:tcPr/>
+                </a:tc>
+              </a:tr>
+              <a:tr h="377597">
+                <a:tc>
+                  <a:txBody>
+                    <a:bodyPr/>
+                    <a:lstStyle/>
+                    <a:p>
+                      <a:r>
+                        <a:rPr lang="en-US" sz="1400" dirty="0" smtClean="0"/>
+                        <a:t>Style</a:t>
+                      </a:r>
+                      <a:endParaRPr lang="en-US" sz="1400" dirty="0"/>
+                    </a:p>
+                  </a:txBody>
+                  <a:tcPr/>
+                </a:tc>
+                <a:tc>
+                  <a:txBody>
+                    <a:bodyPr/>
+                    <a:lstStyle/>
+                    <a:p>
+                      <a:r>
+                        <a:rPr lang="en-US" sz="1400" dirty="0" smtClean="0"/>
+                        <a:t>varchar(20)</a:t>
+                      </a:r>
+                      <a:endParaRPr lang="en-US" sz="1400" dirty="0"/>
+                    </a:p>
+                  </a:txBody>
+                  <a:tcPr/>
+                </a:tc>
+                <a:tc>
+                  <a:txBody>
+                    <a:bodyPr/>
+                    <a:lstStyle/>
+                    <a:p>
+                      <a:endParaRPr lang="en-US" sz="1400"/>
+                    </a:p>
+                  </a:txBody>
+                  <a:tcPr/>
+                </a:tc>
+              </a:tr>
+              <a:tr h="377597">
+                <a:tc>
+                  <a:txBody>
+                    <a:bodyPr/>
+                    <a:lstStyle/>
+                    <a:p>
+                      <a:r>
+                        <a:rPr lang="en-US" sz="1400" dirty="0" err="1" smtClean="0"/>
+                        <a:t>DateOfBirth</a:t>
+                      </a:r>
+                      <a:endParaRPr lang="en-US" sz="1400" dirty="0"/>
+                    </a:p>
+                  </a:txBody>
+                  <a:tcPr/>
+                </a:tc>
+                <a:tc>
+                  <a:txBody>
+                    <a:bodyPr/>
+                    <a:lstStyle/>
+                    <a:p>
+                      <a:r>
+                        <a:rPr lang="en-US" sz="1400" dirty="0" smtClean="0"/>
+                        <a:t>date</a:t>
+                      </a:r>
+                      <a:endParaRPr lang="en-US" sz="1400" dirty="0"/>
+                    </a:p>
+                  </a:txBody>
+                  <a:tcPr/>
+                </a:tc>
+                <a:tc>
+                  <a:txBody>
+                    <a:bodyPr/>
+                    <a:lstStyle/>
+                    <a:p>
+                      <a:endParaRPr lang="en-US" sz="1400" dirty="0"/>
+                    </a:p>
+                  </a:txBody>
+                  <a:tcPr/>
+                </a:tc>
+              </a:tr>
+            </a:tbl>
+          </a:graphicData>
+        </a:graphic>
+      </p:graphicFrame>
+      <p:graphicFrame>
+        <p:nvGraphicFramePr>
+          <p:cNvPr id="6" name="Table 5"/>
+          <p:cNvGraphicFramePr>
+            <a:graphicFrameLocks noGrp="1"/>
+          </p:cNvGraphicFramePr>
+          <p:nvPr>
+            <p:extLst>
+              <p:ext uri="{D42A27DB-BD31-4B8C-83A1-F6EECF244321}">
+                <p14:modId xmlns:p14="http://schemas.microsoft.com/office/powerpoint/2010/main" val="1450939579"/>
+              </p:ext>
+            </p:extLst>
+          </p:nvPr>
+        </p:nvGraphicFramePr>
+        <p:xfrm>
+          <a:off x="4784930" y="1268759"/>
+          <a:ext cx="3576228" cy="1887985"/>
+        </p:xfrm>
+        <a:graphic>
+          <a:graphicData uri="http://schemas.openxmlformats.org/drawingml/2006/table">
+            <a:tbl>
+              <a:tblPr firstRow="1" bandRow="1">
+                <a:tableStyleId>{5940675A-B579-460E-94D1-54222C63F5DA}</a:tableStyleId>
+              </a:tblPr>
+              <a:tblGrid>
+                <a:gridCol w="1192076"/>
+                <a:gridCol w="1192076"/>
+                <a:gridCol w="1192076"/>
+              </a:tblGrid>
+              <a:tr h="377597">
+                <a:tc gridSpan="3">
+                  <a:txBody>
+                    <a:bodyPr/>
+                    <a:lstStyle/>
+                    <a:p>
+                      <a:pPr algn="ctr"/>
+                      <a:r>
+                        <a:rPr lang="en-US" b="1" dirty="0" smtClean="0"/>
+                        <a:t>Customer</a:t>
+                      </a:r>
+                      <a:endParaRPr lang="en-US" b="1" dirty="0"/>
+                    </a:p>
+                  </a:txBody>
+                  <a:tcPr/>
+                </a:tc>
+                <a:tc hMerge="1">
+                  <a:txBody>
+                    <a:bodyPr/>
+                    <a:lstStyle/>
+                    <a:p>
+                      <a:endParaRPr lang="en-US" dirty="0"/>
+                    </a:p>
+                  </a:txBody>
+                  <a:tcPr/>
+                </a:tc>
+                <a:tc hMerge="1">
+                  <a:txBody>
+                    <a:bodyPr/>
+                    <a:lstStyle/>
+                    <a:p>
+                      <a:endParaRPr lang="en-US" dirty="0"/>
+                    </a:p>
+                  </a:txBody>
+                  <a:tcPr/>
+                </a:tc>
+              </a:tr>
+              <a:tr h="377597">
+                <a:tc>
+                  <a:txBody>
+                    <a:bodyPr/>
+                    <a:lstStyle/>
+                    <a:p>
+                      <a:r>
+                        <a:rPr lang="en-US" sz="1400" dirty="0" err="1" smtClean="0"/>
+                        <a:t>Cust_id</a:t>
+                      </a:r>
+                      <a:endParaRPr lang="en-US" sz="1400" dirty="0"/>
+                    </a:p>
+                  </a:txBody>
+                  <a:tcPr/>
+                </a:tc>
+                <a:tc>
+                  <a:txBody>
+                    <a:bodyPr/>
+                    <a:lstStyle/>
+                    <a:p>
+                      <a:r>
+                        <a:rPr lang="en-US" sz="1400" dirty="0" smtClean="0"/>
+                        <a:t>integer</a:t>
+                      </a:r>
+                      <a:endParaRPr lang="en-US" sz="1400" dirty="0"/>
+                    </a:p>
+                  </a:txBody>
+                  <a:tcPr/>
+                </a:tc>
+                <a:tc>
+                  <a:txBody>
+                    <a:bodyPr/>
+                    <a:lstStyle/>
+                    <a:p>
+                      <a:r>
+                        <a:rPr lang="en-US" sz="1400" dirty="0" smtClean="0"/>
+                        <a:t>primary key</a:t>
+                      </a:r>
+                      <a:endParaRPr lang="en-US" sz="1400" dirty="0"/>
+                    </a:p>
+                  </a:txBody>
+                  <a:tcPr/>
+                </a:tc>
+              </a:tr>
+              <a:tr h="377597">
+                <a:tc>
+                  <a:txBody>
+                    <a:bodyPr/>
+                    <a:lstStyle/>
+                    <a:p>
+                      <a:r>
+                        <a:rPr lang="en-US" sz="1400" dirty="0" smtClean="0"/>
+                        <a:t>Name</a:t>
+                      </a:r>
+                      <a:endParaRPr lang="en-US" sz="1400" dirty="0"/>
+                    </a:p>
+                  </a:txBody>
+                  <a:tcPr/>
+                </a:tc>
+                <a:tc>
+                  <a:txBody>
+                    <a:bodyPr/>
+                    <a:lstStyle/>
+                    <a:p>
+                      <a:r>
+                        <a:rPr lang="en-US" sz="1400" dirty="0" smtClean="0"/>
+                        <a:t>varchar(20)</a:t>
+                      </a:r>
+                      <a:endParaRPr lang="en-US" sz="1400" dirty="0"/>
+                    </a:p>
+                  </a:txBody>
+                  <a:tcPr/>
+                </a:tc>
+                <a:tc>
+                  <a:txBody>
+                    <a:bodyPr/>
+                    <a:lstStyle/>
+                    <a:p>
+                      <a:endParaRPr lang="en-US" sz="1400"/>
+                    </a:p>
+                  </a:txBody>
+                  <a:tcPr/>
+                </a:tc>
+              </a:tr>
+              <a:tr h="377597">
+                <a:tc>
+                  <a:txBody>
+                    <a:bodyPr/>
+                    <a:lstStyle/>
+                    <a:p>
+                      <a:r>
+                        <a:rPr lang="en-US" sz="1400" dirty="0" smtClean="0"/>
+                        <a:t>Address</a:t>
+                      </a:r>
+                      <a:endParaRPr lang="en-US" sz="1400" dirty="0"/>
+                    </a:p>
+                  </a:txBody>
+                  <a:tcPr/>
+                </a:tc>
+                <a:tc>
+                  <a:txBody>
+                    <a:bodyPr/>
+                    <a:lstStyle/>
+                    <a:p>
+                      <a:r>
+                        <a:rPr lang="en-US" sz="1400" dirty="0" smtClean="0"/>
+                        <a:t>varchar(20)</a:t>
+                      </a:r>
+                      <a:endParaRPr lang="en-US" sz="1400" dirty="0"/>
+                    </a:p>
+                  </a:txBody>
+                  <a:tcPr/>
+                </a:tc>
+                <a:tc>
+                  <a:txBody>
+                    <a:bodyPr/>
+                    <a:lstStyle/>
+                    <a:p>
+                      <a:endParaRPr lang="en-US" sz="1400"/>
+                    </a:p>
+                  </a:txBody>
+                  <a:tcPr/>
+                </a:tc>
+              </a:tr>
+              <a:tr h="377597">
+                <a:tc>
+                  <a:txBody>
+                    <a:bodyPr/>
+                    <a:lstStyle/>
+                    <a:p>
+                      <a:r>
+                        <a:rPr lang="en-US" sz="1400" dirty="0" smtClean="0"/>
+                        <a:t>Amount</a:t>
+                      </a:r>
+                      <a:endParaRPr lang="en-US" sz="1400" dirty="0"/>
+                    </a:p>
+                  </a:txBody>
+                  <a:tcPr/>
+                </a:tc>
+                <a:tc>
+                  <a:txBody>
+                    <a:bodyPr/>
+                    <a:lstStyle/>
+                    <a:p>
+                      <a:r>
+                        <a:rPr lang="en-US" sz="1400" dirty="0" smtClean="0"/>
+                        <a:t>numeric(8,2)</a:t>
+                      </a:r>
+                      <a:endParaRPr lang="en-US" sz="1400" dirty="0"/>
+                    </a:p>
+                  </a:txBody>
+                  <a:tcPr/>
+                </a:tc>
+                <a:tc>
+                  <a:txBody>
+                    <a:bodyPr/>
+                    <a:lstStyle/>
+                    <a:p>
+                      <a:endParaRPr lang="en-US" sz="1400" dirty="0"/>
+                    </a:p>
+                  </a:txBody>
+                  <a:tcPr/>
+                </a:tc>
+              </a:tr>
+            </a:tbl>
+          </a:graphicData>
+        </a:graphic>
+      </p:graphicFrame>
+      <p:graphicFrame>
+        <p:nvGraphicFramePr>
+          <p:cNvPr id="7" name="Table 6"/>
+          <p:cNvGraphicFramePr>
+            <a:graphicFrameLocks noGrp="1"/>
+          </p:cNvGraphicFramePr>
+          <p:nvPr>
+            <p:extLst>
+              <p:ext uri="{D42A27DB-BD31-4B8C-83A1-F6EECF244321}">
+                <p14:modId xmlns:p14="http://schemas.microsoft.com/office/powerpoint/2010/main" val="513228845"/>
+              </p:ext>
+            </p:extLst>
+          </p:nvPr>
+        </p:nvGraphicFramePr>
+        <p:xfrm>
+          <a:off x="419708" y="3645024"/>
+          <a:ext cx="3576228" cy="2265582"/>
+        </p:xfrm>
+        <a:graphic>
+          <a:graphicData uri="http://schemas.openxmlformats.org/drawingml/2006/table">
+            <a:tbl>
+              <a:tblPr firstRow="1" bandRow="1">
+                <a:tableStyleId>{5940675A-B579-460E-94D1-54222C63F5DA}</a:tableStyleId>
+              </a:tblPr>
+              <a:tblGrid>
+                <a:gridCol w="1192076"/>
+                <a:gridCol w="1192076"/>
+                <a:gridCol w="1192076"/>
+              </a:tblGrid>
+              <a:tr h="377597">
+                <a:tc gridSpan="3">
+                  <a:txBody>
+                    <a:bodyPr/>
+                    <a:lstStyle/>
+                    <a:p>
+                      <a:pPr algn="ctr"/>
+                      <a:r>
+                        <a:rPr lang="en-US" b="1" dirty="0" smtClean="0"/>
+                        <a:t>Artwork</a:t>
+                      </a:r>
+                      <a:endParaRPr lang="en-US" b="1" dirty="0"/>
+                    </a:p>
+                  </a:txBody>
+                  <a:tcPr/>
+                </a:tc>
+                <a:tc hMerge="1">
+                  <a:txBody>
+                    <a:bodyPr/>
+                    <a:lstStyle/>
+                    <a:p>
+                      <a:endParaRPr lang="en-US" dirty="0"/>
+                    </a:p>
+                  </a:txBody>
+                  <a:tcPr/>
+                </a:tc>
+                <a:tc hMerge="1">
+                  <a:txBody>
+                    <a:bodyPr/>
+                    <a:lstStyle/>
+                    <a:p>
+                      <a:endParaRPr lang="en-US" dirty="0"/>
+                    </a:p>
+                  </a:txBody>
+                  <a:tcPr/>
+                </a:tc>
+              </a:tr>
+              <a:tr h="377597">
+                <a:tc>
+                  <a:txBody>
+                    <a:bodyPr/>
+                    <a:lstStyle/>
+                    <a:p>
+                      <a:r>
+                        <a:rPr lang="en-US" sz="1400" dirty="0" smtClean="0"/>
+                        <a:t>Title</a:t>
+                      </a:r>
+                      <a:endParaRPr lang="en-US" sz="1400" dirty="0"/>
+                    </a:p>
+                  </a:txBody>
+                  <a:tcPr/>
+                </a:tc>
+                <a:tc>
+                  <a:txBody>
+                    <a:bodyPr/>
+                    <a:lstStyle/>
+                    <a:p>
+                      <a:r>
+                        <a:rPr lang="en-US" sz="1400" dirty="0" smtClean="0"/>
+                        <a:t>varchar(20)</a:t>
+                      </a:r>
+                      <a:endParaRPr lang="en-US" sz="1400" dirty="0"/>
+                    </a:p>
+                  </a:txBody>
+                  <a:tcPr/>
+                </a:tc>
+                <a:tc>
+                  <a:txBody>
+                    <a:bodyPr/>
+                    <a:lstStyle/>
+                    <a:p>
+                      <a:r>
+                        <a:rPr lang="en-US" sz="1400" dirty="0" smtClean="0"/>
+                        <a:t>primary key</a:t>
+                      </a:r>
+                      <a:endParaRPr lang="en-US" sz="1400" dirty="0"/>
+                    </a:p>
+                  </a:txBody>
+                  <a:tcPr/>
+                </a:tc>
+              </a:tr>
+              <a:tr h="377597">
+                <a:tc>
+                  <a:txBody>
+                    <a:bodyPr/>
+                    <a:lstStyle/>
+                    <a:p>
+                      <a:r>
+                        <a:rPr lang="en-US" sz="1400" dirty="0" smtClean="0"/>
+                        <a:t>Year</a:t>
+                      </a:r>
+                      <a:endParaRPr lang="en-US" sz="1400" dirty="0"/>
+                    </a:p>
+                  </a:txBody>
+                  <a:tcPr/>
+                </a:tc>
+                <a:tc>
+                  <a:txBody>
+                    <a:bodyPr/>
+                    <a:lstStyle/>
+                    <a:p>
+                      <a:r>
+                        <a:rPr lang="en-US" sz="1400" dirty="0" smtClean="0"/>
+                        <a:t>integer</a:t>
+                      </a:r>
+                      <a:endParaRPr lang="en-US" sz="1400" dirty="0"/>
+                    </a:p>
+                  </a:txBody>
+                  <a:tcPr/>
+                </a:tc>
+                <a:tc>
+                  <a:txBody>
+                    <a:bodyPr/>
+                    <a:lstStyle/>
+                    <a:p>
+                      <a:endParaRPr lang="en-US" sz="1400"/>
+                    </a:p>
+                  </a:txBody>
+                  <a:tcPr/>
+                </a:tc>
+              </a:tr>
+              <a:tr h="377597">
+                <a:tc>
+                  <a:txBody>
+                    <a:bodyPr/>
+                    <a:lstStyle/>
+                    <a:p>
+                      <a:r>
+                        <a:rPr lang="en-US" sz="1400" dirty="0" smtClean="0"/>
+                        <a:t>Type</a:t>
+                      </a:r>
+                      <a:endParaRPr lang="en-US" sz="1400" dirty="0"/>
+                    </a:p>
+                  </a:txBody>
+                  <a:tcPr/>
+                </a:tc>
+                <a:tc>
+                  <a:txBody>
+                    <a:bodyPr/>
+                    <a:lstStyle/>
+                    <a:p>
+                      <a:r>
+                        <a:rPr lang="en-US" sz="1400" dirty="0" smtClean="0"/>
+                        <a:t>varchar(20)</a:t>
+                      </a:r>
+                      <a:endParaRPr lang="en-US" sz="1400" dirty="0"/>
+                    </a:p>
+                  </a:txBody>
+                  <a:tcPr/>
+                </a:tc>
+                <a:tc>
+                  <a:txBody>
+                    <a:bodyPr/>
+                    <a:lstStyle/>
+                    <a:p>
+                      <a:endParaRPr lang="en-US" sz="1400"/>
+                    </a:p>
+                  </a:txBody>
+                  <a:tcPr/>
+                </a:tc>
+              </a:tr>
+              <a:tr h="377597">
+                <a:tc>
+                  <a:txBody>
+                    <a:bodyPr/>
+                    <a:lstStyle/>
+                    <a:p>
+                      <a:r>
+                        <a:rPr lang="en-US" sz="1400" dirty="0" smtClean="0"/>
+                        <a:t>Price</a:t>
+                      </a:r>
+                      <a:endParaRPr lang="en-US" sz="1400" dirty="0"/>
+                    </a:p>
+                  </a:txBody>
+                  <a:tcPr/>
+                </a:tc>
+                <a:tc>
+                  <a:txBody>
+                    <a:bodyPr/>
+                    <a:lstStyle/>
+                    <a:p>
+                      <a:r>
+                        <a:rPr lang="en-US" sz="1400" dirty="0" smtClean="0"/>
+                        <a:t>numeric</a:t>
+                      </a:r>
+                      <a:r>
+                        <a:rPr lang="en-US" sz="1400" baseline="0" dirty="0" smtClean="0"/>
+                        <a:t>(8,2)</a:t>
+                      </a:r>
+                      <a:endParaRPr lang="en-US" sz="1400" dirty="0"/>
+                    </a:p>
+                  </a:txBody>
+                  <a:tcPr/>
+                </a:tc>
+                <a:tc>
+                  <a:txBody>
+                    <a:bodyPr/>
+                    <a:lstStyle/>
+                    <a:p>
+                      <a:endParaRPr lang="en-US" sz="1400" dirty="0"/>
+                    </a:p>
+                  </a:txBody>
+                  <a:tcPr/>
+                </a:tc>
+              </a:tr>
+              <a:tr h="377597">
+                <a:tc>
+                  <a:txBody>
+                    <a:bodyPr/>
+                    <a:lstStyle/>
+                    <a:p>
+                      <a:r>
+                        <a:rPr lang="en-US" sz="1400" dirty="0" err="1" smtClean="0"/>
+                        <a:t>AName</a:t>
+                      </a:r>
+                      <a:endParaRPr lang="en-US" sz="1400" dirty="0"/>
+                    </a:p>
+                  </a:txBody>
+                  <a:tcPr/>
+                </a:tc>
+                <a:tc>
+                  <a:txBody>
+                    <a:bodyPr/>
+                    <a:lstStyle/>
+                    <a:p>
+                      <a:r>
+                        <a:rPr lang="en-US" sz="1400" dirty="0" smtClean="0"/>
+                        <a:t>varchar(20)</a:t>
+                      </a:r>
+                      <a:endParaRPr lang="en-US" sz="1400" dirty="0"/>
+                    </a:p>
+                  </a:txBody>
+                  <a:tcPr/>
+                </a:tc>
+                <a:tc>
+                  <a:txBody>
+                    <a:bodyPr/>
+                    <a:lstStyle/>
+                    <a:p>
+                      <a:r>
+                        <a:rPr lang="en-US" sz="1400" dirty="0" smtClean="0"/>
+                        <a:t>foreign key</a:t>
+                      </a:r>
+                      <a:endParaRPr lang="en-US" sz="1400" dirty="0"/>
+                    </a:p>
+                  </a:txBody>
+                  <a:tcPr/>
+                </a:tc>
+              </a:tr>
+            </a:tbl>
+          </a:graphicData>
+        </a:graphic>
+      </p:graphicFrame>
+      <p:graphicFrame>
+        <p:nvGraphicFramePr>
+          <p:cNvPr id="8" name="Table 7"/>
+          <p:cNvGraphicFramePr>
+            <a:graphicFrameLocks noGrp="1"/>
+          </p:cNvGraphicFramePr>
+          <p:nvPr>
+            <p:extLst>
+              <p:ext uri="{D42A27DB-BD31-4B8C-83A1-F6EECF244321}">
+                <p14:modId xmlns:p14="http://schemas.microsoft.com/office/powerpoint/2010/main" val="2008638888"/>
+              </p:ext>
+            </p:extLst>
+          </p:nvPr>
+        </p:nvGraphicFramePr>
+        <p:xfrm>
+          <a:off x="4813861" y="3703919"/>
+          <a:ext cx="3532232" cy="1650951"/>
+        </p:xfrm>
+        <a:graphic>
+          <a:graphicData uri="http://schemas.openxmlformats.org/drawingml/2006/table">
+            <a:tbl>
+              <a:tblPr firstRow="1" bandRow="1">
+                <a:tableStyleId>{5940675A-B579-460E-94D1-54222C63F5DA}</a:tableStyleId>
+              </a:tblPr>
+              <a:tblGrid>
+                <a:gridCol w="1192076"/>
+                <a:gridCol w="1192076"/>
+                <a:gridCol w="1148080"/>
+              </a:tblGrid>
+              <a:tr h="377597">
+                <a:tc gridSpan="3">
+                  <a:txBody>
+                    <a:bodyPr/>
+                    <a:lstStyle/>
+                    <a:p>
+                      <a:pPr algn="ctr"/>
+                      <a:r>
+                        <a:rPr lang="en-US" b="1" dirty="0" err="1" smtClean="0"/>
+                        <a:t>Like_Artist</a:t>
+                      </a:r>
+                      <a:endParaRPr lang="en-US" b="1" dirty="0"/>
+                    </a:p>
+                  </a:txBody>
+                  <a:tcPr/>
+                </a:tc>
+                <a:tc hMerge="1">
+                  <a:txBody>
+                    <a:bodyPr/>
+                    <a:lstStyle/>
+                    <a:p>
+                      <a:endParaRPr lang="en-US" dirty="0"/>
+                    </a:p>
+                  </a:txBody>
+                  <a:tcPr/>
+                </a:tc>
+                <a:tc hMerge="1">
+                  <a:txBody>
+                    <a:bodyPr/>
+                    <a:lstStyle/>
+                    <a:p>
+                      <a:endParaRPr lang="en-US" dirty="0"/>
+                    </a:p>
+                  </a:txBody>
+                  <a:tcPr/>
+                </a:tc>
+              </a:tr>
+              <a:tr h="377597">
+                <a:tc>
+                  <a:txBody>
+                    <a:bodyPr/>
+                    <a:lstStyle/>
+                    <a:p>
+                      <a:r>
+                        <a:rPr lang="en-US" sz="1400" dirty="0" err="1" smtClean="0"/>
+                        <a:t>Cust_id</a:t>
+                      </a:r>
+                      <a:endParaRPr lang="en-US" sz="1400" dirty="0"/>
+                    </a:p>
+                  </a:txBody>
+                  <a:tcPr/>
+                </a:tc>
+                <a:tc>
+                  <a:txBody>
+                    <a:bodyPr/>
+                    <a:lstStyle/>
+                    <a:p>
+                      <a:r>
+                        <a:rPr lang="en-US" sz="1400" dirty="0" smtClean="0"/>
+                        <a:t>integer</a:t>
+                      </a:r>
+                      <a:endParaRPr lang="en-US" sz="1400" dirty="0"/>
+                    </a:p>
+                  </a:txBody>
+                  <a:tcPr/>
+                </a:tc>
+                <a:tc>
+                  <a:txBody>
+                    <a:bodyPr/>
+                    <a:lstStyle/>
+                    <a:p>
+                      <a:r>
+                        <a:rPr lang="en-US" sz="1400" dirty="0" smtClean="0"/>
+                        <a:t>foreign</a:t>
+                      </a:r>
+                      <a:r>
+                        <a:rPr lang="en-US" sz="1400" baseline="0" dirty="0" smtClean="0"/>
+                        <a:t> key</a:t>
+                      </a:r>
+                      <a:endParaRPr lang="en-US" sz="1400" dirty="0"/>
+                    </a:p>
+                  </a:txBody>
+                  <a:tcPr/>
+                </a:tc>
+              </a:tr>
+              <a:tr h="377597">
+                <a:tc>
+                  <a:txBody>
+                    <a:bodyPr/>
+                    <a:lstStyle/>
+                    <a:p>
+                      <a:r>
+                        <a:rPr lang="en-US" sz="1400" dirty="0" err="1" smtClean="0"/>
+                        <a:t>AName</a:t>
+                      </a:r>
+                      <a:endParaRPr lang="en-US" sz="1400" dirty="0"/>
+                    </a:p>
+                  </a:txBody>
+                  <a:tcPr/>
+                </a:tc>
+                <a:tc>
+                  <a:txBody>
+                    <a:bodyPr/>
+                    <a:lstStyle/>
+                    <a:p>
+                      <a:r>
+                        <a:rPr lang="en-US" sz="1400" dirty="0" smtClean="0"/>
+                        <a:t>varchar(20)</a:t>
+                      </a:r>
+                      <a:endParaRPr lang="en-US" sz="1400" dirty="0"/>
+                    </a:p>
+                  </a:txBody>
+                  <a:tcPr/>
+                </a:tc>
+                <a:tc>
+                  <a:txBody>
+                    <a:bodyPr/>
+                    <a:lstStyle/>
+                    <a:p>
+                      <a:r>
+                        <a:rPr lang="en-US" sz="1400" dirty="0" smtClean="0"/>
+                        <a:t>foreign key</a:t>
+                      </a:r>
+                      <a:endParaRPr lang="en-US" sz="1400" dirty="0"/>
+                    </a:p>
+                  </a:txBody>
+                  <a:tcPr/>
+                </a:tc>
+              </a:tr>
+              <a:tr h="377597">
+                <a:tc>
+                  <a:txBody>
+                    <a:bodyPr/>
+                    <a:lstStyle/>
+                    <a:p>
+                      <a:r>
+                        <a:rPr lang="en-US" sz="1400" dirty="0" smtClean="0"/>
+                        <a:t>(</a:t>
+                      </a:r>
+                      <a:r>
+                        <a:rPr lang="en-US" sz="1400" dirty="0" err="1" smtClean="0"/>
+                        <a:t>Cust_id</a:t>
+                      </a:r>
+                      <a:r>
+                        <a:rPr lang="en-US" sz="1400" dirty="0" smtClean="0"/>
+                        <a:t>, </a:t>
+                      </a:r>
+                      <a:r>
+                        <a:rPr lang="en-US" sz="1400" dirty="0" err="1" smtClean="0"/>
+                        <a:t>AName</a:t>
+                      </a:r>
+                      <a:r>
+                        <a:rPr lang="en-US" sz="1400" dirty="0" smtClean="0"/>
+                        <a:t>)</a:t>
+                      </a:r>
+                      <a:endParaRPr lang="en-US" sz="1400" dirty="0"/>
+                    </a:p>
+                  </a:txBody>
+                  <a:tcPr/>
+                </a:tc>
+                <a:tc>
+                  <a:txBody>
+                    <a:bodyPr/>
+                    <a:lstStyle/>
+                    <a:p>
+                      <a:endParaRPr lang="en-US" sz="1400" dirty="0"/>
+                    </a:p>
+                  </a:txBody>
+                  <a:tcPr/>
+                </a:tc>
+                <a:tc>
+                  <a:txBody>
+                    <a:bodyPr/>
+                    <a:lstStyle/>
+                    <a:p>
+                      <a:r>
+                        <a:rPr lang="en-US" sz="1400" dirty="0" smtClean="0"/>
+                        <a:t>primary key</a:t>
+                      </a:r>
+                      <a:endParaRPr lang="en-US" sz="1400" dirty="0"/>
+                    </a:p>
+                  </a:txBody>
+                  <a:tcPr/>
+                </a:tc>
+              </a:tr>
+            </a:tbl>
+          </a:graphicData>
+        </a:graphic>
+      </p:graphicFrame>
     </p:spTree>
     <p:extLst>
       <p:ext uri="{BB962C8B-B14F-4D97-AF65-F5344CB8AC3E}">
@@ -12356,8 +13387,29 @@
                 <a:ea typeface="Consolas" charset="0"/>
                 <a:cs typeface="Consolas" charset="0"/>
               </a:rPr>
-              <a:t>     Age INTEGER, </a:t>
-            </a:r>
+              <a:t>     </a:t>
+            </a:r>
+            <a:r>
+              <a:rPr lang="en-US" sz="1400" dirty="0" err="1" smtClean="0">
+                <a:latin typeface="Consolas" charset="0"/>
+                <a:ea typeface="Consolas" charset="0"/>
+                <a:cs typeface="Consolas" charset="0"/>
+              </a:rPr>
+              <a:t>DateOfBirth</a:t>
+            </a:r>
+            <a:r>
+              <a:rPr lang="en-US" sz="1400" dirty="0" smtClean="0">
+                <a:latin typeface="Consolas" charset="0"/>
+                <a:ea typeface="Consolas" charset="0"/>
+                <a:cs typeface="Consolas" charset="0"/>
+              </a:rPr>
+              <a:t> DATE, </a:t>
+            </a:r>
+            <a:endParaRPr lang="en-US" sz="1400" dirty="0">
+              <a:latin typeface="Consolas" charset="0"/>
+              <a:ea typeface="Consolas" charset="0"/>
+              <a:cs typeface="Consolas" charset="0"/>
+            </a:endParaRPr>
           </a:p>
           <a:p>
             <a:pPr marL="0" indent="0">

</xml_diff>

<commit_message>
fixed incosistencies about the column age in lab 2
</commit_message>
<xml_diff>
--- a/labs/lab2/lab2.pptx
+++ b/labs/lab2/lab2.pptx
@@ -257,7 +257,7 @@
           <a:p>
             <a:fld id="{F591BB15-DE40-F842-8059-510BF077C15F}" type="datetimeFigureOut">
               <a:rPr lang="en-US" smtClean="0"/>
-              <a:t>1/26/18</a:t>
+              <a:t>1/30/18</a:t>
             </a:fld>
             <a:endParaRPr lang="en-US"/>
           </a:p>
@@ -497,7 +497,7 @@
               <ma14:placeholderFlag xmlns:ma14="http://schemas.microsoft.com/office/mac/drawingml/2011/main" val="1"/>
             </a:ext>
             <a:ext uri="{909E8E84-426E-40dd-AFC4-6F175D3DCCD1}">
-              <a14:hiddenFill xmlns="" xmlns:a14="http://schemas.microsoft.com/office/drawing/2010/main">
+              <a14:hiddenFill xmlns:a14="http://schemas.microsoft.com/office/drawing/2010/main" xmlns="">
                 <a:solidFill>
                   <a:srgbClr val="FFFFFF"/>
                 </a:solidFill>
@@ -6616,14 +6616,14 @@
               <ma14:placeholderFlag xmlns:ma14="http://schemas.microsoft.com/office/mac/drawingml/2011/main" val="1"/>
             </a:ext>
             <a:ext uri="{909E8E84-426E-40dd-AFC4-6F175D3DCCD1}">
-              <a14:hiddenFill xmlns="" xmlns:a14="http://schemas.microsoft.com/office/drawing/2010/main">
+              <a14:hiddenFill xmlns:a14="http://schemas.microsoft.com/office/drawing/2010/main" xmlns="">
                 <a:solidFill>
                   <a:srgbClr val="FFFFFF"/>
                 </a:solidFill>
               </a14:hiddenFill>
             </a:ext>
             <a:ext uri="{91240B29-F687-4f45-9708-019B960494DF}">
-              <a14:hiddenLine xmlns="" xmlns:a14="http://schemas.microsoft.com/office/drawing/2010/main" w="9525">
+              <a14:hiddenLine xmlns:a14="http://schemas.microsoft.com/office/drawing/2010/main" xmlns="" w="9525">
                 <a:solidFill>
                   <a:srgbClr val="000000"/>
                 </a:solidFill>
@@ -6698,14 +6698,14 @@
               <ma14:placeholderFlag xmlns:ma14="http://schemas.microsoft.com/office/mac/drawingml/2011/main" val="1"/>
             </a:ext>
             <a:ext uri="{909E8E84-426E-40dd-AFC4-6F175D3DCCD1}">
-              <a14:hiddenFill xmlns="" xmlns:a14="http://schemas.microsoft.com/office/drawing/2010/main">
+              <a14:hiddenFill xmlns:a14="http://schemas.microsoft.com/office/drawing/2010/main" xmlns="">
                 <a:solidFill>
                   <a:srgbClr val="FFFFFF"/>
                 </a:solidFill>
               </a14:hiddenFill>
             </a:ext>
             <a:ext uri="{91240B29-F687-4f45-9708-019B960494DF}">
-              <a14:hiddenLine xmlns="" xmlns:a14="http://schemas.microsoft.com/office/drawing/2010/main" w="9525">
+              <a14:hiddenLine xmlns:a14="http://schemas.microsoft.com/office/drawing/2010/main" xmlns="" w="9525">
                 <a:solidFill>
                   <a:srgbClr val="000000"/>
                 </a:solidFill>
@@ -7545,14 +7545,14 @@
               <ma14:placeholderFlag xmlns:ma14="http://schemas.microsoft.com/office/mac/drawingml/2011/main" val="1"/>
             </a:ext>
             <a:ext uri="{909E8E84-426E-40dd-AFC4-6F175D3DCCD1}">
-              <a14:hiddenFill xmlns="" xmlns:a14="http://schemas.microsoft.com/office/drawing/2010/main">
+              <a14:hiddenFill xmlns:a14="http://schemas.microsoft.com/office/drawing/2010/main" xmlns="">
                 <a:solidFill>
                   <a:srgbClr val="FFFFFF"/>
                 </a:solidFill>
               </a14:hiddenFill>
             </a:ext>
             <a:ext uri="{91240B29-F687-4f45-9708-019B960494DF}">
-              <a14:hiddenLine xmlns="" xmlns:a14="http://schemas.microsoft.com/office/drawing/2010/main" w="9525">
+              <a14:hiddenLine xmlns:a14="http://schemas.microsoft.com/office/drawing/2010/main" xmlns="" w="9525">
                 <a:solidFill>
                   <a:srgbClr val="000000"/>
                 </a:solidFill>
@@ -7759,14 +7759,14 @@
               <ma14:placeholderFlag xmlns:ma14="http://schemas.microsoft.com/office/mac/drawingml/2011/main" val="1"/>
             </a:ext>
             <a:ext uri="{909E8E84-426E-40dd-AFC4-6F175D3DCCD1}">
-              <a14:hiddenFill xmlns="" xmlns:a14="http://schemas.microsoft.com/office/drawing/2010/main">
+              <a14:hiddenFill xmlns:a14="http://schemas.microsoft.com/office/drawing/2010/main" xmlns="">
                 <a:solidFill>
                   <a:srgbClr val="FFFFFF"/>
                 </a:solidFill>
               </a14:hiddenFill>
             </a:ext>
             <a:ext uri="{91240B29-F687-4f45-9708-019B960494DF}">
-              <a14:hiddenLine xmlns="" xmlns:a14="http://schemas.microsoft.com/office/drawing/2010/main" w="9525">
+              <a14:hiddenLine xmlns:a14="http://schemas.microsoft.com/office/drawing/2010/main" xmlns="" w="9525">
                 <a:solidFill>
                   <a:srgbClr val="000000"/>
                 </a:solidFill>
@@ -7973,14 +7973,14 @@
               <ma14:placeholderFlag xmlns:ma14="http://schemas.microsoft.com/office/mac/drawingml/2011/main" val="1"/>
             </a:ext>
             <a:ext uri="{909E8E84-426E-40dd-AFC4-6F175D3DCCD1}">
-              <a14:hiddenFill xmlns="" xmlns:a14="http://schemas.microsoft.com/office/drawing/2010/main">
+              <a14:hiddenFill xmlns:a14="http://schemas.microsoft.com/office/drawing/2010/main" xmlns="">
                 <a:solidFill>
                   <a:srgbClr val="FFFFFF"/>
                 </a:solidFill>
               </a14:hiddenFill>
             </a:ext>
             <a:ext uri="{91240B29-F687-4f45-9708-019B960494DF}">
-              <a14:hiddenLine xmlns="" xmlns:a14="http://schemas.microsoft.com/office/drawing/2010/main" w="9525">
+              <a14:hiddenLine xmlns:a14="http://schemas.microsoft.com/office/drawing/2010/main" xmlns="" w="9525">
                 <a:solidFill>
                   <a:srgbClr val="000000"/>
                 </a:solidFill>
@@ -8900,66 +8900,71 @@
                 <a:ea typeface="Times" charset="0"/>
                 <a:cs typeface="Times" charset="0"/>
               </a:rPr>
-              <a:t>, Style, Age</a:t>
-            </a:r>
-            <a:r>
-              <a:rPr lang="tr-TR" dirty="0" smtClean="0">
+              <a:t>, Style, </a:t>
+            </a:r>
+            <a:r>
+              <a:rPr lang="tr-TR" dirty="0" err="1" smtClean="0">
                 <a:latin typeface="Times" charset="0"/>
                 <a:ea typeface="Times" charset="0"/>
                 <a:cs typeface="Times" charset="0"/>
               </a:rPr>
-              <a:t>)</a:t>
-            </a:r>
-          </a:p>
-          <a:p>
-            <a:pPr lvl="1"/>
-            <a:r>
-              <a:rPr lang="tr-TR" dirty="0">
+              <a:t>DateOfBirth</a:t>
+            </a:r>
+            <a:r>
+              <a:rPr lang="tr-TR" dirty="0" smtClean="0">
                 <a:latin typeface="Times" charset="0"/>
                 <a:ea typeface="Times" charset="0"/>
                 <a:cs typeface="Times" charset="0"/>
               </a:rPr>
-              <a:t>(‘</a:t>
-            </a:r>
-            <a:r>
-              <a:rPr lang="tr-TR" dirty="0" err="1">
+              <a:t>)</a:t>
+            </a:r>
+            <a:endParaRPr lang="tr-TR" dirty="0" smtClean="0">
+              <a:latin typeface="Times" charset="0"/>
+              <a:ea typeface="Times" charset="0"/>
+              <a:cs typeface="Times" charset="0"/>
+            </a:endParaRPr>
+          </a:p>
+          <a:p>
+            <a:pPr lvl="1"/>
+            <a:r>
+              <a:rPr lang="tr-TR" dirty="0">
                 <a:latin typeface="Times" charset="0"/>
                 <a:ea typeface="Times" charset="0"/>
                 <a:cs typeface="Times" charset="0"/>
               </a:rPr>
-              <a:t>Caravaggio</a:t>
-            </a:r>
-            <a:r>
-              <a:rPr lang="tr-TR" dirty="0">
+              <a:t>(‘</a:t>
+            </a:r>
+            <a:r>
+              <a:rPr lang="tr-TR" dirty="0" err="1">
                 <a:latin typeface="Times" charset="0"/>
                 <a:ea typeface="Times" charset="0"/>
                 <a:cs typeface="Times" charset="0"/>
               </a:rPr>
-              <a:t>’, ‘Milan’, ‘</a:t>
-            </a:r>
-            <a:r>
-              <a:rPr lang="tr-TR" dirty="0" err="1">
+              <a:t>Caravaggio</a:t>
+            </a:r>
+            <a:r>
+              <a:rPr lang="tr-TR" dirty="0">
                 <a:latin typeface="Times" charset="0"/>
                 <a:ea typeface="Times" charset="0"/>
                 <a:cs typeface="Times" charset="0"/>
               </a:rPr>
-              <a:t>Baroque</a:t>
-            </a:r>
-            <a:r>
-              <a:rPr lang="tr-TR" dirty="0">
+              <a:t>’, ‘Milan’, ‘</a:t>
+            </a:r>
+            <a:r>
+              <a:rPr lang="tr-TR" dirty="0" err="1">
                 <a:latin typeface="Times" charset="0"/>
                 <a:ea typeface="Times" charset="0"/>
                 <a:cs typeface="Times" charset="0"/>
               </a:rPr>
-              <a:t>’, </a:t>
-            </a:r>
-            <a:r>
-              <a:rPr lang="tr-TR" dirty="0" smtClean="0">
+              <a:t>Baroque</a:t>
+            </a:r>
+            <a:r>
+              <a:rPr lang="tr-TR" dirty="0">
                 <a:latin typeface="Times" charset="0"/>
                 <a:ea typeface="Times" charset="0"/>
                 <a:cs typeface="Times" charset="0"/>
               </a:rPr>
-              <a:t>‘</a:t>
+              <a:t>’, </a:t>
             </a:r>
             <a:r>
               <a:rPr lang="tr-TR" dirty="0" smtClean="0">
@@ -8967,15 +8972,7 @@
                 <a:ea typeface="Times" charset="0"/>
                 <a:cs typeface="Times" charset="0"/>
               </a:rPr>
-              <a:t>1571-09-28</a:t>
-            </a:r>
-            <a:r>
-              <a:rPr lang="tr-TR" dirty="0" smtClean="0">
-                <a:latin typeface="Times" charset="0"/>
-                <a:ea typeface="Times" charset="0"/>
-                <a:cs typeface="Times" charset="0"/>
-              </a:rPr>
-              <a:t>’)</a:t>
+              <a:t>‘1571-09-28’)</a:t>
             </a:r>
             <a:endParaRPr lang="tr-TR" dirty="0">
               <a:latin typeface="Times" charset="0"/>
@@ -9015,23 +9012,7 @@
                 <a:ea typeface="Times" charset="0"/>
                 <a:cs typeface="Times" charset="0"/>
               </a:rPr>
-              <a:t>‘</a:t>
-            </a:r>
-            <a:r>
-              <a:rPr lang="tr-TR" dirty="0" smtClean="0">
-                <a:latin typeface="Times" charset="0"/>
-                <a:ea typeface="Times" charset="0"/>
-                <a:cs typeface="Times" charset="0"/>
-              </a:rPr>
-              <a:t>1977-12-12</a:t>
-            </a:r>
-            <a:r>
-              <a:rPr lang="tr-TR" dirty="0" smtClean="0">
-                <a:latin typeface="Times" charset="0"/>
-                <a:ea typeface="Times" charset="0"/>
-                <a:cs typeface="Times" charset="0"/>
-              </a:rPr>
-              <a:t>’)</a:t>
+              <a:t>‘1977-12-12’)</a:t>
             </a:r>
             <a:endParaRPr lang="tr-TR" dirty="0">
               <a:latin typeface="Times" charset="0"/>
@@ -9071,29 +9052,8 @@
                 <a:ea typeface="Times" charset="0"/>
                 <a:cs typeface="Times" charset="0"/>
               </a:rPr>
-              <a:t>‘</a:t>
-            </a:r>
-            <a:r>
-              <a:rPr lang="tr-TR" dirty="0" smtClean="0">
-                <a:latin typeface="Times" charset="0"/>
-                <a:ea typeface="Times" charset="0"/>
-                <a:cs typeface="Times" charset="0"/>
-              </a:rPr>
-              <a:t>1881-10-25</a:t>
-            </a:r>
-            <a:r>
-              <a:rPr lang="tr-TR" dirty="0" smtClean="0">
-                <a:latin typeface="Times" charset="0"/>
-                <a:ea typeface="Times" charset="0"/>
-                <a:cs typeface="Times" charset="0"/>
-              </a:rPr>
-              <a:t>’)</a:t>
-            </a:r>
-            <a:endParaRPr lang="tr-TR" dirty="0" smtClean="0">
-              <a:latin typeface="Times" charset="0"/>
-              <a:ea typeface="Times" charset="0"/>
-              <a:cs typeface="Times" charset="0"/>
-            </a:endParaRPr>
+              <a:t>‘1881-10-25’)</a:t>
+            </a:r>
           </a:p>
           <a:p>
             <a:r>
@@ -10752,14 +10712,14 @@
               <ma14:placeholderFlag xmlns:ma14="http://schemas.microsoft.com/office/mac/drawingml/2011/main" val="1"/>
             </a:ext>
             <a:ext uri="{909E8E84-426E-40dd-AFC4-6F175D3DCCD1}">
-              <a14:hiddenFill xmlns="" xmlns:a14="http://schemas.microsoft.com/office/drawing/2010/main">
+              <a14:hiddenFill xmlns:a14="http://schemas.microsoft.com/office/drawing/2010/main" xmlns="">
                 <a:solidFill>
                   <a:srgbClr val="FFFFFF"/>
                 </a:solidFill>
               </a14:hiddenFill>
             </a:ext>
             <a:ext uri="{91240B29-F687-4f45-9708-019B960494DF}">
-              <a14:hiddenLine xmlns="" xmlns:a14="http://schemas.microsoft.com/office/drawing/2010/main" w="9525">
+              <a14:hiddenLine xmlns:a14="http://schemas.microsoft.com/office/drawing/2010/main" xmlns="" w="9525">
                 <a:solidFill>
                   <a:srgbClr val="000000"/>
                 </a:solidFill>
@@ -11547,35 +11507,22 @@
                 <a:ea typeface="Consolas" charset="0"/>
                 <a:cs typeface="Consolas" charset="0"/>
               </a:rPr>
-              <a:t>VARCHAR(n</a:t>
-            </a:r>
+              <a:t>VARCHAR(n)</a:t>
+            </a:r>
+          </a:p>
+          <a:p>
+            <a:pPr marL="342900" indent="-342900">
+              <a:buFont typeface="Arial" charset="0"/>
+              <a:buChar char="•"/>
+            </a:pPr>
             <a:r>
               <a:rPr lang="en-US" sz="2000" dirty="0" smtClean="0">
                 <a:latin typeface="Consolas" charset="0"/>
                 <a:ea typeface="Consolas" charset="0"/>
                 <a:cs typeface="Consolas" charset="0"/>
               </a:rPr>
-              <a:t>)</a:t>
-            </a:r>
-          </a:p>
-          <a:p>
-            <a:pPr marL="342900" indent="-342900">
-              <a:buFont typeface="Arial" charset="0"/>
-              <a:buChar char="•"/>
-            </a:pPr>
-            <a:r>
-              <a:rPr lang="en-US" sz="2000" dirty="0" smtClean="0">
-                <a:latin typeface="Consolas" charset="0"/>
-                <a:ea typeface="Consolas" charset="0"/>
-                <a:cs typeface="Consolas" charset="0"/>
-              </a:rPr>
               <a:t>DATE</a:t>
             </a:r>
-            <a:endParaRPr lang="en-US" sz="2000" dirty="0" smtClean="0">
-              <a:latin typeface="Consolas" charset="0"/>
-              <a:ea typeface="Consolas" charset="0"/>
-              <a:cs typeface="Consolas" charset="0"/>
-            </a:endParaRPr>
           </a:p>
           <a:p>
             <a:pPr marL="342900" indent="-342900">
@@ -12126,7 +12073,15 @@
             </a:r>
             <a:r>
               <a:rPr lang="en-US" sz="1400" dirty="0" smtClean="0"/>
-              <a:t>    Age </a:t>
+              <a:t>    </a:t>
+            </a:r>
+            <a:r>
+              <a:rPr lang="en-US" sz="1400" dirty="0" err="1" smtClean="0"/>
+              <a:t>DateOfBirth</a:t>
+            </a:r>
+            <a:r>
+              <a:rPr lang="en-US" sz="1400" dirty="0" smtClean="0"/>
+              <a:t> </a:t>
             </a:r>
             <a:r>
               <a:rPr lang="en-US" sz="1400" dirty="0"/>
@@ -13494,14 +13449,14 @@
               <ma14:placeholderFlag xmlns:ma14="http://schemas.microsoft.com/office/mac/drawingml/2011/main" val="1"/>
             </a:ext>
             <a:ext uri="{909E8E84-426E-40dd-AFC4-6F175D3DCCD1}">
-              <a14:hiddenFill xmlns="" xmlns:a14="http://schemas.microsoft.com/office/drawing/2010/main">
+              <a14:hiddenFill xmlns:a14="http://schemas.microsoft.com/office/drawing/2010/main" xmlns="">
                 <a:solidFill>
                   <a:srgbClr val="FFFFFF"/>
                 </a:solidFill>
               </a14:hiddenFill>
             </a:ext>
             <a:ext uri="{91240B29-F687-4f45-9708-019B960494DF}">
-              <a14:hiddenLine xmlns="" xmlns:a14="http://schemas.microsoft.com/office/drawing/2010/main" w="9525">
+              <a14:hiddenLine xmlns:a14="http://schemas.microsoft.com/office/drawing/2010/main" xmlns="" w="9525">
                 <a:solidFill>
                   <a:srgbClr val="000000"/>
                 </a:solidFill>
@@ -14023,14 +13978,14 @@
               <ma14:placeholderFlag xmlns:ma14="http://schemas.microsoft.com/office/mac/drawingml/2011/main" val="1"/>
             </a:ext>
             <a:ext uri="{909E8E84-426E-40dd-AFC4-6F175D3DCCD1}">
-              <a14:hiddenFill xmlns="" xmlns:a14="http://schemas.microsoft.com/office/drawing/2010/main">
+              <a14:hiddenFill xmlns:a14="http://schemas.microsoft.com/office/drawing/2010/main" xmlns="">
                 <a:solidFill>
                   <a:srgbClr val="FFFFFF"/>
                 </a:solidFill>
               </a14:hiddenFill>
             </a:ext>
             <a:ext uri="{91240B29-F687-4f45-9708-019B960494DF}">
-              <a14:hiddenLine xmlns="" xmlns:a14="http://schemas.microsoft.com/office/drawing/2010/main" w="9525">
+              <a14:hiddenLine xmlns:a14="http://schemas.microsoft.com/office/drawing/2010/main" xmlns="" w="9525">
                 <a:solidFill>
                   <a:srgbClr val="000000"/>
                 </a:solidFill>
@@ -14510,14 +14465,14 @@
               <ma14:placeholderFlag xmlns:ma14="http://schemas.microsoft.com/office/mac/drawingml/2011/main" val="1"/>
             </a:ext>
             <a:ext uri="{909E8E84-426E-40dd-AFC4-6F175D3DCCD1}">
-              <a14:hiddenFill xmlns="" xmlns:a14="http://schemas.microsoft.com/office/drawing/2010/main">
+              <a14:hiddenFill xmlns:a14="http://schemas.microsoft.com/office/drawing/2010/main" xmlns="">
                 <a:solidFill>
                   <a:srgbClr val="FFFFFF"/>
                 </a:solidFill>
               </a14:hiddenFill>
             </a:ext>
             <a:ext uri="{91240B29-F687-4f45-9708-019B960494DF}">
-              <a14:hiddenLine xmlns="" xmlns:a14="http://schemas.microsoft.com/office/drawing/2010/main" w="9525">
+              <a14:hiddenLine xmlns:a14="http://schemas.microsoft.com/office/drawing/2010/main" xmlns="" w="9525">
                 <a:solidFill>
                   <a:srgbClr val="000000"/>
                 </a:solidFill>
@@ -15170,7 +15125,15 @@
                 <a:ea typeface="Consolas" charset="0"/>
                 <a:cs typeface="Consolas" charset="0"/>
               </a:rPr>
-              <a:t>INSERT INTO Artist(AName, Birthplace, Style, Age) VALUES ('Caravaggio', 'Milan', 'Baroque', '59</a:t>
+              <a:t>INSERT INTO Artist(AName, Birthplace, Style, </a:t>
+            </a:r>
+            <a:r>
+              <a:rPr lang="en-US" sz="1600" dirty="0" err="1" smtClean="0">
+                <a:latin typeface="Consolas" charset="0"/>
+                <a:ea typeface="Consolas" charset="0"/>
+                <a:cs typeface="Consolas" charset="0"/>
+              </a:rPr>
+              <a:t>DateOfBirth</a:t>
             </a:r>
             <a:r>
               <a:rPr lang="en-US" sz="1600" dirty="0" smtClean="0">
@@ -15178,8 +15141,53 @@
                 <a:ea typeface="Consolas" charset="0"/>
                 <a:cs typeface="Consolas" charset="0"/>
               </a:rPr>
+              <a:t>) </a:t>
+            </a:r>
+            <a:r>
+              <a:rPr lang="en-US" sz="1600" dirty="0">
+                <a:latin typeface="Consolas" charset="0"/>
+                <a:ea typeface="Consolas" charset="0"/>
+                <a:cs typeface="Consolas" charset="0"/>
+              </a:rPr>
+              <a:t>VALUES ('Caravaggio', 'Milan', 'Baroque', </a:t>
+            </a:r>
+            <a:r>
+              <a:rPr lang="en-US" sz="1600" dirty="0" smtClean="0">
+                <a:latin typeface="Consolas" charset="0"/>
+                <a:ea typeface="Consolas" charset="0"/>
+                <a:cs typeface="Consolas" charset="0"/>
+              </a:rPr>
+              <a:t>'</a:t>
+            </a:r>
+            <a:r>
+              <a:rPr lang="tr-TR" sz="1600" dirty="0">
+                <a:latin typeface="Times" charset="0"/>
+                <a:ea typeface="Times" charset="0"/>
+                <a:cs typeface="Times" charset="0"/>
+              </a:rPr>
+              <a:t> </a:t>
+            </a:r>
+            <a:r>
+              <a:rPr lang="tr-TR" sz="1600" dirty="0" smtClean="0">
+                <a:latin typeface="Times" charset="0"/>
+                <a:ea typeface="Times" charset="0"/>
+                <a:cs typeface="Times" charset="0"/>
+              </a:rPr>
+              <a:t>1571-09-28</a:t>
+            </a:r>
+            <a:r>
+              <a:rPr lang="en-US" sz="1600" dirty="0" smtClean="0">
+                <a:latin typeface="Consolas" charset="0"/>
+                <a:ea typeface="Consolas" charset="0"/>
+                <a:cs typeface="Consolas" charset="0"/>
+              </a:rPr>
               <a:t>');</a:t>
             </a:r>
+            <a:endParaRPr lang="en-US" sz="1600" dirty="0" smtClean="0">
+              <a:latin typeface="Consolas" charset="0"/>
+              <a:ea typeface="Consolas" charset="0"/>
+              <a:cs typeface="Consolas" charset="0"/>
+            </a:endParaRPr>
           </a:p>
           <a:p>
             <a:pPr marL="285750"/>

</xml_diff>